<commit_message>
#5 create button widget for signin and signup
</commit_message>
<xml_diff>
--- a/docs/ER-DIAGRAM.pptx
+++ b/docs/ER-DIAGRAM.pptx
@@ -155,10 +155,9 @@
           </a:lstStyle>
           <a:p>
             <a:r>
-              <a:rPr lang="en-US" smtClean="0"/>
+              <a:rPr lang="en-US"/>
               <a:t>Click to edit Master title style</a:t>
             </a:r>
-            <a:endParaRPr lang="en-US"/>
           </a:p>
         </p:txBody>
       </p:sp>
@@ -220,10 +219,9 @@
           </a:lstStyle>
           <a:p>
             <a:r>
-              <a:rPr lang="en-US" smtClean="0"/>
+              <a:rPr lang="en-US"/>
               <a:t>Click to edit Master subtitle style</a:t>
             </a:r>
-            <a:endParaRPr lang="en-US"/>
           </a:p>
         </p:txBody>
       </p:sp>
@@ -244,7 +242,7 @@
           <a:p>
             <a:fld id="{28BE630F-C39C-4DB9-8258-0B48CA067079}" type="datetimeFigureOut">
               <a:rPr lang="en-US" smtClean="0"/>
-              <a:t>11/25/2021</a:t>
+              <a:t>11/27/2021</a:t>
             </a:fld>
             <a:endParaRPr lang="en-US"/>
           </a:p>
@@ -338,10 +336,9 @@
           <a:lstStyle/>
           <a:p>
             <a:r>
-              <a:rPr lang="en-US" smtClean="0"/>
+              <a:rPr lang="en-US"/>
               <a:t>Click to edit Master title style</a:t>
             </a:r>
-            <a:endParaRPr lang="en-US"/>
           </a:p>
         </p:txBody>
       </p:sp>
@@ -362,38 +359,37 @@
           <a:p>
             <a:pPr lvl="0"/>
             <a:r>
-              <a:rPr lang="en-US" smtClean="0"/>
+              <a:rPr lang="en-US"/>
               <a:t>Click to edit Master text styles</a:t>
             </a:r>
           </a:p>
           <a:p>
             <a:pPr lvl="1"/>
             <a:r>
-              <a:rPr lang="en-US" smtClean="0"/>
+              <a:rPr lang="en-US"/>
               <a:t>Second level</a:t>
             </a:r>
           </a:p>
           <a:p>
             <a:pPr lvl="2"/>
             <a:r>
-              <a:rPr lang="en-US" smtClean="0"/>
+              <a:rPr lang="en-US"/>
               <a:t>Third level</a:t>
             </a:r>
           </a:p>
           <a:p>
             <a:pPr lvl="3"/>
             <a:r>
-              <a:rPr lang="en-US" smtClean="0"/>
+              <a:rPr lang="en-US"/>
               <a:t>Fourth level</a:t>
             </a:r>
           </a:p>
           <a:p>
             <a:pPr lvl="4"/>
             <a:r>
-              <a:rPr lang="en-US" smtClean="0"/>
+              <a:rPr lang="en-US"/>
               <a:t>Fifth level</a:t>
             </a:r>
-            <a:endParaRPr lang="en-US"/>
           </a:p>
         </p:txBody>
       </p:sp>
@@ -414,7 +410,7 @@
           <a:p>
             <a:fld id="{28BE630F-C39C-4DB9-8258-0B48CA067079}" type="datetimeFigureOut">
               <a:rPr lang="en-US" smtClean="0"/>
-              <a:t>11/25/2021</a:t>
+              <a:t>11/27/2021</a:t>
             </a:fld>
             <a:endParaRPr lang="en-US"/>
           </a:p>
@@ -513,10 +509,9 @@
           <a:lstStyle/>
           <a:p>
             <a:r>
-              <a:rPr lang="en-US" smtClean="0"/>
+              <a:rPr lang="en-US"/>
               <a:t>Click to edit Master title style</a:t>
             </a:r>
-            <a:endParaRPr lang="en-US"/>
           </a:p>
         </p:txBody>
       </p:sp>
@@ -542,38 +537,37 @@
           <a:p>
             <a:pPr lvl="0"/>
             <a:r>
-              <a:rPr lang="en-US" smtClean="0"/>
+              <a:rPr lang="en-US"/>
               <a:t>Click to edit Master text styles</a:t>
             </a:r>
           </a:p>
           <a:p>
             <a:pPr lvl="1"/>
             <a:r>
-              <a:rPr lang="en-US" smtClean="0"/>
+              <a:rPr lang="en-US"/>
               <a:t>Second level</a:t>
             </a:r>
           </a:p>
           <a:p>
             <a:pPr lvl="2"/>
             <a:r>
-              <a:rPr lang="en-US" smtClean="0"/>
+              <a:rPr lang="en-US"/>
               <a:t>Third level</a:t>
             </a:r>
           </a:p>
           <a:p>
             <a:pPr lvl="3"/>
             <a:r>
-              <a:rPr lang="en-US" smtClean="0"/>
+              <a:rPr lang="en-US"/>
               <a:t>Fourth level</a:t>
             </a:r>
           </a:p>
           <a:p>
             <a:pPr lvl="4"/>
             <a:r>
-              <a:rPr lang="en-US" smtClean="0"/>
+              <a:rPr lang="en-US"/>
               <a:t>Fifth level</a:t>
             </a:r>
-            <a:endParaRPr lang="en-US"/>
           </a:p>
         </p:txBody>
       </p:sp>
@@ -594,7 +588,7 @@
           <a:p>
             <a:fld id="{28BE630F-C39C-4DB9-8258-0B48CA067079}" type="datetimeFigureOut">
               <a:rPr lang="en-US" smtClean="0"/>
-              <a:t>11/25/2021</a:t>
+              <a:t>11/27/2021</a:t>
             </a:fld>
             <a:endParaRPr lang="en-US"/>
           </a:p>
@@ -688,10 +682,9 @@
           <a:lstStyle/>
           <a:p>
             <a:r>
-              <a:rPr lang="en-US" smtClean="0"/>
+              <a:rPr lang="en-US"/>
               <a:t>Click to edit Master title style</a:t>
             </a:r>
-            <a:endParaRPr lang="en-US"/>
           </a:p>
         </p:txBody>
       </p:sp>
@@ -712,38 +705,37 @@
           <a:p>
             <a:pPr lvl="0"/>
             <a:r>
-              <a:rPr lang="en-US" smtClean="0"/>
+              <a:rPr lang="en-US"/>
               <a:t>Click to edit Master text styles</a:t>
             </a:r>
           </a:p>
           <a:p>
             <a:pPr lvl="1"/>
             <a:r>
-              <a:rPr lang="en-US" smtClean="0"/>
+              <a:rPr lang="en-US"/>
               <a:t>Second level</a:t>
             </a:r>
           </a:p>
           <a:p>
             <a:pPr lvl="2"/>
             <a:r>
-              <a:rPr lang="en-US" smtClean="0"/>
+              <a:rPr lang="en-US"/>
               <a:t>Third level</a:t>
             </a:r>
           </a:p>
           <a:p>
             <a:pPr lvl="3"/>
             <a:r>
-              <a:rPr lang="en-US" smtClean="0"/>
+              <a:rPr lang="en-US"/>
               <a:t>Fourth level</a:t>
             </a:r>
           </a:p>
           <a:p>
             <a:pPr lvl="4"/>
             <a:r>
-              <a:rPr lang="en-US" smtClean="0"/>
+              <a:rPr lang="en-US"/>
               <a:t>Fifth level</a:t>
             </a:r>
-            <a:endParaRPr lang="en-US"/>
           </a:p>
         </p:txBody>
       </p:sp>
@@ -764,7 +756,7 @@
           <a:p>
             <a:fld id="{28BE630F-C39C-4DB9-8258-0B48CA067079}" type="datetimeFigureOut">
               <a:rPr lang="en-US" smtClean="0"/>
-              <a:t>11/25/2021</a:t>
+              <a:t>11/27/2021</a:t>
             </a:fld>
             <a:endParaRPr lang="en-US"/>
           </a:p>
@@ -867,10 +859,9 @@
           </a:lstStyle>
           <a:p>
             <a:r>
-              <a:rPr lang="en-US" smtClean="0"/>
+              <a:rPr lang="en-US"/>
               <a:t>Click to edit Master title style</a:t>
             </a:r>
-            <a:endParaRPr lang="en-US"/>
           </a:p>
         </p:txBody>
       </p:sp>
@@ -987,7 +978,7 @@
           <a:p>
             <a:pPr lvl="0"/>
             <a:r>
-              <a:rPr lang="en-US" smtClean="0"/>
+              <a:rPr lang="en-US"/>
               <a:t>Click to edit Master text styles</a:t>
             </a:r>
           </a:p>
@@ -1010,7 +1001,7 @@
           <a:p>
             <a:fld id="{28BE630F-C39C-4DB9-8258-0B48CA067079}" type="datetimeFigureOut">
               <a:rPr lang="en-US" smtClean="0"/>
-              <a:t>11/25/2021</a:t>
+              <a:t>11/27/2021</a:t>
             </a:fld>
             <a:endParaRPr lang="en-US"/>
           </a:p>
@@ -1104,10 +1095,9 @@
           <a:lstStyle/>
           <a:p>
             <a:r>
-              <a:rPr lang="en-US" smtClean="0"/>
+              <a:rPr lang="en-US"/>
               <a:t>Click to edit Master title style</a:t>
             </a:r>
-            <a:endParaRPr lang="en-US"/>
           </a:p>
         </p:txBody>
       </p:sp>
@@ -1133,38 +1123,37 @@
           <a:p>
             <a:pPr lvl="0"/>
             <a:r>
-              <a:rPr lang="en-US" smtClean="0"/>
+              <a:rPr lang="en-US"/>
               <a:t>Click to edit Master text styles</a:t>
             </a:r>
           </a:p>
           <a:p>
             <a:pPr lvl="1"/>
             <a:r>
-              <a:rPr lang="en-US" smtClean="0"/>
+              <a:rPr lang="en-US"/>
               <a:t>Second level</a:t>
             </a:r>
           </a:p>
           <a:p>
             <a:pPr lvl="2"/>
             <a:r>
-              <a:rPr lang="en-US" smtClean="0"/>
+              <a:rPr lang="en-US"/>
               <a:t>Third level</a:t>
             </a:r>
           </a:p>
           <a:p>
             <a:pPr lvl="3"/>
             <a:r>
-              <a:rPr lang="en-US" smtClean="0"/>
+              <a:rPr lang="en-US"/>
               <a:t>Fourth level</a:t>
             </a:r>
           </a:p>
           <a:p>
             <a:pPr lvl="4"/>
             <a:r>
-              <a:rPr lang="en-US" smtClean="0"/>
+              <a:rPr lang="en-US"/>
               <a:t>Fifth level</a:t>
             </a:r>
-            <a:endParaRPr lang="en-US"/>
           </a:p>
         </p:txBody>
       </p:sp>
@@ -1190,38 +1179,37 @@
           <a:p>
             <a:pPr lvl="0"/>
             <a:r>
-              <a:rPr lang="en-US" smtClean="0"/>
+              <a:rPr lang="en-US"/>
               <a:t>Click to edit Master text styles</a:t>
             </a:r>
           </a:p>
           <a:p>
             <a:pPr lvl="1"/>
             <a:r>
-              <a:rPr lang="en-US" smtClean="0"/>
+              <a:rPr lang="en-US"/>
               <a:t>Second level</a:t>
             </a:r>
           </a:p>
           <a:p>
             <a:pPr lvl="2"/>
             <a:r>
-              <a:rPr lang="en-US" smtClean="0"/>
+              <a:rPr lang="en-US"/>
               <a:t>Third level</a:t>
             </a:r>
           </a:p>
           <a:p>
             <a:pPr lvl="3"/>
             <a:r>
-              <a:rPr lang="en-US" smtClean="0"/>
+              <a:rPr lang="en-US"/>
               <a:t>Fourth level</a:t>
             </a:r>
           </a:p>
           <a:p>
             <a:pPr lvl="4"/>
             <a:r>
-              <a:rPr lang="en-US" smtClean="0"/>
+              <a:rPr lang="en-US"/>
               <a:t>Fifth level</a:t>
             </a:r>
-            <a:endParaRPr lang="en-US"/>
           </a:p>
         </p:txBody>
       </p:sp>
@@ -1242,7 +1230,7 @@
           <a:p>
             <a:fld id="{28BE630F-C39C-4DB9-8258-0B48CA067079}" type="datetimeFigureOut">
               <a:rPr lang="en-US" smtClean="0"/>
-              <a:t>11/25/2021</a:t>
+              <a:t>11/27/2021</a:t>
             </a:fld>
             <a:endParaRPr lang="en-US"/>
           </a:p>
@@ -1341,10 +1329,9 @@
           <a:lstStyle/>
           <a:p>
             <a:r>
-              <a:rPr lang="en-US" smtClean="0"/>
+              <a:rPr lang="en-US"/>
               <a:t>Click to edit Master title style</a:t>
             </a:r>
-            <a:endParaRPr lang="en-US"/>
           </a:p>
         </p:txBody>
       </p:sp>
@@ -1407,7 +1394,7 @@
           <a:p>
             <a:pPr lvl="0"/>
             <a:r>
-              <a:rPr lang="en-US" smtClean="0"/>
+              <a:rPr lang="en-US"/>
               <a:t>Click to edit Master text styles</a:t>
             </a:r>
           </a:p>
@@ -1435,38 +1422,37 @@
           <a:p>
             <a:pPr lvl="0"/>
             <a:r>
-              <a:rPr lang="en-US" smtClean="0"/>
+              <a:rPr lang="en-US"/>
               <a:t>Click to edit Master text styles</a:t>
             </a:r>
           </a:p>
           <a:p>
             <a:pPr lvl="1"/>
             <a:r>
-              <a:rPr lang="en-US" smtClean="0"/>
+              <a:rPr lang="en-US"/>
               <a:t>Second level</a:t>
             </a:r>
           </a:p>
           <a:p>
             <a:pPr lvl="2"/>
             <a:r>
-              <a:rPr lang="en-US" smtClean="0"/>
+              <a:rPr lang="en-US"/>
               <a:t>Third level</a:t>
             </a:r>
           </a:p>
           <a:p>
             <a:pPr lvl="3"/>
             <a:r>
-              <a:rPr lang="en-US" smtClean="0"/>
+              <a:rPr lang="en-US"/>
               <a:t>Fourth level</a:t>
             </a:r>
           </a:p>
           <a:p>
             <a:pPr lvl="4"/>
             <a:r>
-              <a:rPr lang="en-US" smtClean="0"/>
+              <a:rPr lang="en-US"/>
               <a:t>Fifth level</a:t>
             </a:r>
-            <a:endParaRPr lang="en-US"/>
           </a:p>
         </p:txBody>
       </p:sp>
@@ -1529,7 +1515,7 @@
           <a:p>
             <a:pPr lvl="0"/>
             <a:r>
-              <a:rPr lang="en-US" smtClean="0"/>
+              <a:rPr lang="en-US"/>
               <a:t>Click to edit Master text styles</a:t>
             </a:r>
           </a:p>
@@ -1557,38 +1543,37 @@
           <a:p>
             <a:pPr lvl="0"/>
             <a:r>
-              <a:rPr lang="en-US" smtClean="0"/>
+              <a:rPr lang="en-US"/>
               <a:t>Click to edit Master text styles</a:t>
             </a:r>
           </a:p>
           <a:p>
             <a:pPr lvl="1"/>
             <a:r>
-              <a:rPr lang="en-US" smtClean="0"/>
+              <a:rPr lang="en-US"/>
               <a:t>Second level</a:t>
             </a:r>
           </a:p>
           <a:p>
             <a:pPr lvl="2"/>
             <a:r>
-              <a:rPr lang="en-US" smtClean="0"/>
+              <a:rPr lang="en-US"/>
               <a:t>Third level</a:t>
             </a:r>
           </a:p>
           <a:p>
             <a:pPr lvl="3"/>
             <a:r>
-              <a:rPr lang="en-US" smtClean="0"/>
+              <a:rPr lang="en-US"/>
               <a:t>Fourth level</a:t>
             </a:r>
           </a:p>
           <a:p>
             <a:pPr lvl="4"/>
             <a:r>
-              <a:rPr lang="en-US" smtClean="0"/>
+              <a:rPr lang="en-US"/>
               <a:t>Fifth level</a:t>
             </a:r>
-            <a:endParaRPr lang="en-US"/>
           </a:p>
         </p:txBody>
       </p:sp>
@@ -1609,7 +1594,7 @@
           <a:p>
             <a:fld id="{28BE630F-C39C-4DB9-8258-0B48CA067079}" type="datetimeFigureOut">
               <a:rPr lang="en-US" smtClean="0"/>
-              <a:t>11/25/2021</a:t>
+              <a:t>11/27/2021</a:t>
             </a:fld>
             <a:endParaRPr lang="en-US"/>
           </a:p>
@@ -1703,10 +1688,9 @@
           <a:lstStyle/>
           <a:p>
             <a:r>
-              <a:rPr lang="en-US" smtClean="0"/>
+              <a:rPr lang="en-US"/>
               <a:t>Click to edit Master title style</a:t>
             </a:r>
-            <a:endParaRPr lang="en-US"/>
           </a:p>
         </p:txBody>
       </p:sp>
@@ -1727,7 +1711,7 @@
           <a:p>
             <a:fld id="{28BE630F-C39C-4DB9-8258-0B48CA067079}" type="datetimeFigureOut">
               <a:rPr lang="en-US" smtClean="0"/>
-              <a:t>11/25/2021</a:t>
+              <a:t>11/27/2021</a:t>
             </a:fld>
             <a:endParaRPr lang="en-US"/>
           </a:p>
@@ -1822,7 +1806,7 @@
           <a:p>
             <a:fld id="{28BE630F-C39C-4DB9-8258-0B48CA067079}" type="datetimeFigureOut">
               <a:rPr lang="en-US" smtClean="0"/>
-              <a:t>11/25/2021</a:t>
+              <a:t>11/27/2021</a:t>
             </a:fld>
             <a:endParaRPr lang="en-US"/>
           </a:p>
@@ -1925,10 +1909,9 @@
           </a:lstStyle>
           <a:p>
             <a:r>
-              <a:rPr lang="en-US" smtClean="0"/>
+              <a:rPr lang="en-US"/>
               <a:t>Click to edit Master title style</a:t>
             </a:r>
-            <a:endParaRPr lang="en-US"/>
           </a:p>
         </p:txBody>
       </p:sp>
@@ -1982,38 +1965,37 @@
           <a:p>
             <a:pPr lvl="0"/>
             <a:r>
-              <a:rPr lang="en-US" smtClean="0"/>
+              <a:rPr lang="en-US"/>
               <a:t>Click to edit Master text styles</a:t>
             </a:r>
           </a:p>
           <a:p>
             <a:pPr lvl="1"/>
             <a:r>
-              <a:rPr lang="en-US" smtClean="0"/>
+              <a:rPr lang="en-US"/>
               <a:t>Second level</a:t>
             </a:r>
           </a:p>
           <a:p>
             <a:pPr lvl="2"/>
             <a:r>
-              <a:rPr lang="en-US" smtClean="0"/>
+              <a:rPr lang="en-US"/>
               <a:t>Third level</a:t>
             </a:r>
           </a:p>
           <a:p>
             <a:pPr lvl="3"/>
             <a:r>
-              <a:rPr lang="en-US" smtClean="0"/>
+              <a:rPr lang="en-US"/>
               <a:t>Fourth level</a:t>
             </a:r>
           </a:p>
           <a:p>
             <a:pPr lvl="4"/>
             <a:r>
-              <a:rPr lang="en-US" smtClean="0"/>
+              <a:rPr lang="en-US"/>
               <a:t>Fifth level</a:t>
             </a:r>
-            <a:endParaRPr lang="en-US"/>
           </a:p>
         </p:txBody>
       </p:sp>
@@ -2076,7 +2058,7 @@
           <a:p>
             <a:pPr lvl="0"/>
             <a:r>
-              <a:rPr lang="en-US" smtClean="0"/>
+              <a:rPr lang="en-US"/>
               <a:t>Click to edit Master text styles</a:t>
             </a:r>
           </a:p>
@@ -2099,7 +2081,7 @@
           <a:p>
             <a:fld id="{28BE630F-C39C-4DB9-8258-0B48CA067079}" type="datetimeFigureOut">
               <a:rPr lang="en-US" smtClean="0"/>
-              <a:t>11/25/2021</a:t>
+              <a:t>11/27/2021</a:t>
             </a:fld>
             <a:endParaRPr lang="en-US"/>
           </a:p>
@@ -2202,10 +2184,9 @@
           </a:lstStyle>
           <a:p>
             <a:r>
-              <a:rPr lang="en-US" smtClean="0"/>
+              <a:rPr lang="en-US"/>
               <a:t>Click to edit Master title style</a:t>
             </a:r>
-            <a:endParaRPr lang="en-US"/>
           </a:p>
         </p:txBody>
       </p:sp>
@@ -2329,7 +2310,7 @@
           <a:p>
             <a:pPr lvl="0"/>
             <a:r>
-              <a:rPr lang="en-US" smtClean="0"/>
+              <a:rPr lang="en-US"/>
               <a:t>Click to edit Master text styles</a:t>
             </a:r>
           </a:p>
@@ -2352,7 +2333,7 @@
           <a:p>
             <a:fld id="{28BE630F-C39C-4DB9-8258-0B48CA067079}" type="datetimeFigureOut">
               <a:rPr lang="en-US" smtClean="0"/>
-              <a:t>11/25/2021</a:t>
+              <a:t>11/27/2021</a:t>
             </a:fld>
             <a:endParaRPr lang="en-US"/>
           </a:p>
@@ -2461,10 +2442,9 @@
           <a:lstStyle/>
           <a:p>
             <a:r>
-              <a:rPr lang="en-US" smtClean="0"/>
+              <a:rPr lang="en-US"/>
               <a:t>Click to edit Master title style</a:t>
             </a:r>
-            <a:endParaRPr lang="en-US"/>
           </a:p>
         </p:txBody>
       </p:sp>
@@ -2495,38 +2475,37 @@
           <a:p>
             <a:pPr lvl="0"/>
             <a:r>
-              <a:rPr lang="en-US" smtClean="0"/>
+              <a:rPr lang="en-US"/>
               <a:t>Click to edit Master text styles</a:t>
             </a:r>
           </a:p>
           <a:p>
             <a:pPr lvl="1"/>
             <a:r>
-              <a:rPr lang="en-US" smtClean="0"/>
+              <a:rPr lang="en-US"/>
               <a:t>Second level</a:t>
             </a:r>
           </a:p>
           <a:p>
             <a:pPr lvl="2"/>
             <a:r>
-              <a:rPr lang="en-US" smtClean="0"/>
+              <a:rPr lang="en-US"/>
               <a:t>Third level</a:t>
             </a:r>
           </a:p>
           <a:p>
             <a:pPr lvl="3"/>
             <a:r>
-              <a:rPr lang="en-US" smtClean="0"/>
+              <a:rPr lang="en-US"/>
               <a:t>Fourth level</a:t>
             </a:r>
           </a:p>
           <a:p>
             <a:pPr lvl="4"/>
             <a:r>
-              <a:rPr lang="en-US" smtClean="0"/>
+              <a:rPr lang="en-US"/>
               <a:t>Fifth level</a:t>
             </a:r>
-            <a:endParaRPr lang="en-US"/>
           </a:p>
         </p:txBody>
       </p:sp>
@@ -2565,7 +2544,7 @@
           <a:p>
             <a:fld id="{28BE630F-C39C-4DB9-8258-0B48CA067079}" type="datetimeFigureOut">
               <a:rPr lang="en-US" smtClean="0"/>
-              <a:t>11/25/2021</a:t>
+              <a:t>11/27/2021</a:t>
             </a:fld>
             <a:endParaRPr lang="en-US"/>
           </a:p>
@@ -3004,12 +2983,8 @@
           </a:lstStyle>
           <a:p>
             <a:r>
-              <a:rPr lang="en-US" dirty="0" smtClean="0"/>
-              <a:t>ER DIAGRAMM </a:t>
-            </a:r>
-            <a:r>
               <a:rPr lang="en-US" dirty="0"/>
-              <a:t>TEMPLATE</a:t>
+              <a:t>ER DIAGRAMM TEMPLATE</a:t>
             </a:r>
           </a:p>
         </p:txBody>
@@ -3229,436 +3204,623 @@
           <a:chExt cx="0" cy="0"/>
         </a:xfrm>
       </p:grpSpPr>
-      <p:sp>
-        <p:nvSpPr>
-          <p:cNvPr id="51" name="Rectangle 50"/>
-          <p:cNvSpPr/>
-          <p:nvPr/>
-        </p:nvSpPr>
-        <p:spPr>
-          <a:xfrm>
-            <a:off x="635970" y="224804"/>
-            <a:ext cx="1803043" cy="2428643"/>
-          </a:xfrm>
-          <a:prstGeom prst="rect">
-            <a:avLst/>
-          </a:prstGeom>
-        </p:spPr>
-        <p:style>
-          <a:lnRef idx="2">
-            <a:schemeClr val="dk1"/>
-          </a:lnRef>
-          <a:fillRef idx="1">
-            <a:schemeClr val="lt1"/>
-          </a:fillRef>
-          <a:effectRef idx="0">
-            <a:schemeClr val="dk1"/>
-          </a:effectRef>
-          <a:fontRef idx="minor">
-            <a:schemeClr val="dk1"/>
-          </a:fontRef>
-        </p:style>
-        <p:txBody>
-          <a:bodyPr rtlCol="0" anchor="ctr"/>
-          <a:lstStyle/>
-          <a:p>
-            <a:pPr algn="ctr"/>
-            <a:endParaRPr lang="en-US"/>
-          </a:p>
-        </p:txBody>
-      </p:sp>
-      <p:sp>
-        <p:nvSpPr>
-          <p:cNvPr id="52" name="TextBox 51"/>
-          <p:cNvSpPr txBox="1"/>
-          <p:nvPr/>
-        </p:nvSpPr>
-        <p:spPr>
-          <a:xfrm>
-            <a:off x="1117343" y="314958"/>
-            <a:ext cx="633507" cy="369332"/>
-          </a:xfrm>
-          <a:prstGeom prst="rect">
-            <a:avLst/>
-          </a:prstGeom>
-          <a:noFill/>
-        </p:spPr>
-        <p:txBody>
-          <a:bodyPr wrap="none" rtlCol="0">
-            <a:spAutoFit/>
-          </a:bodyPr>
-          <a:lstStyle/>
-          <a:p>
-            <a:r>
-              <a:rPr lang="en-US" b="1" dirty="0" smtClean="0"/>
-              <a:t>class</a:t>
-            </a:r>
-            <a:endParaRPr lang="en-US" b="1" dirty="0"/>
-          </a:p>
-        </p:txBody>
-      </p:sp>
-      <p:sp>
-        <p:nvSpPr>
-          <p:cNvPr id="53" name="Rectangle 52"/>
-          <p:cNvSpPr/>
-          <p:nvPr/>
-        </p:nvSpPr>
-        <p:spPr>
-          <a:xfrm>
-            <a:off x="3301896" y="224804"/>
-            <a:ext cx="1803043" cy="2428643"/>
-          </a:xfrm>
-          <a:prstGeom prst="rect">
-            <a:avLst/>
-          </a:prstGeom>
-        </p:spPr>
-        <p:style>
-          <a:lnRef idx="2">
-            <a:schemeClr val="dk1"/>
-          </a:lnRef>
-          <a:fillRef idx="1">
-            <a:schemeClr val="lt1"/>
-          </a:fillRef>
-          <a:effectRef idx="0">
-            <a:schemeClr val="dk1"/>
-          </a:effectRef>
-          <a:fontRef idx="minor">
-            <a:schemeClr val="dk1"/>
-          </a:fontRef>
-        </p:style>
-        <p:txBody>
-          <a:bodyPr rtlCol="0" anchor="ctr"/>
-          <a:lstStyle/>
-          <a:p>
-            <a:pPr algn="ctr"/>
-            <a:endParaRPr lang="en-US"/>
-          </a:p>
-        </p:txBody>
-      </p:sp>
-      <p:sp>
-        <p:nvSpPr>
-          <p:cNvPr id="54" name="TextBox 53"/>
-          <p:cNvSpPr txBox="1"/>
-          <p:nvPr/>
-        </p:nvSpPr>
-        <p:spPr>
-          <a:xfrm>
-            <a:off x="3783269" y="314958"/>
-            <a:ext cx="917367" cy="369332"/>
-          </a:xfrm>
-          <a:prstGeom prst="rect">
-            <a:avLst/>
-          </a:prstGeom>
-          <a:noFill/>
-        </p:spPr>
-        <p:txBody>
-          <a:bodyPr wrap="none" rtlCol="0">
-            <a:spAutoFit/>
-          </a:bodyPr>
-          <a:lstStyle/>
-          <a:p>
-            <a:r>
-              <a:rPr lang="en-US" b="1" dirty="0" smtClean="0"/>
-              <a:t>student</a:t>
-            </a:r>
-            <a:endParaRPr lang="en-US" b="1" dirty="0"/>
-          </a:p>
-        </p:txBody>
-      </p:sp>
-      <p:sp>
-        <p:nvSpPr>
-          <p:cNvPr id="55" name="Rectangle 54"/>
-          <p:cNvSpPr/>
-          <p:nvPr/>
-        </p:nvSpPr>
-        <p:spPr>
-          <a:xfrm>
-            <a:off x="5967822" y="224804"/>
-            <a:ext cx="1803043" cy="2428643"/>
-          </a:xfrm>
-          <a:prstGeom prst="rect">
-            <a:avLst/>
-          </a:prstGeom>
-        </p:spPr>
-        <p:style>
-          <a:lnRef idx="2">
-            <a:schemeClr val="dk1"/>
-          </a:lnRef>
-          <a:fillRef idx="1">
-            <a:schemeClr val="lt1"/>
-          </a:fillRef>
-          <a:effectRef idx="0">
-            <a:schemeClr val="dk1"/>
-          </a:effectRef>
-          <a:fontRef idx="minor">
-            <a:schemeClr val="dk1"/>
-          </a:fontRef>
-        </p:style>
-        <p:txBody>
-          <a:bodyPr rtlCol="0" anchor="ctr"/>
-          <a:lstStyle/>
-          <a:p>
-            <a:pPr algn="ctr"/>
-            <a:endParaRPr lang="en-US"/>
-          </a:p>
-        </p:txBody>
-      </p:sp>
-      <p:sp>
-        <p:nvSpPr>
-          <p:cNvPr id="56" name="TextBox 55"/>
-          <p:cNvSpPr txBox="1"/>
-          <p:nvPr/>
-        </p:nvSpPr>
-        <p:spPr>
-          <a:xfrm>
-            <a:off x="6209194" y="314959"/>
-            <a:ext cx="1320298" cy="369332"/>
-          </a:xfrm>
-          <a:prstGeom prst="rect">
-            <a:avLst/>
-          </a:prstGeom>
-          <a:noFill/>
-        </p:spPr>
-        <p:txBody>
-          <a:bodyPr wrap="none" rtlCol="0">
-            <a:spAutoFit/>
-          </a:bodyPr>
-          <a:lstStyle/>
-          <a:p>
-            <a:r>
-              <a:rPr lang="en-US" b="1" dirty="0" smtClean="0"/>
-              <a:t>exam_score</a:t>
-            </a:r>
-            <a:endParaRPr lang="en-US" b="1" dirty="0"/>
-          </a:p>
-        </p:txBody>
-      </p:sp>
-      <p:sp>
-        <p:nvSpPr>
-          <p:cNvPr id="57" name="Rectangle 56"/>
-          <p:cNvSpPr/>
-          <p:nvPr/>
-        </p:nvSpPr>
-        <p:spPr>
-          <a:xfrm>
-            <a:off x="9251935" y="224803"/>
-            <a:ext cx="1803043" cy="2428643"/>
-          </a:xfrm>
-          <a:prstGeom prst="rect">
-            <a:avLst/>
-          </a:prstGeom>
-        </p:spPr>
-        <p:style>
-          <a:lnRef idx="2">
-            <a:schemeClr val="dk1"/>
-          </a:lnRef>
-          <a:fillRef idx="1">
-            <a:schemeClr val="lt1"/>
-          </a:fillRef>
-          <a:effectRef idx="0">
-            <a:schemeClr val="dk1"/>
-          </a:effectRef>
-          <a:fontRef idx="minor">
-            <a:schemeClr val="dk1"/>
-          </a:fontRef>
-        </p:style>
-        <p:txBody>
-          <a:bodyPr rtlCol="0" anchor="ctr"/>
-          <a:lstStyle/>
-          <a:p>
-            <a:pPr algn="ctr"/>
-            <a:endParaRPr lang="en-US"/>
-          </a:p>
-        </p:txBody>
-      </p:sp>
-      <p:sp>
-        <p:nvSpPr>
-          <p:cNvPr id="58" name="TextBox 57"/>
-          <p:cNvSpPr txBox="1"/>
-          <p:nvPr/>
-        </p:nvSpPr>
-        <p:spPr>
-          <a:xfrm>
-            <a:off x="9493307" y="314958"/>
-            <a:ext cx="1243482" cy="369332"/>
-          </a:xfrm>
-          <a:prstGeom prst="rect">
-            <a:avLst/>
-          </a:prstGeom>
-          <a:noFill/>
-        </p:spPr>
-        <p:txBody>
-          <a:bodyPr wrap="none" rtlCol="0">
-            <a:spAutoFit/>
-          </a:bodyPr>
-          <a:lstStyle/>
-          <a:p>
-            <a:r>
-              <a:rPr lang="en-US" b="1" dirty="0" smtClean="0"/>
-              <a:t>exam_type</a:t>
-            </a:r>
-            <a:endParaRPr lang="en-US" b="1" dirty="0"/>
-          </a:p>
-        </p:txBody>
-      </p:sp>
-      <p:sp>
-        <p:nvSpPr>
-          <p:cNvPr id="59" name="Rectangle 58"/>
-          <p:cNvSpPr/>
-          <p:nvPr/>
-        </p:nvSpPr>
-        <p:spPr>
-          <a:xfrm>
-            <a:off x="5980354" y="4186801"/>
-            <a:ext cx="1803043" cy="2009105"/>
-          </a:xfrm>
-          <a:prstGeom prst="rect">
-            <a:avLst/>
-          </a:prstGeom>
-        </p:spPr>
-        <p:style>
-          <a:lnRef idx="2">
-            <a:schemeClr val="dk1"/>
-          </a:lnRef>
-          <a:fillRef idx="1">
-            <a:schemeClr val="lt1"/>
-          </a:fillRef>
-          <a:effectRef idx="0">
-            <a:schemeClr val="dk1"/>
-          </a:effectRef>
-          <a:fontRef idx="minor">
-            <a:schemeClr val="dk1"/>
-          </a:fontRef>
-        </p:style>
-        <p:txBody>
-          <a:bodyPr rtlCol="0" anchor="ctr"/>
-          <a:lstStyle/>
-          <a:p>
-            <a:pPr algn="ctr"/>
-            <a:endParaRPr lang="en-US"/>
-          </a:p>
-        </p:txBody>
-      </p:sp>
-      <p:sp>
-        <p:nvSpPr>
-          <p:cNvPr id="60" name="TextBox 59"/>
-          <p:cNvSpPr txBox="1"/>
-          <p:nvPr/>
-        </p:nvSpPr>
-        <p:spPr>
-          <a:xfrm>
-            <a:off x="6506612" y="4223154"/>
-            <a:ext cx="661720" cy="369332"/>
-          </a:xfrm>
-          <a:prstGeom prst="rect">
-            <a:avLst/>
-          </a:prstGeom>
-          <a:noFill/>
-        </p:spPr>
-        <p:txBody>
-          <a:bodyPr wrap="none" rtlCol="0">
-            <a:spAutoFit/>
-          </a:bodyPr>
-          <a:lstStyle/>
-          <a:p>
-            <a:r>
-              <a:rPr lang="en-US" b="1" dirty="0" smtClean="0"/>
-              <a:t>topic</a:t>
-            </a:r>
-            <a:endParaRPr lang="en-US" b="1" dirty="0"/>
-          </a:p>
-        </p:txBody>
-      </p:sp>
-      <p:sp>
-        <p:nvSpPr>
-          <p:cNvPr id="61" name="Rectangle 60"/>
-          <p:cNvSpPr/>
-          <p:nvPr/>
-        </p:nvSpPr>
-        <p:spPr>
-          <a:xfrm>
-            <a:off x="630766" y="4186801"/>
-            <a:ext cx="1803043" cy="2009105"/>
-          </a:xfrm>
-          <a:prstGeom prst="rect">
-            <a:avLst/>
-          </a:prstGeom>
-        </p:spPr>
-        <p:style>
-          <a:lnRef idx="2">
-            <a:schemeClr val="dk1"/>
-          </a:lnRef>
-          <a:fillRef idx="1">
-            <a:schemeClr val="lt1"/>
-          </a:fillRef>
-          <a:effectRef idx="0">
-            <a:schemeClr val="dk1"/>
-          </a:effectRef>
-          <a:fontRef idx="minor">
-            <a:schemeClr val="dk1"/>
-          </a:fontRef>
-        </p:style>
-        <p:txBody>
-          <a:bodyPr rtlCol="0" anchor="ctr"/>
-          <a:lstStyle/>
-          <a:p>
-            <a:pPr algn="ctr"/>
-            <a:endParaRPr lang="en-US"/>
-          </a:p>
-        </p:txBody>
-      </p:sp>
-      <p:sp>
-        <p:nvSpPr>
-          <p:cNvPr id="62" name="TextBox 61"/>
-          <p:cNvSpPr txBox="1"/>
-          <p:nvPr/>
-        </p:nvSpPr>
-        <p:spPr>
-          <a:xfrm>
-            <a:off x="1174014" y="4289834"/>
-            <a:ext cx="716543" cy="369332"/>
-          </a:xfrm>
-          <a:prstGeom prst="rect">
-            <a:avLst/>
-          </a:prstGeom>
-          <a:noFill/>
-        </p:spPr>
-        <p:txBody>
-          <a:bodyPr wrap="none" rtlCol="0">
-            <a:spAutoFit/>
-          </a:bodyPr>
-          <a:lstStyle/>
-          <a:p>
-            <a:r>
-              <a:rPr lang="en-US" b="1" dirty="0" smtClean="0"/>
-              <a:t>batch</a:t>
-            </a:r>
-            <a:endParaRPr lang="en-US" b="1" dirty="0"/>
-          </a:p>
-        </p:txBody>
-      </p:sp>
+      <p:graphicFrame>
+        <p:nvGraphicFramePr>
+          <p:cNvPr id="114" name="Table 5">
+            <a:extLst>
+              <a:ext uri="{FF2B5EF4-FFF2-40B4-BE49-F238E27FC236}">
+                <a16:creationId xmlns:a16="http://schemas.microsoft.com/office/drawing/2014/main" id="{19B83EBB-F479-46DE-BA55-5DFCFA3E9D5B}"/>
+              </a:ext>
+            </a:extLst>
+          </p:cNvPr>
+          <p:cNvGraphicFramePr>
+            <a:graphicFrameLocks noGrp="1"/>
+          </p:cNvGraphicFramePr>
+          <p:nvPr>
+            <p:extLst>
+              <p:ext uri="{D42A27DB-BD31-4B8C-83A1-F6EECF244321}">
+                <p14:modId xmlns:p14="http://schemas.microsoft.com/office/powerpoint/2010/main" val="629115299"/>
+              </p:ext>
+            </p:extLst>
+          </p:nvPr>
+        </p:nvGraphicFramePr>
+        <p:xfrm>
+          <a:off x="4542456" y="4636245"/>
+          <a:ext cx="2871304" cy="2221755"/>
+        </p:xfrm>
+        <a:graphic>
+          <a:graphicData uri="http://schemas.openxmlformats.org/drawingml/2006/table">
+            <a:tbl>
+              <a:tblPr firstRow="1" bandRow="1">
+                <a:tableStyleId>{5C22544A-7EE6-4342-B048-85BDC9FD1C3A}</a:tableStyleId>
+              </a:tblPr>
+              <a:tblGrid>
+                <a:gridCol w="485913">
+                  <a:extLst>
+                    <a:ext uri="{9D8B030D-6E8A-4147-A177-3AD203B41FA5}">
+                      <a16:colId xmlns:a16="http://schemas.microsoft.com/office/drawing/2014/main" val="885829964"/>
+                    </a:ext>
+                  </a:extLst>
+                </a:gridCol>
+                <a:gridCol w="2385391">
+                  <a:extLst>
+                    <a:ext uri="{9D8B030D-6E8A-4147-A177-3AD203B41FA5}">
+                      <a16:colId xmlns:a16="http://schemas.microsoft.com/office/drawing/2014/main" val="3479576876"/>
+                    </a:ext>
+                  </a:extLst>
+                </a:gridCol>
+              </a:tblGrid>
+              <a:tr h="484395">
+                <a:tc gridSpan="2">
+                  <a:txBody>
+                    <a:bodyPr/>
+                    <a:lstStyle/>
+                    <a:p>
+                      <a:pPr algn="ctr"/>
+                      <a:r>
+                        <a:rPr lang="en-US" dirty="0"/>
+                        <a:t>User</a:t>
+                      </a:r>
+                    </a:p>
+                  </a:txBody>
+                  <a:tcPr/>
+                </a:tc>
+                <a:tc hMerge="1">
+                  <a:txBody>
+                    <a:bodyPr/>
+                    <a:lstStyle/>
+                    <a:p>
+                      <a:endParaRPr lang="en-US" dirty="0"/>
+                    </a:p>
+                  </a:txBody>
+                  <a:tcPr/>
+                </a:tc>
+                <a:extLst>
+                  <a:ext uri="{0D108BD9-81ED-4DB2-BD59-A6C34878D82A}">
+                    <a16:rowId xmlns:a16="http://schemas.microsoft.com/office/drawing/2014/main" val="290390624"/>
+                  </a:ext>
+                </a:extLst>
+              </a:tr>
+              <a:tr h="1614751">
+                <a:tc>
+                  <a:txBody>
+                    <a:bodyPr/>
+                    <a:lstStyle/>
+                    <a:p>
+                      <a:r>
+                        <a:rPr lang="en-US" sz="1600" dirty="0"/>
+                        <a:t>PK</a:t>
+                      </a:r>
+                    </a:p>
+                  </a:txBody>
+                  <a:tcPr/>
+                </a:tc>
+                <a:tc>
+                  <a:txBody>
+                    <a:bodyPr/>
+                    <a:lstStyle/>
+                    <a:p>
+                      <a:r>
+                        <a:rPr lang="en-US" dirty="0" err="1"/>
+                        <a:t>userId</a:t>
+                      </a:r>
+                      <a:r>
+                        <a:rPr lang="en-US" dirty="0"/>
+                        <a:t>: int()</a:t>
+                      </a:r>
+                    </a:p>
+                    <a:p>
+                      <a:r>
+                        <a:rPr lang="en-US" dirty="0" err="1"/>
+                        <a:t>userName</a:t>
+                      </a:r>
+                      <a:r>
+                        <a:rPr lang="en-US" dirty="0"/>
+                        <a:t>: varchar(40)</a:t>
+                      </a:r>
+                    </a:p>
+                    <a:p>
+                      <a:r>
+                        <a:rPr lang="en-US" dirty="0"/>
+                        <a:t>Email: varchar(100)</a:t>
+                      </a:r>
+                    </a:p>
+                    <a:p>
+                      <a:r>
+                        <a:rPr lang="en-US" dirty="0"/>
+                        <a:t>Password: varchar(50)</a:t>
+                      </a:r>
+                    </a:p>
+                    <a:p>
+                      <a:r>
+                        <a:rPr lang="en-US" dirty="0"/>
+                        <a:t>Role: varchar(40)</a:t>
+                      </a:r>
+                    </a:p>
+                    <a:p>
+                      <a:r>
+                        <a:rPr lang="en-US" dirty="0"/>
+                        <a:t>Profile: varchar(200)</a:t>
+                      </a:r>
+                    </a:p>
+                  </a:txBody>
+                  <a:tcPr/>
+                </a:tc>
+                <a:extLst>
+                  <a:ext uri="{0D108BD9-81ED-4DB2-BD59-A6C34878D82A}">
+                    <a16:rowId xmlns:a16="http://schemas.microsoft.com/office/drawing/2014/main" val="553212164"/>
+                  </a:ext>
+                </a:extLst>
+              </a:tr>
+            </a:tbl>
+          </a:graphicData>
+        </a:graphic>
+      </p:graphicFrame>
+      <p:graphicFrame>
+        <p:nvGraphicFramePr>
+          <p:cNvPr id="115" name="Table 114">
+            <a:extLst>
+              <a:ext uri="{FF2B5EF4-FFF2-40B4-BE49-F238E27FC236}">
+                <a16:creationId xmlns:a16="http://schemas.microsoft.com/office/drawing/2014/main" id="{21EC6D8D-3F74-46BA-8551-FBC8C09D19DA}"/>
+              </a:ext>
+            </a:extLst>
+          </p:cNvPr>
+          <p:cNvGraphicFramePr>
+            <a:graphicFrameLocks noGrp="1"/>
+          </p:cNvGraphicFramePr>
+          <p:nvPr>
+            <p:extLst>
+              <p:ext uri="{D42A27DB-BD31-4B8C-83A1-F6EECF244321}">
+                <p14:modId xmlns:p14="http://schemas.microsoft.com/office/powerpoint/2010/main" val="1749973673"/>
+              </p:ext>
+            </p:extLst>
+          </p:nvPr>
+        </p:nvGraphicFramePr>
+        <p:xfrm>
+          <a:off x="4531139" y="111979"/>
+          <a:ext cx="3129722" cy="2455629"/>
+        </p:xfrm>
+        <a:graphic>
+          <a:graphicData uri="http://schemas.openxmlformats.org/drawingml/2006/table">
+            <a:tbl>
+              <a:tblPr firstRow="1" bandRow="1">
+                <a:tableStyleId>{5C22544A-7EE6-4342-B048-85BDC9FD1C3A}</a:tableStyleId>
+              </a:tblPr>
+              <a:tblGrid>
+                <a:gridCol w="529645">
+                  <a:extLst>
+                    <a:ext uri="{9D8B030D-6E8A-4147-A177-3AD203B41FA5}">
+                      <a16:colId xmlns:a16="http://schemas.microsoft.com/office/drawing/2014/main" val="885829964"/>
+                    </a:ext>
+                  </a:extLst>
+                </a:gridCol>
+                <a:gridCol w="2600077">
+                  <a:extLst>
+                    <a:ext uri="{9D8B030D-6E8A-4147-A177-3AD203B41FA5}">
+                      <a16:colId xmlns:a16="http://schemas.microsoft.com/office/drawing/2014/main" val="3479576876"/>
+                    </a:ext>
+                  </a:extLst>
+                </a:gridCol>
+              </a:tblGrid>
+              <a:tr h="443949">
+                <a:tc gridSpan="2">
+                  <a:txBody>
+                    <a:bodyPr/>
+                    <a:lstStyle/>
+                    <a:p>
+                      <a:pPr algn="ctr"/>
+                      <a:r>
+                        <a:rPr lang="en-US" dirty="0"/>
+                        <a:t>Event</a:t>
+                      </a:r>
+                    </a:p>
+                  </a:txBody>
+                  <a:tcPr/>
+                </a:tc>
+                <a:tc hMerge="1">
+                  <a:txBody>
+                    <a:bodyPr/>
+                    <a:lstStyle/>
+                    <a:p>
+                      <a:endParaRPr lang="en-US" dirty="0"/>
+                    </a:p>
+                  </a:txBody>
+                  <a:tcPr/>
+                </a:tc>
+                <a:extLst>
+                  <a:ext uri="{0D108BD9-81ED-4DB2-BD59-A6C34878D82A}">
+                    <a16:rowId xmlns:a16="http://schemas.microsoft.com/office/drawing/2014/main" val="290390624"/>
+                  </a:ext>
+                </a:extLst>
+              </a:tr>
+              <a:tr h="1614751">
+                <a:tc>
+                  <a:txBody>
+                    <a:bodyPr/>
+                    <a:lstStyle/>
+                    <a:p>
+                      <a:r>
+                        <a:rPr lang="en-US" sz="1600" dirty="0"/>
+                        <a:t>PK</a:t>
+                      </a:r>
+                    </a:p>
+                    <a:p>
+                      <a:endParaRPr lang="en-US" dirty="0"/>
+                    </a:p>
+                    <a:p>
+                      <a:endParaRPr lang="en-US" dirty="0"/>
+                    </a:p>
+                    <a:p>
+                      <a:endParaRPr lang="en-US" dirty="0"/>
+                    </a:p>
+                    <a:p>
+                      <a:endParaRPr lang="en-US" dirty="0"/>
+                    </a:p>
+                    <a:p>
+                      <a:endParaRPr lang="en-US" dirty="0"/>
+                    </a:p>
+                    <a:p>
+                      <a:r>
+                        <a:rPr lang="en-US" sz="1600" dirty="0"/>
+                        <a:t>FK</a:t>
+                      </a:r>
+                    </a:p>
+                  </a:txBody>
+                  <a:tcPr/>
+                </a:tc>
+                <a:tc>
+                  <a:txBody>
+                    <a:bodyPr/>
+                    <a:lstStyle/>
+                    <a:p>
+                      <a:r>
+                        <a:rPr lang="en-US" dirty="0" err="1"/>
+                        <a:t>eventId</a:t>
+                      </a:r>
+                      <a:r>
+                        <a:rPr lang="en-US" dirty="0"/>
+                        <a:t>: int()</a:t>
+                      </a:r>
+                    </a:p>
+                    <a:p>
+                      <a:r>
+                        <a:rPr lang="en-US" dirty="0"/>
+                        <a:t>title: varchar(60)</a:t>
+                      </a:r>
+                    </a:p>
+                    <a:p>
+                      <a:r>
+                        <a:rPr lang="en-US" dirty="0"/>
+                        <a:t>date: date</a:t>
+                      </a:r>
+                    </a:p>
+                    <a:p>
+                      <a:r>
+                        <a:rPr lang="en-US" dirty="0"/>
+                        <a:t>description: varchar(100)</a:t>
+                      </a:r>
+                    </a:p>
+                    <a:p>
+                      <a:r>
+                        <a:rPr lang="en-US" dirty="0"/>
+                        <a:t>image: text()</a:t>
+                      </a:r>
+                    </a:p>
+                    <a:p>
+                      <a:r>
+                        <a:rPr lang="en-US" dirty="0"/>
+                        <a:t>interest: number()</a:t>
+                      </a:r>
+                    </a:p>
+                    <a:p>
+                      <a:r>
+                        <a:rPr lang="en-US" dirty="0" err="1"/>
+                        <a:t>categoryId</a:t>
+                      </a:r>
+                      <a:r>
+                        <a:rPr lang="en-US" dirty="0"/>
+                        <a:t>: int()</a:t>
+                      </a:r>
+                    </a:p>
+                  </a:txBody>
+                  <a:tcPr/>
+                </a:tc>
+                <a:extLst>
+                  <a:ext uri="{0D108BD9-81ED-4DB2-BD59-A6C34878D82A}">
+                    <a16:rowId xmlns:a16="http://schemas.microsoft.com/office/drawing/2014/main" val="553212164"/>
+                  </a:ext>
+                </a:extLst>
+              </a:tr>
+            </a:tbl>
+          </a:graphicData>
+        </a:graphic>
+      </p:graphicFrame>
+      <p:graphicFrame>
+        <p:nvGraphicFramePr>
+          <p:cNvPr id="116" name="Table 115">
+            <a:extLst>
+              <a:ext uri="{FF2B5EF4-FFF2-40B4-BE49-F238E27FC236}">
+                <a16:creationId xmlns:a16="http://schemas.microsoft.com/office/drawing/2014/main" id="{7955E64D-C7AF-45CF-B7DB-52BA88BEED16}"/>
+              </a:ext>
+            </a:extLst>
+          </p:cNvPr>
+          <p:cNvGraphicFramePr>
+            <a:graphicFrameLocks noGrp="1"/>
+          </p:cNvGraphicFramePr>
+          <p:nvPr>
+            <p:extLst>
+              <p:ext uri="{D42A27DB-BD31-4B8C-83A1-F6EECF244321}">
+                <p14:modId xmlns:p14="http://schemas.microsoft.com/office/powerpoint/2010/main" val="3598712122"/>
+              </p:ext>
+            </p:extLst>
+          </p:nvPr>
+        </p:nvGraphicFramePr>
+        <p:xfrm>
+          <a:off x="8379785" y="3429000"/>
+          <a:ext cx="3282120" cy="1005840"/>
+        </p:xfrm>
+        <a:graphic>
+          <a:graphicData uri="http://schemas.openxmlformats.org/drawingml/2006/table">
+            <a:tbl>
+              <a:tblPr firstRow="1" bandRow="1">
+                <a:tableStyleId>{5C22544A-7EE6-4342-B048-85BDC9FD1C3A}</a:tableStyleId>
+              </a:tblPr>
+              <a:tblGrid>
+                <a:gridCol w="555435">
+                  <a:extLst>
+                    <a:ext uri="{9D8B030D-6E8A-4147-A177-3AD203B41FA5}">
+                      <a16:colId xmlns:a16="http://schemas.microsoft.com/office/drawing/2014/main" val="885829964"/>
+                    </a:ext>
+                  </a:extLst>
+                </a:gridCol>
+                <a:gridCol w="2726685">
+                  <a:extLst>
+                    <a:ext uri="{9D8B030D-6E8A-4147-A177-3AD203B41FA5}">
+                      <a16:colId xmlns:a16="http://schemas.microsoft.com/office/drawing/2014/main" val="3479576876"/>
+                    </a:ext>
+                  </a:extLst>
+                </a:gridCol>
+              </a:tblGrid>
+              <a:tr h="173397">
+                <a:tc gridSpan="2">
+                  <a:txBody>
+                    <a:bodyPr/>
+                    <a:lstStyle/>
+                    <a:p>
+                      <a:pPr algn="ctr"/>
+                      <a:r>
+                        <a:rPr lang="en-US" dirty="0"/>
+                        <a:t>Category</a:t>
+                      </a:r>
+                    </a:p>
+                  </a:txBody>
+                  <a:tcPr/>
+                </a:tc>
+                <a:tc hMerge="1">
+                  <a:txBody>
+                    <a:bodyPr/>
+                    <a:lstStyle/>
+                    <a:p>
+                      <a:endParaRPr lang="en-US" dirty="0"/>
+                    </a:p>
+                  </a:txBody>
+                  <a:tcPr/>
+                </a:tc>
+                <a:extLst>
+                  <a:ext uri="{0D108BD9-81ED-4DB2-BD59-A6C34878D82A}">
+                    <a16:rowId xmlns:a16="http://schemas.microsoft.com/office/drawing/2014/main" val="290390624"/>
+                  </a:ext>
+                </a:extLst>
+              </a:tr>
+              <a:tr h="320247">
+                <a:tc>
+                  <a:txBody>
+                    <a:bodyPr/>
+                    <a:lstStyle/>
+                    <a:p>
+                      <a:r>
+                        <a:rPr lang="en-US" sz="1600" dirty="0"/>
+                        <a:t>PK</a:t>
+                      </a:r>
+                    </a:p>
+                  </a:txBody>
+                  <a:tcPr/>
+                </a:tc>
+                <a:tc>
+                  <a:txBody>
+                    <a:bodyPr/>
+                    <a:lstStyle/>
+                    <a:p>
+                      <a:r>
+                        <a:rPr lang="en-US" dirty="0" err="1"/>
+                        <a:t>categoryId</a:t>
+                      </a:r>
+                      <a:r>
+                        <a:rPr lang="en-US" dirty="0"/>
+                        <a:t>: int()</a:t>
+                      </a:r>
+                    </a:p>
+                    <a:p>
+                      <a:r>
+                        <a:rPr lang="en-US" dirty="0" err="1"/>
+                        <a:t>categoryName</a:t>
+                      </a:r>
+                      <a:r>
+                        <a:rPr lang="en-US" dirty="0"/>
+                        <a:t>: varchar(50)</a:t>
+                      </a:r>
+                    </a:p>
+                  </a:txBody>
+                  <a:tcPr/>
+                </a:tc>
+                <a:extLst>
+                  <a:ext uri="{0D108BD9-81ED-4DB2-BD59-A6C34878D82A}">
+                    <a16:rowId xmlns:a16="http://schemas.microsoft.com/office/drawing/2014/main" val="553212164"/>
+                  </a:ext>
+                </a:extLst>
+              </a:tr>
+            </a:tbl>
+          </a:graphicData>
+        </a:graphic>
+      </p:graphicFrame>
+      <p:graphicFrame>
+        <p:nvGraphicFramePr>
+          <p:cNvPr id="117" name="Table 116">
+            <a:extLst>
+              <a:ext uri="{FF2B5EF4-FFF2-40B4-BE49-F238E27FC236}">
+                <a16:creationId xmlns:a16="http://schemas.microsoft.com/office/drawing/2014/main" id="{4E45729C-D021-4D29-8D2F-5AABA6C32ADC}"/>
+              </a:ext>
+            </a:extLst>
+          </p:cNvPr>
+          <p:cNvGraphicFramePr>
+            <a:graphicFrameLocks noGrp="1"/>
+          </p:cNvGraphicFramePr>
+          <p:nvPr>
+            <p:extLst>
+              <p:ext uri="{D42A27DB-BD31-4B8C-83A1-F6EECF244321}">
+                <p14:modId xmlns:p14="http://schemas.microsoft.com/office/powerpoint/2010/main" val="3426239289"/>
+              </p:ext>
+            </p:extLst>
+          </p:nvPr>
+        </p:nvGraphicFramePr>
+        <p:xfrm>
+          <a:off x="437329" y="2693506"/>
+          <a:ext cx="2502448" cy="1005840"/>
+        </p:xfrm>
+        <a:graphic>
+          <a:graphicData uri="http://schemas.openxmlformats.org/drawingml/2006/table">
+            <a:tbl>
+              <a:tblPr firstRow="1" bandRow="1">
+                <a:tableStyleId>{5C22544A-7EE6-4342-B048-85BDC9FD1C3A}</a:tableStyleId>
+              </a:tblPr>
+              <a:tblGrid>
+                <a:gridCol w="423491">
+                  <a:extLst>
+                    <a:ext uri="{9D8B030D-6E8A-4147-A177-3AD203B41FA5}">
+                      <a16:colId xmlns:a16="http://schemas.microsoft.com/office/drawing/2014/main" val="885829964"/>
+                    </a:ext>
+                  </a:extLst>
+                </a:gridCol>
+                <a:gridCol w="2078957">
+                  <a:extLst>
+                    <a:ext uri="{9D8B030D-6E8A-4147-A177-3AD203B41FA5}">
+                      <a16:colId xmlns:a16="http://schemas.microsoft.com/office/drawing/2014/main" val="3479576876"/>
+                    </a:ext>
+                  </a:extLst>
+                </a:gridCol>
+              </a:tblGrid>
+              <a:tr h="210502">
+                <a:tc gridSpan="2">
+                  <a:txBody>
+                    <a:bodyPr/>
+                    <a:lstStyle/>
+                    <a:p>
+                      <a:pPr algn="ctr"/>
+                      <a:r>
+                        <a:rPr lang="en-US" dirty="0" err="1"/>
+                        <a:t>User_event</a:t>
+                      </a:r>
+                      <a:endParaRPr lang="en-US" dirty="0"/>
+                    </a:p>
+                  </a:txBody>
+                  <a:tcPr/>
+                </a:tc>
+                <a:tc hMerge="1">
+                  <a:txBody>
+                    <a:bodyPr/>
+                    <a:lstStyle/>
+                    <a:p>
+                      <a:endParaRPr lang="en-US" dirty="0"/>
+                    </a:p>
+                  </a:txBody>
+                  <a:tcPr/>
+                </a:tc>
+                <a:extLst>
+                  <a:ext uri="{0D108BD9-81ED-4DB2-BD59-A6C34878D82A}">
+                    <a16:rowId xmlns:a16="http://schemas.microsoft.com/office/drawing/2014/main" val="290390624"/>
+                  </a:ext>
+                </a:extLst>
+              </a:tr>
+              <a:tr h="320247">
+                <a:tc>
+                  <a:txBody>
+                    <a:bodyPr/>
+                    <a:lstStyle/>
+                    <a:p>
+                      <a:r>
+                        <a:rPr lang="en-US" sz="1600" dirty="0"/>
+                        <a:t>FK</a:t>
+                      </a:r>
+                    </a:p>
+                    <a:p>
+                      <a:r>
+                        <a:rPr lang="en-US" sz="1600" dirty="0"/>
+                        <a:t>FK</a:t>
+                      </a:r>
+                    </a:p>
+                  </a:txBody>
+                  <a:tcPr/>
+                </a:tc>
+                <a:tc>
+                  <a:txBody>
+                    <a:bodyPr/>
+                    <a:lstStyle/>
+                    <a:p>
+                      <a:r>
+                        <a:rPr lang="en-US" dirty="0" err="1"/>
+                        <a:t>userId</a:t>
+                      </a:r>
+                      <a:r>
+                        <a:rPr lang="en-US" dirty="0"/>
+                        <a:t>: int()</a:t>
+                      </a:r>
+                    </a:p>
+                    <a:p>
+                      <a:r>
+                        <a:rPr lang="en-US" dirty="0" err="1"/>
+                        <a:t>eventide:int</a:t>
+                      </a:r>
+                      <a:r>
+                        <a:rPr lang="en-US" dirty="0"/>
+                        <a:t>()</a:t>
+                      </a:r>
+                    </a:p>
+                  </a:txBody>
+                  <a:tcPr/>
+                </a:tc>
+                <a:extLst>
+                  <a:ext uri="{0D108BD9-81ED-4DB2-BD59-A6C34878D82A}">
+                    <a16:rowId xmlns:a16="http://schemas.microsoft.com/office/drawing/2014/main" val="553212164"/>
+                  </a:ext>
+                </a:extLst>
+              </a:tr>
+            </a:tbl>
+          </a:graphicData>
+        </a:graphic>
+      </p:graphicFrame>
       <p:cxnSp>
         <p:nvCxnSpPr>
-          <p:cNvPr id="63" name="Straight Connector 62"/>
+          <p:cNvPr id="118" name="Straight Connector 117">
+            <a:extLst>
+              <a:ext uri="{FF2B5EF4-FFF2-40B4-BE49-F238E27FC236}">
+                <a16:creationId xmlns:a16="http://schemas.microsoft.com/office/drawing/2014/main" id="{B9D007B6-B6E6-44D2-B11A-306B06E3DD3B}"/>
+              </a:ext>
+            </a:extLst>
+          </p:cNvPr>
           <p:cNvCxnSpPr>
-            <a:stCxn id="55" idx="3"/>
-            <a:endCxn id="57" idx="1"/>
+            <a:cxnSpLocks/>
+            <a:stCxn id="117" idx="0"/>
           </p:cNvCxnSpPr>
           <p:nvPr/>
         </p:nvCxnSpPr>
         <p:spPr>
           <a:xfrm flipV="1">
-            <a:off x="7770865" y="1439125"/>
-            <a:ext cx="1481070" cy="1"/>
+            <a:off x="1688553" y="520481"/>
+            <a:ext cx="22635" cy="2173025"/>
           </a:xfrm>
           <a:prstGeom prst="line">
             <a:avLst/>
           </a:prstGeom>
-          <a:ln>
-            <a:solidFill>
-              <a:schemeClr val="tx1"/>
-            </a:solidFill>
-          </a:ln>
         </p:spPr>
         <p:style>
           <a:lnRef idx="1">
@@ -3677,26 +3839,27 @@
       </p:cxnSp>
       <p:cxnSp>
         <p:nvCxnSpPr>
-          <p:cNvPr id="64" name="Straight Connector 63"/>
+          <p:cNvPr id="119" name="Straight Connector 118">
+            <a:extLst>
+              <a:ext uri="{FF2B5EF4-FFF2-40B4-BE49-F238E27FC236}">
+                <a16:creationId xmlns:a16="http://schemas.microsoft.com/office/drawing/2014/main" id="{305B7598-4EAE-49A4-BEA2-AF9FA64D61B9}"/>
+              </a:ext>
+            </a:extLst>
+          </p:cNvPr>
           <p:cNvCxnSpPr>
-            <a:stCxn id="53" idx="3"/>
-            <a:endCxn id="55" idx="1"/>
+            <a:cxnSpLocks/>
+            <a:stCxn id="117" idx="2"/>
           </p:cNvCxnSpPr>
           <p:nvPr/>
         </p:nvCxnSpPr>
         <p:spPr>
           <a:xfrm>
-            <a:off x="5104939" y="1439126"/>
-            <a:ext cx="862883" cy="0"/>
+            <a:off x="1688553" y="3699346"/>
+            <a:ext cx="11317" cy="1429245"/>
           </a:xfrm>
           <a:prstGeom prst="line">
             <a:avLst/>
           </a:prstGeom>
-          <a:ln>
-            <a:solidFill>
-              <a:schemeClr val="tx1"/>
-            </a:solidFill>
-          </a:ln>
         </p:spPr>
         <p:style>
           <a:lnRef idx="1">
@@ -3715,23 +3878,26 @@
       </p:cxnSp>
       <p:cxnSp>
         <p:nvCxnSpPr>
-          <p:cNvPr id="65" name="Straight Connector 64"/>
-          <p:cNvCxnSpPr/>
+          <p:cNvPr id="120" name="Straight Connector 119">
+            <a:extLst>
+              <a:ext uri="{FF2B5EF4-FFF2-40B4-BE49-F238E27FC236}">
+                <a16:creationId xmlns:a16="http://schemas.microsoft.com/office/drawing/2014/main" id="{8804C5C8-DD6E-4D6F-AE9A-AF402AF3B144}"/>
+              </a:ext>
+            </a:extLst>
+          </p:cNvPr>
+          <p:cNvCxnSpPr>
+            <a:cxnSpLocks/>
+          </p:cNvCxnSpPr>
           <p:nvPr/>
         </p:nvCxnSpPr>
         <p:spPr>
           <a:xfrm>
-            <a:off x="2421277" y="1229355"/>
-            <a:ext cx="862883" cy="0"/>
+            <a:off x="7660861" y="520481"/>
+            <a:ext cx="2265017" cy="0"/>
           </a:xfrm>
           <a:prstGeom prst="line">
             <a:avLst/>
           </a:prstGeom>
-          <a:ln>
-            <a:solidFill>
-              <a:schemeClr val="tx1"/>
-            </a:solidFill>
-          </a:ln>
         </p:spPr>
         <p:style>
           <a:lnRef idx="1">
@@ -3750,25 +3916,26 @@
       </p:cxnSp>
       <p:cxnSp>
         <p:nvCxnSpPr>
-          <p:cNvPr id="66" name="Straight Connector 65"/>
+          <p:cNvPr id="121" name="Straight Connector 120">
+            <a:extLst>
+              <a:ext uri="{FF2B5EF4-FFF2-40B4-BE49-F238E27FC236}">
+                <a16:creationId xmlns:a16="http://schemas.microsoft.com/office/drawing/2014/main" id="{776E0595-BDF6-441C-9930-88B21B8BA027}"/>
+              </a:ext>
+            </a:extLst>
+          </p:cNvPr>
           <p:cNvCxnSpPr>
-            <a:endCxn id="61" idx="0"/>
+            <a:cxnSpLocks/>
           </p:cNvCxnSpPr>
           <p:nvPr/>
         </p:nvCxnSpPr>
         <p:spPr>
           <a:xfrm>
-            <a:off x="1532288" y="2656354"/>
-            <a:ext cx="0" cy="1530447"/>
+            <a:off x="9925878" y="520481"/>
+            <a:ext cx="0" cy="2908519"/>
           </a:xfrm>
           <a:prstGeom prst="line">
             <a:avLst/>
           </a:prstGeom>
-          <a:ln>
-            <a:solidFill>
-              <a:schemeClr val="tx1"/>
-            </a:solidFill>
-          </a:ln>
         </p:spPr>
         <p:style>
           <a:lnRef idx="1">
@@ -3787,23 +3954,26 @@
       </p:cxnSp>
       <p:cxnSp>
         <p:nvCxnSpPr>
-          <p:cNvPr id="67" name="Straight Connector 66"/>
-          <p:cNvCxnSpPr/>
+          <p:cNvPr id="122" name="Straight Connector 121">
+            <a:extLst>
+              <a:ext uri="{FF2B5EF4-FFF2-40B4-BE49-F238E27FC236}">
+                <a16:creationId xmlns:a16="http://schemas.microsoft.com/office/drawing/2014/main" id="{F8957F2E-AFF2-4F8E-8427-91F9E44995DC}"/>
+              </a:ext>
+            </a:extLst>
+          </p:cNvPr>
+          <p:cNvCxnSpPr>
+            <a:cxnSpLocks/>
+          </p:cNvCxnSpPr>
           <p:nvPr/>
         </p:nvCxnSpPr>
         <p:spPr>
-          <a:xfrm>
-            <a:off x="6884740" y="2674531"/>
-            <a:ext cx="42822" cy="1491186"/>
+          <a:xfrm flipV="1">
+            <a:off x="1711188" y="520481"/>
+            <a:ext cx="2819951" cy="1"/>
           </a:xfrm>
           <a:prstGeom prst="line">
             <a:avLst/>
           </a:prstGeom>
-          <a:ln>
-            <a:solidFill>
-              <a:schemeClr val="tx1"/>
-            </a:solidFill>
-          </a:ln>
         </p:spPr>
         <p:style>
           <a:lnRef idx="1">
@@ -3822,23 +3992,26 @@
       </p:cxnSp>
       <p:cxnSp>
         <p:nvCxnSpPr>
-          <p:cNvPr id="68" name="Straight Connector 67"/>
-          <p:cNvCxnSpPr/>
+          <p:cNvPr id="123" name="Straight Connector 122">
+            <a:extLst>
+              <a:ext uri="{FF2B5EF4-FFF2-40B4-BE49-F238E27FC236}">
+                <a16:creationId xmlns:a16="http://schemas.microsoft.com/office/drawing/2014/main" id="{2CC7EBA0-6A55-4EF5-8103-D3C7A810D312}"/>
+              </a:ext>
+            </a:extLst>
+          </p:cNvPr>
+          <p:cNvCxnSpPr>
+            <a:cxnSpLocks/>
+          </p:cNvCxnSpPr>
           <p:nvPr/>
         </p:nvCxnSpPr>
         <p:spPr>
           <a:xfrm>
-            <a:off x="656870" y="705893"/>
-            <a:ext cx="1764407" cy="0"/>
+            <a:off x="1699870" y="5128591"/>
+            <a:ext cx="2831269" cy="0"/>
           </a:xfrm>
           <a:prstGeom prst="line">
             <a:avLst/>
           </a:prstGeom>
-          <a:ln>
-            <a:solidFill>
-              <a:schemeClr val="tx1"/>
-            </a:solidFill>
-          </a:ln>
         </p:spPr>
         <p:style>
           <a:lnRef idx="1">
@@ -3855,191 +4028,22 @@
           </a:fontRef>
         </p:style>
       </p:cxnSp>
-      <p:cxnSp>
-        <p:nvCxnSpPr>
-          <p:cNvPr id="69" name="Straight Connector 68"/>
-          <p:cNvCxnSpPr/>
+      <p:sp>
+        <p:nvSpPr>
+          <p:cNvPr id="124" name="TextBox 123">
+            <a:extLst>
+              <a:ext uri="{FF2B5EF4-FFF2-40B4-BE49-F238E27FC236}">
+                <a16:creationId xmlns:a16="http://schemas.microsoft.com/office/drawing/2014/main" id="{E6E2434F-53AF-4FBB-B5C6-9D55DCCAE662}"/>
+              </a:ext>
+            </a:extLst>
+          </p:cNvPr>
+          <p:cNvSpPr txBox="1"/>
           <p:nvPr/>
-        </p:nvCxnSpPr>
+        </p:nvSpPr>
         <p:spPr>
           <a:xfrm>
-            <a:off x="3340532" y="684290"/>
-            <a:ext cx="1764407" cy="0"/>
-          </a:xfrm>
-          <a:prstGeom prst="line">
-            <a:avLst/>
-          </a:prstGeom>
-          <a:ln>
-            <a:solidFill>
-              <a:schemeClr val="tx1"/>
-            </a:solidFill>
-          </a:ln>
-        </p:spPr>
-        <p:style>
-          <a:lnRef idx="1">
-            <a:schemeClr val="accent1"/>
-          </a:lnRef>
-          <a:fillRef idx="0">
-            <a:schemeClr val="accent1"/>
-          </a:fillRef>
-          <a:effectRef idx="0">
-            <a:schemeClr val="accent1"/>
-          </a:effectRef>
-          <a:fontRef idx="minor">
-            <a:schemeClr val="tx1"/>
-          </a:fontRef>
-        </p:style>
-      </p:cxnSp>
-      <p:cxnSp>
-        <p:nvCxnSpPr>
-          <p:cNvPr id="70" name="Straight Connector 69"/>
-          <p:cNvCxnSpPr/>
-          <p:nvPr/>
-        </p:nvCxnSpPr>
-        <p:spPr>
-          <a:xfrm>
-            <a:off x="5967822" y="705893"/>
-            <a:ext cx="1764407" cy="0"/>
-          </a:xfrm>
-          <a:prstGeom prst="line">
-            <a:avLst/>
-          </a:prstGeom>
-          <a:ln>
-            <a:solidFill>
-              <a:schemeClr val="tx1"/>
-            </a:solidFill>
-          </a:ln>
-        </p:spPr>
-        <p:style>
-          <a:lnRef idx="1">
-            <a:schemeClr val="accent1"/>
-          </a:lnRef>
-          <a:fillRef idx="0">
-            <a:schemeClr val="accent1"/>
-          </a:fillRef>
-          <a:effectRef idx="0">
-            <a:schemeClr val="accent1"/>
-          </a:effectRef>
-          <a:fontRef idx="minor">
-            <a:schemeClr val="tx1"/>
-          </a:fontRef>
-        </p:style>
-      </p:cxnSp>
-      <p:cxnSp>
-        <p:nvCxnSpPr>
-          <p:cNvPr id="71" name="Straight Connector 70"/>
-          <p:cNvCxnSpPr/>
-          <p:nvPr/>
-        </p:nvCxnSpPr>
-        <p:spPr>
-          <a:xfrm>
-            <a:off x="9232844" y="705893"/>
-            <a:ext cx="1764407" cy="0"/>
-          </a:xfrm>
-          <a:prstGeom prst="line">
-            <a:avLst/>
-          </a:prstGeom>
-          <a:ln>
-            <a:solidFill>
-              <a:schemeClr val="tx1"/>
-            </a:solidFill>
-          </a:ln>
-        </p:spPr>
-        <p:style>
-          <a:lnRef idx="1">
-            <a:schemeClr val="accent1"/>
-          </a:lnRef>
-          <a:fillRef idx="0">
-            <a:schemeClr val="accent1"/>
-          </a:fillRef>
-          <a:effectRef idx="0">
-            <a:schemeClr val="accent1"/>
-          </a:effectRef>
-          <a:fontRef idx="minor">
-            <a:schemeClr val="tx1"/>
-          </a:fontRef>
-        </p:style>
-      </p:cxnSp>
-      <p:cxnSp>
-        <p:nvCxnSpPr>
-          <p:cNvPr id="72" name="Straight Connector 71"/>
-          <p:cNvCxnSpPr/>
-          <p:nvPr/>
-        </p:nvCxnSpPr>
-        <p:spPr>
-          <a:xfrm>
-            <a:off x="650081" y="4659166"/>
-            <a:ext cx="1764407" cy="0"/>
-          </a:xfrm>
-          <a:prstGeom prst="line">
-            <a:avLst/>
-          </a:prstGeom>
-          <a:ln>
-            <a:solidFill>
-              <a:schemeClr val="tx1"/>
-            </a:solidFill>
-          </a:ln>
-        </p:spPr>
-        <p:style>
-          <a:lnRef idx="1">
-            <a:schemeClr val="accent1"/>
-          </a:lnRef>
-          <a:fillRef idx="0">
-            <a:schemeClr val="accent1"/>
-          </a:fillRef>
-          <a:effectRef idx="0">
-            <a:schemeClr val="accent1"/>
-          </a:effectRef>
-          <a:fontRef idx="minor">
-            <a:schemeClr val="tx1"/>
-          </a:fontRef>
-        </p:style>
-      </p:cxnSp>
-      <p:cxnSp>
-        <p:nvCxnSpPr>
-          <p:cNvPr id="73" name="Straight Connector 72"/>
-          <p:cNvCxnSpPr/>
-          <p:nvPr/>
-        </p:nvCxnSpPr>
-        <p:spPr>
-          <a:xfrm>
-            <a:off x="5955268" y="4592486"/>
-            <a:ext cx="1764407" cy="0"/>
-          </a:xfrm>
-          <a:prstGeom prst="line">
-            <a:avLst/>
-          </a:prstGeom>
-          <a:ln>
-            <a:solidFill>
-              <a:schemeClr val="tx1"/>
-            </a:solidFill>
-          </a:ln>
-        </p:spPr>
-        <p:style>
-          <a:lnRef idx="1">
-            <a:schemeClr val="accent1"/>
-          </a:lnRef>
-          <a:fillRef idx="0">
-            <a:schemeClr val="accent1"/>
-          </a:fillRef>
-          <a:effectRef idx="0">
-            <a:schemeClr val="accent1"/>
-          </a:effectRef>
-          <a:fontRef idx="minor">
-            <a:schemeClr val="tx1"/>
-          </a:fontRef>
-        </p:style>
-      </p:cxnSp>
-      <p:sp>
-        <p:nvSpPr>
-          <p:cNvPr id="74" name="TextBox 73"/>
-          <p:cNvSpPr txBox="1"/>
-          <p:nvPr/>
-        </p:nvSpPr>
-        <p:spPr>
-          <a:xfrm>
-            <a:off x="3567083" y="1093040"/>
-            <a:ext cx="1231299" cy="369332"/>
+            <a:off x="1269450" y="3616163"/>
+            <a:ext cx="457200" cy="584775"/>
           </a:xfrm>
           <a:prstGeom prst="rect">
             <a:avLst/>
@@ -4047,29 +4051,34 @@
           <a:noFill/>
         </p:spPr>
         <p:txBody>
-          <a:bodyPr wrap="none" rtlCol="0">
+          <a:bodyPr wrap="square" rtlCol="0">
             <a:spAutoFit/>
           </a:bodyPr>
           <a:lstStyle/>
           <a:p>
             <a:r>
-              <a:rPr lang="en-US" dirty="0" smtClean="0"/>
-              <a:t>first_name</a:t>
-            </a:r>
-            <a:endParaRPr lang="en-US" dirty="0"/>
-          </a:p>
-        </p:txBody>
-      </p:sp>
-      <p:sp>
-        <p:nvSpPr>
-          <p:cNvPr id="75" name="TextBox 74"/>
+              <a:rPr lang="en-US" sz="3200" dirty="0"/>
+              <a:t>*</a:t>
+            </a:r>
+          </a:p>
+        </p:txBody>
+      </p:sp>
+      <p:sp>
+        <p:nvSpPr>
+          <p:cNvPr id="125" name="TextBox 124">
+            <a:extLst>
+              <a:ext uri="{FF2B5EF4-FFF2-40B4-BE49-F238E27FC236}">
+                <a16:creationId xmlns:a16="http://schemas.microsoft.com/office/drawing/2014/main" id="{85DD2EE0-A86A-43FC-9677-DD4A43E0A561}"/>
+              </a:ext>
+            </a:extLst>
+          </p:cNvPr>
           <p:cNvSpPr txBox="1"/>
           <p:nvPr/>
         </p:nvSpPr>
         <p:spPr>
           <a:xfrm>
-            <a:off x="3554818" y="1350878"/>
-            <a:ext cx="1159933" cy="369332"/>
+            <a:off x="1253988" y="2319263"/>
+            <a:ext cx="457200" cy="584775"/>
           </a:xfrm>
           <a:prstGeom prst="rect">
             <a:avLst/>
@@ -4077,29 +4086,34 @@
           <a:noFill/>
         </p:spPr>
         <p:txBody>
-          <a:bodyPr wrap="none" rtlCol="0">
+          <a:bodyPr wrap="square" rtlCol="0">
             <a:spAutoFit/>
           </a:bodyPr>
           <a:lstStyle/>
           <a:p>
             <a:r>
-              <a:rPr lang="en-US" dirty="0" smtClean="0"/>
-              <a:t>last_name</a:t>
-            </a:r>
-            <a:endParaRPr lang="en-US" dirty="0"/>
-          </a:p>
-        </p:txBody>
-      </p:sp>
-      <p:sp>
-        <p:nvSpPr>
-          <p:cNvPr id="76" name="TextBox 75"/>
+              <a:rPr lang="en-US" sz="3200" dirty="0"/>
+              <a:t>*</a:t>
+            </a:r>
+          </a:p>
+        </p:txBody>
+      </p:sp>
+      <p:sp>
+        <p:nvSpPr>
+          <p:cNvPr id="126" name="TextBox 125">
+            <a:extLst>
+              <a:ext uri="{FF2B5EF4-FFF2-40B4-BE49-F238E27FC236}">
+                <a16:creationId xmlns:a16="http://schemas.microsoft.com/office/drawing/2014/main" id="{BEF06A6E-5AB4-4ACB-8796-15AA4120A777}"/>
+              </a:ext>
+            </a:extLst>
+          </p:cNvPr>
           <p:cNvSpPr txBox="1"/>
           <p:nvPr/>
         </p:nvSpPr>
         <p:spPr>
           <a:xfrm>
-            <a:off x="6243812" y="1053320"/>
-            <a:ext cx="684675" cy="369332"/>
+            <a:off x="4313856" y="5117020"/>
+            <a:ext cx="457200" cy="338554"/>
           </a:xfrm>
           <a:prstGeom prst="rect">
             <a:avLst/>
@@ -4107,29 +4121,34 @@
           <a:noFill/>
         </p:spPr>
         <p:txBody>
-          <a:bodyPr wrap="none" rtlCol="0">
+          <a:bodyPr wrap="square" rtlCol="0">
             <a:spAutoFit/>
           </a:bodyPr>
           <a:lstStyle/>
           <a:p>
             <a:r>
-              <a:rPr lang="en-US" dirty="0" smtClean="0"/>
-              <a:t>score</a:t>
-            </a:r>
-            <a:endParaRPr lang="en-US" dirty="0"/>
-          </a:p>
-        </p:txBody>
-      </p:sp>
-      <p:sp>
-        <p:nvSpPr>
-          <p:cNvPr id="77" name="TextBox 76"/>
+              <a:rPr lang="en-US" sz="1600" dirty="0"/>
+              <a:t>1</a:t>
+            </a:r>
+          </a:p>
+        </p:txBody>
+      </p:sp>
+      <p:sp>
+        <p:nvSpPr>
+          <p:cNvPr id="127" name="TextBox 126">
+            <a:extLst>
+              <a:ext uri="{FF2B5EF4-FFF2-40B4-BE49-F238E27FC236}">
+                <a16:creationId xmlns:a16="http://schemas.microsoft.com/office/drawing/2014/main" id="{6AD8AC64-3A12-438A-B5F4-C720B44D7C41}"/>
+              </a:ext>
+            </a:extLst>
+          </p:cNvPr>
           <p:cNvSpPr txBox="1"/>
           <p:nvPr/>
         </p:nvSpPr>
         <p:spPr>
           <a:xfrm>
-            <a:off x="9512669" y="1051656"/>
-            <a:ext cx="559769" cy="369332"/>
+            <a:off x="4302539" y="193499"/>
+            <a:ext cx="457200" cy="338554"/>
           </a:xfrm>
           <a:prstGeom prst="rect">
             <a:avLst/>
@@ -4137,29 +4156,34 @@
           <a:noFill/>
         </p:spPr>
         <p:txBody>
-          <a:bodyPr wrap="none" rtlCol="0">
+          <a:bodyPr wrap="square" rtlCol="0">
             <a:spAutoFit/>
           </a:bodyPr>
           <a:lstStyle/>
           <a:p>
             <a:r>
-              <a:rPr lang="en-US" dirty="0" smtClean="0"/>
-              <a:t>title</a:t>
-            </a:r>
-            <a:endParaRPr lang="en-US" dirty="0"/>
-          </a:p>
-        </p:txBody>
-      </p:sp>
-      <p:sp>
-        <p:nvSpPr>
-          <p:cNvPr id="78" name="TextBox 77"/>
+              <a:rPr lang="en-US" sz="1600" dirty="0"/>
+              <a:t>1</a:t>
+            </a:r>
+          </a:p>
+        </p:txBody>
+      </p:sp>
+      <p:sp>
+        <p:nvSpPr>
+          <p:cNvPr id="128" name="TextBox 127">
+            <a:extLst>
+              <a:ext uri="{FF2B5EF4-FFF2-40B4-BE49-F238E27FC236}">
+                <a16:creationId xmlns:a16="http://schemas.microsoft.com/office/drawing/2014/main" id="{FD4857CB-6862-4950-B007-039AADF47F46}"/>
+              </a:ext>
+            </a:extLst>
+          </p:cNvPr>
           <p:cNvSpPr txBox="1"/>
           <p:nvPr/>
         </p:nvSpPr>
         <p:spPr>
           <a:xfrm>
-            <a:off x="9543336" y="755280"/>
-            <a:ext cx="364202" cy="369332"/>
+            <a:off x="9925878" y="3172611"/>
+            <a:ext cx="457200" cy="338554"/>
           </a:xfrm>
           <a:prstGeom prst="rect">
             <a:avLst/>
@@ -4167,29 +4191,34 @@
           <a:noFill/>
         </p:spPr>
         <p:txBody>
-          <a:bodyPr wrap="none" rtlCol="0">
+          <a:bodyPr wrap="square" rtlCol="0">
             <a:spAutoFit/>
           </a:bodyPr>
           <a:lstStyle/>
           <a:p>
             <a:r>
-              <a:rPr lang="en-US" b="1" dirty="0" smtClean="0"/>
-              <a:t>id</a:t>
-            </a:r>
-            <a:endParaRPr lang="en-US" b="1" dirty="0"/>
-          </a:p>
-        </p:txBody>
-      </p:sp>
-      <p:sp>
-        <p:nvSpPr>
-          <p:cNvPr id="79" name="TextBox 78"/>
+              <a:rPr lang="en-US" sz="1600" dirty="0"/>
+              <a:t>1</a:t>
+            </a:r>
+          </a:p>
+        </p:txBody>
+      </p:sp>
+      <p:sp>
+        <p:nvSpPr>
+          <p:cNvPr id="129" name="TextBox 128">
+            <a:extLst>
+              <a:ext uri="{FF2B5EF4-FFF2-40B4-BE49-F238E27FC236}">
+                <a16:creationId xmlns:a16="http://schemas.microsoft.com/office/drawing/2014/main" id="{2FA755E5-07A2-45EE-B47B-3258EAD2F5AC}"/>
+              </a:ext>
+            </a:extLst>
+          </p:cNvPr>
           <p:cNvSpPr txBox="1"/>
           <p:nvPr/>
         </p:nvSpPr>
         <p:spPr>
           <a:xfrm>
-            <a:off x="6287064" y="787274"/>
-            <a:ext cx="364202" cy="369332"/>
+            <a:off x="7579690" y="153460"/>
+            <a:ext cx="457200" cy="584775"/>
           </a:xfrm>
           <a:prstGeom prst="rect">
             <a:avLst/>
@@ -4197,1204 +4226,15 @@
           <a:noFill/>
         </p:spPr>
         <p:txBody>
-          <a:bodyPr wrap="none" rtlCol="0">
+          <a:bodyPr wrap="square" rtlCol="0">
             <a:spAutoFit/>
           </a:bodyPr>
           <a:lstStyle/>
           <a:p>
             <a:r>
-              <a:rPr lang="en-US" b="1" dirty="0" smtClean="0"/>
-              <a:t>id</a:t>
-            </a:r>
-            <a:endParaRPr lang="en-US" b="1" dirty="0"/>
-          </a:p>
-        </p:txBody>
-      </p:sp>
-      <p:sp>
-        <p:nvSpPr>
-          <p:cNvPr id="80" name="TextBox 79"/>
-          <p:cNvSpPr txBox="1"/>
-          <p:nvPr/>
-        </p:nvSpPr>
-        <p:spPr>
-          <a:xfrm>
-            <a:off x="3598367" y="787274"/>
-            <a:ext cx="364202" cy="369332"/>
-          </a:xfrm>
-          <a:prstGeom prst="rect">
-            <a:avLst/>
-          </a:prstGeom>
-          <a:noFill/>
-        </p:spPr>
-        <p:txBody>
-          <a:bodyPr wrap="none" rtlCol="0">
-            <a:spAutoFit/>
-          </a:bodyPr>
-          <a:lstStyle/>
-          <a:p>
-            <a:r>
-              <a:rPr lang="en-US" b="1" dirty="0" smtClean="0"/>
-              <a:t>id</a:t>
-            </a:r>
-            <a:endParaRPr lang="en-US" b="1" dirty="0"/>
-          </a:p>
-        </p:txBody>
-      </p:sp>
-      <p:sp>
-        <p:nvSpPr>
-          <p:cNvPr id="81" name="TextBox 80"/>
-          <p:cNvSpPr txBox="1"/>
-          <p:nvPr/>
-        </p:nvSpPr>
-        <p:spPr>
-          <a:xfrm>
-            <a:off x="978566" y="800151"/>
-            <a:ext cx="364202" cy="369332"/>
-          </a:xfrm>
-          <a:prstGeom prst="rect">
-            <a:avLst/>
-          </a:prstGeom>
-          <a:noFill/>
-        </p:spPr>
-        <p:txBody>
-          <a:bodyPr wrap="none" rtlCol="0">
-            <a:spAutoFit/>
-          </a:bodyPr>
-          <a:lstStyle/>
-          <a:p>
-            <a:r>
-              <a:rPr lang="en-US" b="1" dirty="0" smtClean="0"/>
-              <a:t>id</a:t>
-            </a:r>
-            <a:endParaRPr lang="en-US" b="1" dirty="0"/>
-          </a:p>
-        </p:txBody>
-      </p:sp>
-      <p:sp>
-        <p:nvSpPr>
-          <p:cNvPr id="82" name="TextBox 81"/>
-          <p:cNvSpPr txBox="1"/>
-          <p:nvPr/>
-        </p:nvSpPr>
-        <p:spPr>
-          <a:xfrm>
-            <a:off x="923618" y="1111784"/>
-            <a:ext cx="716863" cy="369332"/>
-          </a:xfrm>
-          <a:prstGeom prst="rect">
-            <a:avLst/>
-          </a:prstGeom>
-          <a:noFill/>
-        </p:spPr>
-        <p:txBody>
-          <a:bodyPr wrap="none" rtlCol="0">
-            <a:spAutoFit/>
-          </a:bodyPr>
-          <a:lstStyle/>
-          <a:p>
-            <a:r>
-              <a:rPr lang="en-US" dirty="0" smtClean="0"/>
-              <a:t>name</a:t>
-            </a:r>
-            <a:endParaRPr lang="en-US" dirty="0"/>
-          </a:p>
-        </p:txBody>
-      </p:sp>
-      <p:sp>
-        <p:nvSpPr>
-          <p:cNvPr id="83" name="TextBox 82"/>
-          <p:cNvSpPr txBox="1"/>
-          <p:nvPr/>
-        </p:nvSpPr>
-        <p:spPr>
-          <a:xfrm>
-            <a:off x="6333794" y="5032084"/>
-            <a:ext cx="559769" cy="369332"/>
-          </a:xfrm>
-          <a:prstGeom prst="rect">
-            <a:avLst/>
-          </a:prstGeom>
-          <a:noFill/>
-        </p:spPr>
-        <p:txBody>
-          <a:bodyPr wrap="none" rtlCol="0">
-            <a:spAutoFit/>
-          </a:bodyPr>
-          <a:lstStyle/>
-          <a:p>
-            <a:r>
-              <a:rPr lang="en-US" dirty="0" smtClean="0"/>
-              <a:t>title</a:t>
-            </a:r>
-            <a:endParaRPr lang="en-US" dirty="0"/>
-          </a:p>
-        </p:txBody>
-      </p:sp>
-      <p:sp>
-        <p:nvSpPr>
-          <p:cNvPr id="84" name="TextBox 83"/>
-          <p:cNvSpPr txBox="1"/>
-          <p:nvPr/>
-        </p:nvSpPr>
-        <p:spPr>
-          <a:xfrm>
-            <a:off x="6386433" y="4673967"/>
-            <a:ext cx="364202" cy="369332"/>
-          </a:xfrm>
-          <a:prstGeom prst="rect">
-            <a:avLst/>
-          </a:prstGeom>
-          <a:noFill/>
-        </p:spPr>
-        <p:txBody>
-          <a:bodyPr wrap="none" rtlCol="0">
-            <a:spAutoFit/>
-          </a:bodyPr>
-          <a:lstStyle/>
-          <a:p>
-            <a:r>
-              <a:rPr lang="en-US" b="1" dirty="0" smtClean="0"/>
-              <a:t>id</a:t>
-            </a:r>
-            <a:endParaRPr lang="en-US" b="1" dirty="0"/>
-          </a:p>
-        </p:txBody>
-      </p:sp>
-      <p:sp>
-        <p:nvSpPr>
-          <p:cNvPr id="85" name="TextBox 84"/>
-          <p:cNvSpPr txBox="1"/>
-          <p:nvPr/>
-        </p:nvSpPr>
-        <p:spPr>
-          <a:xfrm>
-            <a:off x="3567083" y="1608716"/>
-            <a:ext cx="485774" cy="369332"/>
-          </a:xfrm>
-          <a:prstGeom prst="rect">
-            <a:avLst/>
-          </a:prstGeom>
-          <a:noFill/>
-        </p:spPr>
-        <p:txBody>
-          <a:bodyPr wrap="none" rtlCol="0">
-            <a:spAutoFit/>
-          </a:bodyPr>
-          <a:lstStyle/>
-          <a:p>
-            <a:r>
-              <a:rPr lang="en-US" dirty="0" smtClean="0"/>
-              <a:t>sex</a:t>
-            </a:r>
-            <a:endParaRPr lang="en-US" dirty="0"/>
-          </a:p>
-        </p:txBody>
-      </p:sp>
-      <p:sp>
-        <p:nvSpPr>
-          <p:cNvPr id="86" name="TextBox 85"/>
-          <p:cNvSpPr txBox="1"/>
-          <p:nvPr/>
-        </p:nvSpPr>
-        <p:spPr>
-          <a:xfrm>
-            <a:off x="998712" y="4769421"/>
-            <a:ext cx="364202" cy="369332"/>
-          </a:xfrm>
-          <a:prstGeom prst="rect">
-            <a:avLst/>
-          </a:prstGeom>
-          <a:noFill/>
-        </p:spPr>
-        <p:txBody>
-          <a:bodyPr wrap="none" rtlCol="0">
-            <a:spAutoFit/>
-          </a:bodyPr>
-          <a:lstStyle/>
-          <a:p>
-            <a:r>
-              <a:rPr lang="en-US" b="1" dirty="0" smtClean="0"/>
-              <a:t>id</a:t>
-            </a:r>
-            <a:endParaRPr lang="en-US" b="1" dirty="0"/>
-          </a:p>
-        </p:txBody>
-      </p:sp>
-      <p:sp>
-        <p:nvSpPr>
-          <p:cNvPr id="87" name="TextBox 86"/>
-          <p:cNvSpPr txBox="1"/>
-          <p:nvPr/>
-        </p:nvSpPr>
-        <p:spPr>
-          <a:xfrm>
-            <a:off x="1006003" y="5090145"/>
-            <a:ext cx="716863" cy="369332"/>
-          </a:xfrm>
-          <a:prstGeom prst="rect">
-            <a:avLst/>
-          </a:prstGeom>
-          <a:noFill/>
-        </p:spPr>
-        <p:txBody>
-          <a:bodyPr wrap="none" rtlCol="0">
-            <a:spAutoFit/>
-          </a:bodyPr>
-          <a:lstStyle/>
-          <a:p>
-            <a:r>
-              <a:rPr lang="en-US" smtClean="0"/>
-              <a:t>name</a:t>
-            </a:r>
-            <a:endParaRPr lang="en-US" dirty="0"/>
-          </a:p>
-        </p:txBody>
-      </p:sp>
-      <p:sp>
-        <p:nvSpPr>
-          <p:cNvPr id="88" name="TextBox 87"/>
-          <p:cNvSpPr txBox="1"/>
-          <p:nvPr/>
-        </p:nvSpPr>
-        <p:spPr>
-          <a:xfrm>
-            <a:off x="2456749" y="895546"/>
-            <a:ext cx="301686" cy="369332"/>
-          </a:xfrm>
-          <a:prstGeom prst="rect">
-            <a:avLst/>
-          </a:prstGeom>
-          <a:noFill/>
-        </p:spPr>
-        <p:txBody>
-          <a:bodyPr wrap="none" rtlCol="0">
-            <a:spAutoFit/>
-          </a:bodyPr>
-          <a:lstStyle/>
-          <a:p>
-            <a:r>
-              <a:rPr lang="en-US" dirty="0" smtClean="0">
-                <a:solidFill>
-                  <a:schemeClr val="accent1"/>
-                </a:solidFill>
-              </a:rPr>
-              <a:t>1</a:t>
-            </a:r>
-            <a:endParaRPr lang="en-US" dirty="0">
-              <a:solidFill>
-                <a:schemeClr val="accent1"/>
-              </a:solidFill>
-            </a:endParaRPr>
-          </a:p>
-        </p:txBody>
-      </p:sp>
-      <p:sp>
-        <p:nvSpPr>
-          <p:cNvPr id="89" name="TextBox 88"/>
-          <p:cNvSpPr txBox="1"/>
-          <p:nvPr/>
-        </p:nvSpPr>
-        <p:spPr>
-          <a:xfrm>
-            <a:off x="2948059" y="933147"/>
-            <a:ext cx="301686" cy="369332"/>
-          </a:xfrm>
-          <a:prstGeom prst="rect">
-            <a:avLst/>
-          </a:prstGeom>
-          <a:noFill/>
-        </p:spPr>
-        <p:txBody>
-          <a:bodyPr wrap="none" rtlCol="0">
-            <a:spAutoFit/>
-          </a:bodyPr>
-          <a:lstStyle/>
-          <a:p>
-            <a:r>
-              <a:rPr lang="en-US" dirty="0" smtClean="0">
-                <a:solidFill>
-                  <a:schemeClr val="accent1"/>
-                </a:solidFill>
-              </a:rPr>
+              <a:rPr lang="en-US" sz="3200" dirty="0"/>
               <a:t>*</a:t>
             </a:r>
-            <a:endParaRPr lang="en-US" dirty="0">
-              <a:solidFill>
-                <a:schemeClr val="accent1"/>
-              </a:solidFill>
-            </a:endParaRPr>
-          </a:p>
-        </p:txBody>
-      </p:sp>
-      <p:sp>
-        <p:nvSpPr>
-          <p:cNvPr id="90" name="TextBox 89"/>
-          <p:cNvSpPr txBox="1"/>
-          <p:nvPr/>
-        </p:nvSpPr>
-        <p:spPr>
-          <a:xfrm>
-            <a:off x="5149269" y="878302"/>
-            <a:ext cx="301686" cy="369332"/>
-          </a:xfrm>
-          <a:prstGeom prst="rect">
-            <a:avLst/>
-          </a:prstGeom>
-          <a:noFill/>
-        </p:spPr>
-        <p:txBody>
-          <a:bodyPr wrap="none" rtlCol="0">
-            <a:spAutoFit/>
-          </a:bodyPr>
-          <a:lstStyle/>
-          <a:p>
-            <a:r>
-              <a:rPr lang="en-US" dirty="0" smtClean="0">
-                <a:solidFill>
-                  <a:schemeClr val="accent1"/>
-                </a:solidFill>
-              </a:rPr>
-              <a:t>1</a:t>
-            </a:r>
-            <a:endParaRPr lang="en-US" dirty="0">
-              <a:solidFill>
-                <a:schemeClr val="accent1"/>
-              </a:solidFill>
-            </a:endParaRPr>
-          </a:p>
-        </p:txBody>
-      </p:sp>
-      <p:sp>
-        <p:nvSpPr>
-          <p:cNvPr id="91" name="TextBox 90"/>
-          <p:cNvSpPr txBox="1"/>
-          <p:nvPr/>
-        </p:nvSpPr>
-        <p:spPr>
-          <a:xfrm>
-            <a:off x="5640579" y="915903"/>
-            <a:ext cx="301686" cy="369332"/>
-          </a:xfrm>
-          <a:prstGeom prst="rect">
-            <a:avLst/>
-          </a:prstGeom>
-          <a:noFill/>
-        </p:spPr>
-        <p:txBody>
-          <a:bodyPr wrap="none" rtlCol="0">
-            <a:spAutoFit/>
-          </a:bodyPr>
-          <a:lstStyle/>
-          <a:p>
-            <a:r>
-              <a:rPr lang="en-US" dirty="0" smtClean="0">
-                <a:solidFill>
-                  <a:schemeClr val="accent1"/>
-                </a:solidFill>
-              </a:rPr>
-              <a:t>*</a:t>
-            </a:r>
-            <a:endParaRPr lang="en-US" dirty="0">
-              <a:solidFill>
-                <a:schemeClr val="accent1"/>
-              </a:solidFill>
-            </a:endParaRPr>
-          </a:p>
-        </p:txBody>
-      </p:sp>
-      <p:sp>
-        <p:nvSpPr>
-          <p:cNvPr id="92" name="TextBox 91"/>
-          <p:cNvSpPr txBox="1"/>
-          <p:nvPr/>
-        </p:nvSpPr>
-        <p:spPr>
-          <a:xfrm>
-            <a:off x="8899781" y="888691"/>
-            <a:ext cx="301686" cy="369332"/>
-          </a:xfrm>
-          <a:prstGeom prst="rect">
-            <a:avLst/>
-          </a:prstGeom>
-          <a:noFill/>
-        </p:spPr>
-        <p:txBody>
-          <a:bodyPr wrap="none" rtlCol="0">
-            <a:spAutoFit/>
-          </a:bodyPr>
-          <a:lstStyle/>
-          <a:p>
-            <a:r>
-              <a:rPr lang="en-US" dirty="0" smtClean="0">
-                <a:solidFill>
-                  <a:schemeClr val="accent1"/>
-                </a:solidFill>
-              </a:rPr>
-              <a:t>1</a:t>
-            </a:r>
-            <a:endParaRPr lang="en-US" dirty="0">
-              <a:solidFill>
-                <a:schemeClr val="accent1"/>
-              </a:solidFill>
-            </a:endParaRPr>
-          </a:p>
-        </p:txBody>
-      </p:sp>
-      <p:sp>
-        <p:nvSpPr>
-          <p:cNvPr id="93" name="TextBox 92"/>
-          <p:cNvSpPr txBox="1"/>
-          <p:nvPr/>
-        </p:nvSpPr>
-        <p:spPr>
-          <a:xfrm>
-            <a:off x="7897559" y="927118"/>
-            <a:ext cx="301686" cy="369332"/>
-          </a:xfrm>
-          <a:prstGeom prst="rect">
-            <a:avLst/>
-          </a:prstGeom>
-          <a:noFill/>
-        </p:spPr>
-        <p:txBody>
-          <a:bodyPr wrap="none" rtlCol="0">
-            <a:spAutoFit/>
-          </a:bodyPr>
-          <a:lstStyle/>
-          <a:p>
-            <a:r>
-              <a:rPr lang="en-US" dirty="0" smtClean="0">
-                <a:solidFill>
-                  <a:schemeClr val="accent1"/>
-                </a:solidFill>
-              </a:rPr>
-              <a:t>*</a:t>
-            </a:r>
-            <a:endParaRPr lang="en-US" dirty="0">
-              <a:solidFill>
-                <a:schemeClr val="accent1"/>
-              </a:solidFill>
-            </a:endParaRPr>
-          </a:p>
-        </p:txBody>
-      </p:sp>
-      <p:sp>
-        <p:nvSpPr>
-          <p:cNvPr id="94" name="TextBox 93"/>
-          <p:cNvSpPr txBox="1"/>
-          <p:nvPr/>
-        </p:nvSpPr>
-        <p:spPr>
-          <a:xfrm>
-            <a:off x="6927562" y="3844734"/>
-            <a:ext cx="301686" cy="369332"/>
-          </a:xfrm>
-          <a:prstGeom prst="rect">
-            <a:avLst/>
-          </a:prstGeom>
-          <a:noFill/>
-        </p:spPr>
-        <p:txBody>
-          <a:bodyPr wrap="none" rtlCol="0">
-            <a:spAutoFit/>
-          </a:bodyPr>
-          <a:lstStyle/>
-          <a:p>
-            <a:r>
-              <a:rPr lang="en-US" dirty="0" smtClean="0">
-                <a:solidFill>
-                  <a:schemeClr val="accent1"/>
-                </a:solidFill>
-              </a:rPr>
-              <a:t>1</a:t>
-            </a:r>
-            <a:endParaRPr lang="en-US" dirty="0">
-              <a:solidFill>
-                <a:schemeClr val="accent1"/>
-              </a:solidFill>
-            </a:endParaRPr>
-          </a:p>
-        </p:txBody>
-      </p:sp>
-      <p:sp>
-        <p:nvSpPr>
-          <p:cNvPr id="95" name="TextBox 94"/>
-          <p:cNvSpPr txBox="1"/>
-          <p:nvPr/>
-        </p:nvSpPr>
-        <p:spPr>
-          <a:xfrm>
-            <a:off x="6909826" y="2690473"/>
-            <a:ext cx="301686" cy="369332"/>
-          </a:xfrm>
-          <a:prstGeom prst="rect">
-            <a:avLst/>
-          </a:prstGeom>
-          <a:noFill/>
-        </p:spPr>
-        <p:txBody>
-          <a:bodyPr wrap="none" rtlCol="0">
-            <a:spAutoFit/>
-          </a:bodyPr>
-          <a:lstStyle/>
-          <a:p>
-            <a:r>
-              <a:rPr lang="en-US" dirty="0" smtClean="0">
-                <a:solidFill>
-                  <a:schemeClr val="accent1"/>
-                </a:solidFill>
-              </a:rPr>
-              <a:t>*</a:t>
-            </a:r>
-            <a:endParaRPr lang="en-US" dirty="0">
-              <a:solidFill>
-                <a:schemeClr val="accent1"/>
-              </a:solidFill>
-            </a:endParaRPr>
-          </a:p>
-        </p:txBody>
-      </p:sp>
-      <p:sp>
-        <p:nvSpPr>
-          <p:cNvPr id="96" name="TextBox 95"/>
-          <p:cNvSpPr txBox="1"/>
-          <p:nvPr/>
-        </p:nvSpPr>
-        <p:spPr>
-          <a:xfrm>
-            <a:off x="1650748" y="2668822"/>
-            <a:ext cx="301686" cy="369332"/>
-          </a:xfrm>
-          <a:prstGeom prst="rect">
-            <a:avLst/>
-          </a:prstGeom>
-          <a:noFill/>
-        </p:spPr>
-        <p:txBody>
-          <a:bodyPr wrap="none" rtlCol="0">
-            <a:spAutoFit/>
-          </a:bodyPr>
-          <a:lstStyle/>
-          <a:p>
-            <a:r>
-              <a:rPr lang="en-US" dirty="0" smtClean="0">
-                <a:solidFill>
-                  <a:schemeClr val="accent1"/>
-                </a:solidFill>
-              </a:rPr>
-              <a:t>*</a:t>
-            </a:r>
-            <a:endParaRPr lang="en-US" dirty="0">
-              <a:solidFill>
-                <a:schemeClr val="accent1"/>
-              </a:solidFill>
-            </a:endParaRPr>
-          </a:p>
-        </p:txBody>
-      </p:sp>
-      <p:sp>
-        <p:nvSpPr>
-          <p:cNvPr id="97" name="TextBox 96"/>
-          <p:cNvSpPr txBox="1"/>
-          <p:nvPr/>
-        </p:nvSpPr>
-        <p:spPr>
-          <a:xfrm>
-            <a:off x="1667685" y="3821834"/>
-            <a:ext cx="301686" cy="369332"/>
-          </a:xfrm>
-          <a:prstGeom prst="rect">
-            <a:avLst/>
-          </a:prstGeom>
-          <a:noFill/>
-        </p:spPr>
-        <p:txBody>
-          <a:bodyPr wrap="none" rtlCol="0">
-            <a:spAutoFit/>
-          </a:bodyPr>
-          <a:lstStyle/>
-          <a:p>
-            <a:r>
-              <a:rPr lang="en-US" dirty="0" smtClean="0">
-                <a:solidFill>
-                  <a:schemeClr val="accent1"/>
-                </a:solidFill>
-              </a:rPr>
-              <a:t>1</a:t>
-            </a:r>
-            <a:endParaRPr lang="en-US" dirty="0">
-              <a:solidFill>
-                <a:schemeClr val="accent1"/>
-              </a:solidFill>
-            </a:endParaRPr>
-          </a:p>
-        </p:txBody>
-      </p:sp>
-      <p:sp>
-        <p:nvSpPr>
-          <p:cNvPr id="98" name="TextBox 97"/>
-          <p:cNvSpPr txBox="1"/>
-          <p:nvPr/>
-        </p:nvSpPr>
-        <p:spPr>
-          <a:xfrm>
-            <a:off x="577750" y="830929"/>
-            <a:ext cx="405880" cy="338554"/>
-          </a:xfrm>
-          <a:prstGeom prst="rect">
-            <a:avLst/>
-          </a:prstGeom>
-          <a:noFill/>
-        </p:spPr>
-        <p:txBody>
-          <a:bodyPr wrap="none" rtlCol="0">
-            <a:spAutoFit/>
-          </a:bodyPr>
-          <a:lstStyle/>
-          <a:p>
-            <a:r>
-              <a:rPr lang="en-US" sz="1600" b="1" dirty="0" smtClean="0">
-                <a:solidFill>
-                  <a:schemeClr val="accent2"/>
-                </a:solidFill>
-              </a:rPr>
-              <a:t>PK</a:t>
-            </a:r>
-            <a:endParaRPr lang="en-US" sz="1600" b="1" dirty="0">
-              <a:solidFill>
-                <a:schemeClr val="accent2"/>
-              </a:solidFill>
-            </a:endParaRPr>
-          </a:p>
-        </p:txBody>
-      </p:sp>
-      <p:sp>
-        <p:nvSpPr>
-          <p:cNvPr id="99" name="TextBox 98"/>
-          <p:cNvSpPr txBox="1"/>
-          <p:nvPr/>
-        </p:nvSpPr>
-        <p:spPr>
-          <a:xfrm>
-            <a:off x="587580" y="4800199"/>
-            <a:ext cx="405880" cy="338554"/>
-          </a:xfrm>
-          <a:prstGeom prst="rect">
-            <a:avLst/>
-          </a:prstGeom>
-          <a:noFill/>
-        </p:spPr>
-        <p:txBody>
-          <a:bodyPr wrap="none" rtlCol="0">
-            <a:spAutoFit/>
-          </a:bodyPr>
-          <a:lstStyle/>
-          <a:p>
-            <a:r>
-              <a:rPr lang="en-US" sz="1600" b="1" dirty="0" smtClean="0">
-                <a:solidFill>
-                  <a:schemeClr val="accent2"/>
-                </a:solidFill>
-              </a:rPr>
-              <a:t>PK</a:t>
-            </a:r>
-            <a:endParaRPr lang="en-US" sz="1600" b="1" dirty="0">
-              <a:solidFill>
-                <a:schemeClr val="accent2"/>
-              </a:solidFill>
-            </a:endParaRPr>
-          </a:p>
-        </p:txBody>
-      </p:sp>
-      <p:sp>
-        <p:nvSpPr>
-          <p:cNvPr id="100" name="TextBox 99"/>
-          <p:cNvSpPr txBox="1"/>
-          <p:nvPr/>
-        </p:nvSpPr>
-        <p:spPr>
-          <a:xfrm>
-            <a:off x="3273405" y="811222"/>
-            <a:ext cx="405880" cy="338554"/>
-          </a:xfrm>
-          <a:prstGeom prst="rect">
-            <a:avLst/>
-          </a:prstGeom>
-          <a:noFill/>
-        </p:spPr>
-        <p:txBody>
-          <a:bodyPr wrap="none" rtlCol="0">
-            <a:spAutoFit/>
-          </a:bodyPr>
-          <a:lstStyle/>
-          <a:p>
-            <a:r>
-              <a:rPr lang="en-US" sz="1600" b="1" dirty="0" smtClean="0">
-                <a:solidFill>
-                  <a:schemeClr val="accent2"/>
-                </a:solidFill>
-              </a:rPr>
-              <a:t>PK</a:t>
-            </a:r>
-            <a:endParaRPr lang="en-US" sz="1600" b="1" dirty="0">
-              <a:solidFill>
-                <a:schemeClr val="accent2"/>
-              </a:solidFill>
-            </a:endParaRPr>
-          </a:p>
-        </p:txBody>
-      </p:sp>
-      <p:sp>
-        <p:nvSpPr>
-          <p:cNvPr id="101" name="TextBox 100"/>
-          <p:cNvSpPr txBox="1"/>
-          <p:nvPr/>
-        </p:nvSpPr>
-        <p:spPr>
-          <a:xfrm>
-            <a:off x="5924503" y="821611"/>
-            <a:ext cx="405880" cy="338554"/>
-          </a:xfrm>
-          <a:prstGeom prst="rect">
-            <a:avLst/>
-          </a:prstGeom>
-          <a:noFill/>
-        </p:spPr>
-        <p:txBody>
-          <a:bodyPr wrap="none" rtlCol="0">
-            <a:spAutoFit/>
-          </a:bodyPr>
-          <a:lstStyle/>
-          <a:p>
-            <a:r>
-              <a:rPr lang="en-US" sz="1600" b="1" dirty="0" smtClean="0">
-                <a:solidFill>
-                  <a:schemeClr val="accent2"/>
-                </a:solidFill>
-              </a:rPr>
-              <a:t>PK</a:t>
-            </a:r>
-            <a:endParaRPr lang="en-US" sz="1600" b="1" dirty="0">
-              <a:solidFill>
-                <a:schemeClr val="accent2"/>
-              </a:solidFill>
-            </a:endParaRPr>
-          </a:p>
-        </p:txBody>
-      </p:sp>
-      <p:sp>
-        <p:nvSpPr>
-          <p:cNvPr id="102" name="TextBox 101"/>
-          <p:cNvSpPr txBox="1"/>
-          <p:nvPr/>
-        </p:nvSpPr>
-        <p:spPr>
-          <a:xfrm>
-            <a:off x="9188123" y="783421"/>
-            <a:ext cx="405880" cy="338554"/>
-          </a:xfrm>
-          <a:prstGeom prst="rect">
-            <a:avLst/>
-          </a:prstGeom>
-          <a:noFill/>
-        </p:spPr>
-        <p:txBody>
-          <a:bodyPr wrap="none" rtlCol="0">
-            <a:spAutoFit/>
-          </a:bodyPr>
-          <a:lstStyle/>
-          <a:p>
-            <a:r>
-              <a:rPr lang="en-US" sz="1600" b="1" dirty="0" smtClean="0">
-                <a:solidFill>
-                  <a:schemeClr val="accent2"/>
-                </a:solidFill>
-              </a:rPr>
-              <a:t>PK</a:t>
-            </a:r>
-            <a:endParaRPr lang="en-US" sz="1600" b="1" dirty="0">
-              <a:solidFill>
-                <a:schemeClr val="accent2"/>
-              </a:solidFill>
-            </a:endParaRPr>
-          </a:p>
-        </p:txBody>
-      </p:sp>
-      <p:sp>
-        <p:nvSpPr>
-          <p:cNvPr id="103" name="TextBox 102"/>
-          <p:cNvSpPr txBox="1"/>
-          <p:nvPr/>
-        </p:nvSpPr>
-        <p:spPr>
-          <a:xfrm>
-            <a:off x="6001050" y="4693530"/>
-            <a:ext cx="405880" cy="338554"/>
-          </a:xfrm>
-          <a:prstGeom prst="rect">
-            <a:avLst/>
-          </a:prstGeom>
-          <a:noFill/>
-        </p:spPr>
-        <p:txBody>
-          <a:bodyPr wrap="none" rtlCol="0">
-            <a:spAutoFit/>
-          </a:bodyPr>
-          <a:lstStyle/>
-          <a:p>
-            <a:r>
-              <a:rPr lang="en-US" sz="1600" b="1" dirty="0" smtClean="0">
-                <a:solidFill>
-                  <a:schemeClr val="accent2"/>
-                </a:solidFill>
-              </a:rPr>
-              <a:t>PK</a:t>
-            </a:r>
-            <a:endParaRPr lang="en-US" sz="1600" b="1" dirty="0">
-              <a:solidFill>
-                <a:schemeClr val="accent2"/>
-              </a:solidFill>
-            </a:endParaRPr>
-          </a:p>
-        </p:txBody>
-      </p:sp>
-      <p:sp>
-        <p:nvSpPr>
-          <p:cNvPr id="104" name="TextBox 103"/>
-          <p:cNvSpPr txBox="1"/>
-          <p:nvPr/>
-        </p:nvSpPr>
-        <p:spPr>
-          <a:xfrm>
-            <a:off x="936060" y="1617174"/>
-            <a:ext cx="1002069" cy="369332"/>
-          </a:xfrm>
-          <a:prstGeom prst="rect">
-            <a:avLst/>
-          </a:prstGeom>
-          <a:noFill/>
-        </p:spPr>
-        <p:txBody>
-          <a:bodyPr wrap="none" rtlCol="0">
-            <a:spAutoFit/>
-          </a:bodyPr>
-          <a:lstStyle/>
-          <a:p>
-            <a:r>
-              <a:rPr lang="en-US" dirty="0" smtClean="0"/>
-              <a:t>batch_id</a:t>
-            </a:r>
-            <a:endParaRPr lang="en-US" dirty="0"/>
-          </a:p>
-        </p:txBody>
-      </p:sp>
-      <p:sp>
-        <p:nvSpPr>
-          <p:cNvPr id="105" name="TextBox 104"/>
-          <p:cNvSpPr txBox="1"/>
-          <p:nvPr/>
-        </p:nvSpPr>
-        <p:spPr>
-          <a:xfrm>
-            <a:off x="619753" y="1623472"/>
-            <a:ext cx="391454" cy="338554"/>
-          </a:xfrm>
-          <a:prstGeom prst="rect">
-            <a:avLst/>
-          </a:prstGeom>
-          <a:noFill/>
-        </p:spPr>
-        <p:txBody>
-          <a:bodyPr wrap="none" rtlCol="0">
-            <a:spAutoFit/>
-          </a:bodyPr>
-          <a:lstStyle/>
-          <a:p>
-            <a:r>
-              <a:rPr lang="en-US" sz="1600" b="1" dirty="0" smtClean="0">
-                <a:solidFill>
-                  <a:srgbClr val="7030A0"/>
-                </a:solidFill>
-              </a:rPr>
-              <a:t>FK</a:t>
-            </a:r>
-            <a:endParaRPr lang="en-US" sz="1600" b="1" dirty="0">
-              <a:solidFill>
-                <a:srgbClr val="7030A0"/>
-              </a:solidFill>
-            </a:endParaRPr>
-          </a:p>
-        </p:txBody>
-      </p:sp>
-      <p:sp>
-        <p:nvSpPr>
-          <p:cNvPr id="106" name="TextBox 105"/>
-          <p:cNvSpPr txBox="1"/>
-          <p:nvPr/>
-        </p:nvSpPr>
-        <p:spPr>
-          <a:xfrm>
-            <a:off x="3674846" y="2113379"/>
-            <a:ext cx="915635" cy="369332"/>
-          </a:xfrm>
-          <a:prstGeom prst="rect">
-            <a:avLst/>
-          </a:prstGeom>
-          <a:noFill/>
-        </p:spPr>
-        <p:txBody>
-          <a:bodyPr wrap="none" rtlCol="0">
-            <a:spAutoFit/>
-          </a:bodyPr>
-          <a:lstStyle/>
-          <a:p>
-            <a:r>
-              <a:rPr lang="en-US" dirty="0" smtClean="0"/>
-              <a:t>class_id</a:t>
-            </a:r>
-            <a:endParaRPr lang="en-US" dirty="0"/>
-          </a:p>
-        </p:txBody>
-      </p:sp>
-      <p:sp>
-        <p:nvSpPr>
-          <p:cNvPr id="107" name="TextBox 106"/>
-          <p:cNvSpPr txBox="1"/>
-          <p:nvPr/>
-        </p:nvSpPr>
-        <p:spPr>
-          <a:xfrm>
-            <a:off x="3358539" y="2119677"/>
-            <a:ext cx="391454" cy="338554"/>
-          </a:xfrm>
-          <a:prstGeom prst="rect">
-            <a:avLst/>
-          </a:prstGeom>
-          <a:noFill/>
-        </p:spPr>
-        <p:txBody>
-          <a:bodyPr wrap="none" rtlCol="0">
-            <a:spAutoFit/>
-          </a:bodyPr>
-          <a:lstStyle/>
-          <a:p>
-            <a:r>
-              <a:rPr lang="en-US" sz="1600" b="1" dirty="0" smtClean="0">
-                <a:solidFill>
-                  <a:srgbClr val="7030A0"/>
-                </a:solidFill>
-              </a:rPr>
-              <a:t>FK</a:t>
-            </a:r>
-            <a:endParaRPr lang="en-US" sz="1600" b="1" dirty="0">
-              <a:solidFill>
-                <a:srgbClr val="7030A0"/>
-              </a:solidFill>
-            </a:endParaRPr>
-          </a:p>
-        </p:txBody>
-      </p:sp>
-      <p:sp>
-        <p:nvSpPr>
-          <p:cNvPr id="108" name="TextBox 107"/>
-          <p:cNvSpPr txBox="1"/>
-          <p:nvPr/>
-        </p:nvSpPr>
-        <p:spPr>
-          <a:xfrm>
-            <a:off x="6257853" y="1483685"/>
-            <a:ext cx="1194686" cy="369332"/>
-          </a:xfrm>
-          <a:prstGeom prst="rect">
-            <a:avLst/>
-          </a:prstGeom>
-          <a:noFill/>
-        </p:spPr>
-        <p:txBody>
-          <a:bodyPr wrap="none" rtlCol="0">
-            <a:spAutoFit/>
-          </a:bodyPr>
-          <a:lstStyle/>
-          <a:p>
-            <a:r>
-              <a:rPr lang="en-US" dirty="0" err="1" smtClean="0"/>
-              <a:t>student_id</a:t>
-            </a:r>
-            <a:endParaRPr lang="en-US" dirty="0"/>
-          </a:p>
-        </p:txBody>
-      </p:sp>
-      <p:sp>
-        <p:nvSpPr>
-          <p:cNvPr id="109" name="TextBox 108"/>
-          <p:cNvSpPr txBox="1"/>
-          <p:nvPr/>
-        </p:nvSpPr>
-        <p:spPr>
-          <a:xfrm>
-            <a:off x="5977770" y="1489361"/>
-            <a:ext cx="391454" cy="338554"/>
-          </a:xfrm>
-          <a:prstGeom prst="rect">
-            <a:avLst/>
-          </a:prstGeom>
-          <a:noFill/>
-        </p:spPr>
-        <p:txBody>
-          <a:bodyPr wrap="none" rtlCol="0">
-            <a:spAutoFit/>
-          </a:bodyPr>
-          <a:lstStyle/>
-          <a:p>
-            <a:r>
-              <a:rPr lang="en-US" sz="1600" b="1" dirty="0" smtClean="0">
-                <a:solidFill>
-                  <a:srgbClr val="7030A0"/>
-                </a:solidFill>
-              </a:rPr>
-              <a:t>FK</a:t>
-            </a:r>
-            <a:endParaRPr lang="en-US" sz="1600" b="1" dirty="0">
-              <a:solidFill>
-                <a:srgbClr val="7030A0"/>
-              </a:solidFill>
-            </a:endParaRPr>
-          </a:p>
-        </p:txBody>
-      </p:sp>
-      <p:sp>
-        <p:nvSpPr>
-          <p:cNvPr id="110" name="TextBox 109"/>
-          <p:cNvSpPr txBox="1"/>
-          <p:nvPr/>
-        </p:nvSpPr>
-        <p:spPr>
-          <a:xfrm>
-            <a:off x="6253182" y="1790609"/>
-            <a:ext cx="943848" cy="369332"/>
-          </a:xfrm>
-          <a:prstGeom prst="rect">
-            <a:avLst/>
-          </a:prstGeom>
-          <a:noFill/>
-        </p:spPr>
-        <p:txBody>
-          <a:bodyPr wrap="none" rtlCol="0">
-            <a:spAutoFit/>
-          </a:bodyPr>
-          <a:lstStyle/>
-          <a:p>
-            <a:r>
-              <a:rPr lang="en-US" dirty="0" err="1" smtClean="0"/>
-              <a:t>topic_id</a:t>
-            </a:r>
-            <a:endParaRPr lang="en-US" dirty="0"/>
-          </a:p>
-        </p:txBody>
-      </p:sp>
-      <p:sp>
-        <p:nvSpPr>
-          <p:cNvPr id="111" name="TextBox 110"/>
-          <p:cNvSpPr txBox="1"/>
-          <p:nvPr/>
-        </p:nvSpPr>
-        <p:spPr>
-          <a:xfrm>
-            <a:off x="5961902" y="1814011"/>
-            <a:ext cx="391454" cy="338554"/>
-          </a:xfrm>
-          <a:prstGeom prst="rect">
-            <a:avLst/>
-          </a:prstGeom>
-          <a:noFill/>
-        </p:spPr>
-        <p:txBody>
-          <a:bodyPr wrap="none" rtlCol="0">
-            <a:spAutoFit/>
-          </a:bodyPr>
-          <a:lstStyle/>
-          <a:p>
-            <a:r>
-              <a:rPr lang="en-US" sz="1600" b="1" dirty="0" smtClean="0">
-                <a:solidFill>
-                  <a:srgbClr val="7030A0"/>
-                </a:solidFill>
-              </a:rPr>
-              <a:t>FK</a:t>
-            </a:r>
-            <a:endParaRPr lang="en-US" sz="1600" b="1" dirty="0">
-              <a:solidFill>
-                <a:srgbClr val="7030A0"/>
-              </a:solidFill>
-            </a:endParaRPr>
-          </a:p>
-        </p:txBody>
-      </p:sp>
-      <p:sp>
-        <p:nvSpPr>
-          <p:cNvPr id="112" name="TextBox 111"/>
-          <p:cNvSpPr txBox="1"/>
-          <p:nvPr/>
-        </p:nvSpPr>
-        <p:spPr>
-          <a:xfrm>
-            <a:off x="6257853" y="2137900"/>
-            <a:ext cx="1510991" cy="369332"/>
-          </a:xfrm>
-          <a:prstGeom prst="rect">
-            <a:avLst/>
-          </a:prstGeom>
-          <a:noFill/>
-        </p:spPr>
-        <p:txBody>
-          <a:bodyPr wrap="none" rtlCol="0">
-            <a:spAutoFit/>
-          </a:bodyPr>
-          <a:lstStyle/>
-          <a:p>
-            <a:r>
-              <a:rPr lang="en-US" dirty="0" err="1" smtClean="0"/>
-              <a:t>exam_type_id</a:t>
-            </a:r>
-            <a:endParaRPr lang="en-US" dirty="0"/>
-          </a:p>
-        </p:txBody>
-      </p:sp>
-      <p:sp>
-        <p:nvSpPr>
-          <p:cNvPr id="113" name="TextBox 112"/>
-          <p:cNvSpPr txBox="1"/>
-          <p:nvPr/>
-        </p:nvSpPr>
-        <p:spPr>
-          <a:xfrm>
-            <a:off x="5953321" y="2167847"/>
-            <a:ext cx="391454" cy="338554"/>
-          </a:xfrm>
-          <a:prstGeom prst="rect">
-            <a:avLst/>
-          </a:prstGeom>
-          <a:noFill/>
-        </p:spPr>
-        <p:txBody>
-          <a:bodyPr wrap="none" rtlCol="0">
-            <a:spAutoFit/>
-          </a:bodyPr>
-          <a:lstStyle/>
-          <a:p>
-            <a:r>
-              <a:rPr lang="en-US" sz="1600" b="1" dirty="0" smtClean="0">
-                <a:solidFill>
-                  <a:srgbClr val="7030A0"/>
-                </a:solidFill>
-              </a:rPr>
-              <a:t>FK</a:t>
-            </a:r>
-            <a:endParaRPr lang="en-US" sz="1600" b="1" dirty="0">
-              <a:solidFill>
-                <a:srgbClr val="7030A0"/>
-              </a:solidFill>
-            </a:endParaRPr>
           </a:p>
         </p:txBody>
       </p:sp>

</xml_diff>

<commit_message>
Revert "#5 create button widget for signin and signup"
</commit_message>
<xml_diff>
--- a/docs/ER-DIAGRAM.pptx
+++ b/docs/ER-DIAGRAM.pptx
@@ -155,9 +155,10 @@
           </a:lstStyle>
           <a:p>
             <a:r>
-              <a:rPr lang="en-US"/>
+              <a:rPr lang="en-US" smtClean="0"/>
               <a:t>Click to edit Master title style</a:t>
             </a:r>
+            <a:endParaRPr lang="en-US"/>
           </a:p>
         </p:txBody>
       </p:sp>
@@ -219,9 +220,10 @@
           </a:lstStyle>
           <a:p>
             <a:r>
-              <a:rPr lang="en-US"/>
+              <a:rPr lang="en-US" smtClean="0"/>
               <a:t>Click to edit Master subtitle style</a:t>
             </a:r>
+            <a:endParaRPr lang="en-US"/>
           </a:p>
         </p:txBody>
       </p:sp>
@@ -242,7 +244,7 @@
           <a:p>
             <a:fld id="{28BE630F-C39C-4DB9-8258-0B48CA067079}" type="datetimeFigureOut">
               <a:rPr lang="en-US" smtClean="0"/>
-              <a:t>11/27/2021</a:t>
+              <a:t>11/25/2021</a:t>
             </a:fld>
             <a:endParaRPr lang="en-US"/>
           </a:p>
@@ -336,9 +338,10 @@
           <a:lstStyle/>
           <a:p>
             <a:r>
-              <a:rPr lang="en-US"/>
+              <a:rPr lang="en-US" smtClean="0"/>
               <a:t>Click to edit Master title style</a:t>
             </a:r>
+            <a:endParaRPr lang="en-US"/>
           </a:p>
         </p:txBody>
       </p:sp>
@@ -359,37 +362,38 @@
           <a:p>
             <a:pPr lvl="0"/>
             <a:r>
-              <a:rPr lang="en-US"/>
+              <a:rPr lang="en-US" smtClean="0"/>
               <a:t>Click to edit Master text styles</a:t>
             </a:r>
           </a:p>
           <a:p>
             <a:pPr lvl="1"/>
             <a:r>
-              <a:rPr lang="en-US"/>
+              <a:rPr lang="en-US" smtClean="0"/>
               <a:t>Second level</a:t>
             </a:r>
           </a:p>
           <a:p>
             <a:pPr lvl="2"/>
             <a:r>
-              <a:rPr lang="en-US"/>
+              <a:rPr lang="en-US" smtClean="0"/>
               <a:t>Third level</a:t>
             </a:r>
           </a:p>
           <a:p>
             <a:pPr lvl="3"/>
             <a:r>
-              <a:rPr lang="en-US"/>
+              <a:rPr lang="en-US" smtClean="0"/>
               <a:t>Fourth level</a:t>
             </a:r>
           </a:p>
           <a:p>
             <a:pPr lvl="4"/>
             <a:r>
-              <a:rPr lang="en-US"/>
+              <a:rPr lang="en-US" smtClean="0"/>
               <a:t>Fifth level</a:t>
             </a:r>
+            <a:endParaRPr lang="en-US"/>
           </a:p>
         </p:txBody>
       </p:sp>
@@ -410,7 +414,7 @@
           <a:p>
             <a:fld id="{28BE630F-C39C-4DB9-8258-0B48CA067079}" type="datetimeFigureOut">
               <a:rPr lang="en-US" smtClean="0"/>
-              <a:t>11/27/2021</a:t>
+              <a:t>11/25/2021</a:t>
             </a:fld>
             <a:endParaRPr lang="en-US"/>
           </a:p>
@@ -509,9 +513,10 @@
           <a:lstStyle/>
           <a:p>
             <a:r>
-              <a:rPr lang="en-US"/>
+              <a:rPr lang="en-US" smtClean="0"/>
               <a:t>Click to edit Master title style</a:t>
             </a:r>
+            <a:endParaRPr lang="en-US"/>
           </a:p>
         </p:txBody>
       </p:sp>
@@ -537,37 +542,38 @@
           <a:p>
             <a:pPr lvl="0"/>
             <a:r>
-              <a:rPr lang="en-US"/>
+              <a:rPr lang="en-US" smtClean="0"/>
               <a:t>Click to edit Master text styles</a:t>
             </a:r>
           </a:p>
           <a:p>
             <a:pPr lvl="1"/>
             <a:r>
-              <a:rPr lang="en-US"/>
+              <a:rPr lang="en-US" smtClean="0"/>
               <a:t>Second level</a:t>
             </a:r>
           </a:p>
           <a:p>
             <a:pPr lvl="2"/>
             <a:r>
-              <a:rPr lang="en-US"/>
+              <a:rPr lang="en-US" smtClean="0"/>
               <a:t>Third level</a:t>
             </a:r>
           </a:p>
           <a:p>
             <a:pPr lvl="3"/>
             <a:r>
-              <a:rPr lang="en-US"/>
+              <a:rPr lang="en-US" smtClean="0"/>
               <a:t>Fourth level</a:t>
             </a:r>
           </a:p>
           <a:p>
             <a:pPr lvl="4"/>
             <a:r>
-              <a:rPr lang="en-US"/>
+              <a:rPr lang="en-US" smtClean="0"/>
               <a:t>Fifth level</a:t>
             </a:r>
+            <a:endParaRPr lang="en-US"/>
           </a:p>
         </p:txBody>
       </p:sp>
@@ -588,7 +594,7 @@
           <a:p>
             <a:fld id="{28BE630F-C39C-4DB9-8258-0B48CA067079}" type="datetimeFigureOut">
               <a:rPr lang="en-US" smtClean="0"/>
-              <a:t>11/27/2021</a:t>
+              <a:t>11/25/2021</a:t>
             </a:fld>
             <a:endParaRPr lang="en-US"/>
           </a:p>
@@ -682,9 +688,10 @@
           <a:lstStyle/>
           <a:p>
             <a:r>
-              <a:rPr lang="en-US"/>
+              <a:rPr lang="en-US" smtClean="0"/>
               <a:t>Click to edit Master title style</a:t>
             </a:r>
+            <a:endParaRPr lang="en-US"/>
           </a:p>
         </p:txBody>
       </p:sp>
@@ -705,37 +712,38 @@
           <a:p>
             <a:pPr lvl="0"/>
             <a:r>
-              <a:rPr lang="en-US"/>
+              <a:rPr lang="en-US" smtClean="0"/>
               <a:t>Click to edit Master text styles</a:t>
             </a:r>
           </a:p>
           <a:p>
             <a:pPr lvl="1"/>
             <a:r>
-              <a:rPr lang="en-US"/>
+              <a:rPr lang="en-US" smtClean="0"/>
               <a:t>Second level</a:t>
             </a:r>
           </a:p>
           <a:p>
             <a:pPr lvl="2"/>
             <a:r>
-              <a:rPr lang="en-US"/>
+              <a:rPr lang="en-US" smtClean="0"/>
               <a:t>Third level</a:t>
             </a:r>
           </a:p>
           <a:p>
             <a:pPr lvl="3"/>
             <a:r>
-              <a:rPr lang="en-US"/>
+              <a:rPr lang="en-US" smtClean="0"/>
               <a:t>Fourth level</a:t>
             </a:r>
           </a:p>
           <a:p>
             <a:pPr lvl="4"/>
             <a:r>
-              <a:rPr lang="en-US"/>
+              <a:rPr lang="en-US" smtClean="0"/>
               <a:t>Fifth level</a:t>
             </a:r>
+            <a:endParaRPr lang="en-US"/>
           </a:p>
         </p:txBody>
       </p:sp>
@@ -756,7 +764,7 @@
           <a:p>
             <a:fld id="{28BE630F-C39C-4DB9-8258-0B48CA067079}" type="datetimeFigureOut">
               <a:rPr lang="en-US" smtClean="0"/>
-              <a:t>11/27/2021</a:t>
+              <a:t>11/25/2021</a:t>
             </a:fld>
             <a:endParaRPr lang="en-US"/>
           </a:p>
@@ -859,9 +867,10 @@
           </a:lstStyle>
           <a:p>
             <a:r>
-              <a:rPr lang="en-US"/>
+              <a:rPr lang="en-US" smtClean="0"/>
               <a:t>Click to edit Master title style</a:t>
             </a:r>
+            <a:endParaRPr lang="en-US"/>
           </a:p>
         </p:txBody>
       </p:sp>
@@ -978,7 +987,7 @@
           <a:p>
             <a:pPr lvl="0"/>
             <a:r>
-              <a:rPr lang="en-US"/>
+              <a:rPr lang="en-US" smtClean="0"/>
               <a:t>Click to edit Master text styles</a:t>
             </a:r>
           </a:p>
@@ -1001,7 +1010,7 @@
           <a:p>
             <a:fld id="{28BE630F-C39C-4DB9-8258-0B48CA067079}" type="datetimeFigureOut">
               <a:rPr lang="en-US" smtClean="0"/>
-              <a:t>11/27/2021</a:t>
+              <a:t>11/25/2021</a:t>
             </a:fld>
             <a:endParaRPr lang="en-US"/>
           </a:p>
@@ -1095,9 +1104,10 @@
           <a:lstStyle/>
           <a:p>
             <a:r>
-              <a:rPr lang="en-US"/>
+              <a:rPr lang="en-US" smtClean="0"/>
               <a:t>Click to edit Master title style</a:t>
             </a:r>
+            <a:endParaRPr lang="en-US"/>
           </a:p>
         </p:txBody>
       </p:sp>
@@ -1123,37 +1133,38 @@
           <a:p>
             <a:pPr lvl="0"/>
             <a:r>
-              <a:rPr lang="en-US"/>
+              <a:rPr lang="en-US" smtClean="0"/>
               <a:t>Click to edit Master text styles</a:t>
             </a:r>
           </a:p>
           <a:p>
             <a:pPr lvl="1"/>
             <a:r>
-              <a:rPr lang="en-US"/>
+              <a:rPr lang="en-US" smtClean="0"/>
               <a:t>Second level</a:t>
             </a:r>
           </a:p>
           <a:p>
             <a:pPr lvl="2"/>
             <a:r>
-              <a:rPr lang="en-US"/>
+              <a:rPr lang="en-US" smtClean="0"/>
               <a:t>Third level</a:t>
             </a:r>
           </a:p>
           <a:p>
             <a:pPr lvl="3"/>
             <a:r>
-              <a:rPr lang="en-US"/>
+              <a:rPr lang="en-US" smtClean="0"/>
               <a:t>Fourth level</a:t>
             </a:r>
           </a:p>
           <a:p>
             <a:pPr lvl="4"/>
             <a:r>
-              <a:rPr lang="en-US"/>
+              <a:rPr lang="en-US" smtClean="0"/>
               <a:t>Fifth level</a:t>
             </a:r>
+            <a:endParaRPr lang="en-US"/>
           </a:p>
         </p:txBody>
       </p:sp>
@@ -1179,37 +1190,38 @@
           <a:p>
             <a:pPr lvl="0"/>
             <a:r>
-              <a:rPr lang="en-US"/>
+              <a:rPr lang="en-US" smtClean="0"/>
               <a:t>Click to edit Master text styles</a:t>
             </a:r>
           </a:p>
           <a:p>
             <a:pPr lvl="1"/>
             <a:r>
-              <a:rPr lang="en-US"/>
+              <a:rPr lang="en-US" smtClean="0"/>
               <a:t>Second level</a:t>
             </a:r>
           </a:p>
           <a:p>
             <a:pPr lvl="2"/>
             <a:r>
-              <a:rPr lang="en-US"/>
+              <a:rPr lang="en-US" smtClean="0"/>
               <a:t>Third level</a:t>
             </a:r>
           </a:p>
           <a:p>
             <a:pPr lvl="3"/>
             <a:r>
-              <a:rPr lang="en-US"/>
+              <a:rPr lang="en-US" smtClean="0"/>
               <a:t>Fourth level</a:t>
             </a:r>
           </a:p>
           <a:p>
             <a:pPr lvl="4"/>
             <a:r>
-              <a:rPr lang="en-US"/>
+              <a:rPr lang="en-US" smtClean="0"/>
               <a:t>Fifth level</a:t>
             </a:r>
+            <a:endParaRPr lang="en-US"/>
           </a:p>
         </p:txBody>
       </p:sp>
@@ -1230,7 +1242,7 @@
           <a:p>
             <a:fld id="{28BE630F-C39C-4DB9-8258-0B48CA067079}" type="datetimeFigureOut">
               <a:rPr lang="en-US" smtClean="0"/>
-              <a:t>11/27/2021</a:t>
+              <a:t>11/25/2021</a:t>
             </a:fld>
             <a:endParaRPr lang="en-US"/>
           </a:p>
@@ -1329,9 +1341,10 @@
           <a:lstStyle/>
           <a:p>
             <a:r>
-              <a:rPr lang="en-US"/>
+              <a:rPr lang="en-US" smtClean="0"/>
               <a:t>Click to edit Master title style</a:t>
             </a:r>
+            <a:endParaRPr lang="en-US"/>
           </a:p>
         </p:txBody>
       </p:sp>
@@ -1394,7 +1407,7 @@
           <a:p>
             <a:pPr lvl="0"/>
             <a:r>
-              <a:rPr lang="en-US"/>
+              <a:rPr lang="en-US" smtClean="0"/>
               <a:t>Click to edit Master text styles</a:t>
             </a:r>
           </a:p>
@@ -1422,37 +1435,38 @@
           <a:p>
             <a:pPr lvl="0"/>
             <a:r>
-              <a:rPr lang="en-US"/>
+              <a:rPr lang="en-US" smtClean="0"/>
               <a:t>Click to edit Master text styles</a:t>
             </a:r>
           </a:p>
           <a:p>
             <a:pPr lvl="1"/>
             <a:r>
-              <a:rPr lang="en-US"/>
+              <a:rPr lang="en-US" smtClean="0"/>
               <a:t>Second level</a:t>
             </a:r>
           </a:p>
           <a:p>
             <a:pPr lvl="2"/>
             <a:r>
-              <a:rPr lang="en-US"/>
+              <a:rPr lang="en-US" smtClean="0"/>
               <a:t>Third level</a:t>
             </a:r>
           </a:p>
           <a:p>
             <a:pPr lvl="3"/>
             <a:r>
-              <a:rPr lang="en-US"/>
+              <a:rPr lang="en-US" smtClean="0"/>
               <a:t>Fourth level</a:t>
             </a:r>
           </a:p>
           <a:p>
             <a:pPr lvl="4"/>
             <a:r>
-              <a:rPr lang="en-US"/>
+              <a:rPr lang="en-US" smtClean="0"/>
               <a:t>Fifth level</a:t>
             </a:r>
+            <a:endParaRPr lang="en-US"/>
           </a:p>
         </p:txBody>
       </p:sp>
@@ -1515,7 +1529,7 @@
           <a:p>
             <a:pPr lvl="0"/>
             <a:r>
-              <a:rPr lang="en-US"/>
+              <a:rPr lang="en-US" smtClean="0"/>
               <a:t>Click to edit Master text styles</a:t>
             </a:r>
           </a:p>
@@ -1543,37 +1557,38 @@
           <a:p>
             <a:pPr lvl="0"/>
             <a:r>
-              <a:rPr lang="en-US"/>
+              <a:rPr lang="en-US" smtClean="0"/>
               <a:t>Click to edit Master text styles</a:t>
             </a:r>
           </a:p>
           <a:p>
             <a:pPr lvl="1"/>
             <a:r>
-              <a:rPr lang="en-US"/>
+              <a:rPr lang="en-US" smtClean="0"/>
               <a:t>Second level</a:t>
             </a:r>
           </a:p>
           <a:p>
             <a:pPr lvl="2"/>
             <a:r>
-              <a:rPr lang="en-US"/>
+              <a:rPr lang="en-US" smtClean="0"/>
               <a:t>Third level</a:t>
             </a:r>
           </a:p>
           <a:p>
             <a:pPr lvl="3"/>
             <a:r>
-              <a:rPr lang="en-US"/>
+              <a:rPr lang="en-US" smtClean="0"/>
               <a:t>Fourth level</a:t>
             </a:r>
           </a:p>
           <a:p>
             <a:pPr lvl="4"/>
             <a:r>
-              <a:rPr lang="en-US"/>
+              <a:rPr lang="en-US" smtClean="0"/>
               <a:t>Fifth level</a:t>
             </a:r>
+            <a:endParaRPr lang="en-US"/>
           </a:p>
         </p:txBody>
       </p:sp>
@@ -1594,7 +1609,7 @@
           <a:p>
             <a:fld id="{28BE630F-C39C-4DB9-8258-0B48CA067079}" type="datetimeFigureOut">
               <a:rPr lang="en-US" smtClean="0"/>
-              <a:t>11/27/2021</a:t>
+              <a:t>11/25/2021</a:t>
             </a:fld>
             <a:endParaRPr lang="en-US"/>
           </a:p>
@@ -1688,9 +1703,10 @@
           <a:lstStyle/>
           <a:p>
             <a:r>
-              <a:rPr lang="en-US"/>
+              <a:rPr lang="en-US" smtClean="0"/>
               <a:t>Click to edit Master title style</a:t>
             </a:r>
+            <a:endParaRPr lang="en-US"/>
           </a:p>
         </p:txBody>
       </p:sp>
@@ -1711,7 +1727,7 @@
           <a:p>
             <a:fld id="{28BE630F-C39C-4DB9-8258-0B48CA067079}" type="datetimeFigureOut">
               <a:rPr lang="en-US" smtClean="0"/>
-              <a:t>11/27/2021</a:t>
+              <a:t>11/25/2021</a:t>
             </a:fld>
             <a:endParaRPr lang="en-US"/>
           </a:p>
@@ -1806,7 +1822,7 @@
           <a:p>
             <a:fld id="{28BE630F-C39C-4DB9-8258-0B48CA067079}" type="datetimeFigureOut">
               <a:rPr lang="en-US" smtClean="0"/>
-              <a:t>11/27/2021</a:t>
+              <a:t>11/25/2021</a:t>
             </a:fld>
             <a:endParaRPr lang="en-US"/>
           </a:p>
@@ -1909,9 +1925,10 @@
           </a:lstStyle>
           <a:p>
             <a:r>
-              <a:rPr lang="en-US"/>
+              <a:rPr lang="en-US" smtClean="0"/>
               <a:t>Click to edit Master title style</a:t>
             </a:r>
+            <a:endParaRPr lang="en-US"/>
           </a:p>
         </p:txBody>
       </p:sp>
@@ -1965,37 +1982,38 @@
           <a:p>
             <a:pPr lvl="0"/>
             <a:r>
-              <a:rPr lang="en-US"/>
+              <a:rPr lang="en-US" smtClean="0"/>
               <a:t>Click to edit Master text styles</a:t>
             </a:r>
           </a:p>
           <a:p>
             <a:pPr lvl="1"/>
             <a:r>
-              <a:rPr lang="en-US"/>
+              <a:rPr lang="en-US" smtClean="0"/>
               <a:t>Second level</a:t>
             </a:r>
           </a:p>
           <a:p>
             <a:pPr lvl="2"/>
             <a:r>
-              <a:rPr lang="en-US"/>
+              <a:rPr lang="en-US" smtClean="0"/>
               <a:t>Third level</a:t>
             </a:r>
           </a:p>
           <a:p>
             <a:pPr lvl="3"/>
             <a:r>
-              <a:rPr lang="en-US"/>
+              <a:rPr lang="en-US" smtClean="0"/>
               <a:t>Fourth level</a:t>
             </a:r>
           </a:p>
           <a:p>
             <a:pPr lvl="4"/>
             <a:r>
-              <a:rPr lang="en-US"/>
+              <a:rPr lang="en-US" smtClean="0"/>
               <a:t>Fifth level</a:t>
             </a:r>
+            <a:endParaRPr lang="en-US"/>
           </a:p>
         </p:txBody>
       </p:sp>
@@ -2058,7 +2076,7 @@
           <a:p>
             <a:pPr lvl="0"/>
             <a:r>
-              <a:rPr lang="en-US"/>
+              <a:rPr lang="en-US" smtClean="0"/>
               <a:t>Click to edit Master text styles</a:t>
             </a:r>
           </a:p>
@@ -2081,7 +2099,7 @@
           <a:p>
             <a:fld id="{28BE630F-C39C-4DB9-8258-0B48CA067079}" type="datetimeFigureOut">
               <a:rPr lang="en-US" smtClean="0"/>
-              <a:t>11/27/2021</a:t>
+              <a:t>11/25/2021</a:t>
             </a:fld>
             <a:endParaRPr lang="en-US"/>
           </a:p>
@@ -2184,9 +2202,10 @@
           </a:lstStyle>
           <a:p>
             <a:r>
-              <a:rPr lang="en-US"/>
+              <a:rPr lang="en-US" smtClean="0"/>
               <a:t>Click to edit Master title style</a:t>
             </a:r>
+            <a:endParaRPr lang="en-US"/>
           </a:p>
         </p:txBody>
       </p:sp>
@@ -2310,7 +2329,7 @@
           <a:p>
             <a:pPr lvl="0"/>
             <a:r>
-              <a:rPr lang="en-US"/>
+              <a:rPr lang="en-US" smtClean="0"/>
               <a:t>Click to edit Master text styles</a:t>
             </a:r>
           </a:p>
@@ -2333,7 +2352,7 @@
           <a:p>
             <a:fld id="{28BE630F-C39C-4DB9-8258-0B48CA067079}" type="datetimeFigureOut">
               <a:rPr lang="en-US" smtClean="0"/>
-              <a:t>11/27/2021</a:t>
+              <a:t>11/25/2021</a:t>
             </a:fld>
             <a:endParaRPr lang="en-US"/>
           </a:p>
@@ -2442,9 +2461,10 @@
           <a:lstStyle/>
           <a:p>
             <a:r>
-              <a:rPr lang="en-US"/>
+              <a:rPr lang="en-US" smtClean="0"/>
               <a:t>Click to edit Master title style</a:t>
             </a:r>
+            <a:endParaRPr lang="en-US"/>
           </a:p>
         </p:txBody>
       </p:sp>
@@ -2475,37 +2495,38 @@
           <a:p>
             <a:pPr lvl="0"/>
             <a:r>
-              <a:rPr lang="en-US"/>
+              <a:rPr lang="en-US" smtClean="0"/>
               <a:t>Click to edit Master text styles</a:t>
             </a:r>
           </a:p>
           <a:p>
             <a:pPr lvl="1"/>
             <a:r>
-              <a:rPr lang="en-US"/>
+              <a:rPr lang="en-US" smtClean="0"/>
               <a:t>Second level</a:t>
             </a:r>
           </a:p>
           <a:p>
             <a:pPr lvl="2"/>
             <a:r>
-              <a:rPr lang="en-US"/>
+              <a:rPr lang="en-US" smtClean="0"/>
               <a:t>Third level</a:t>
             </a:r>
           </a:p>
           <a:p>
             <a:pPr lvl="3"/>
             <a:r>
-              <a:rPr lang="en-US"/>
+              <a:rPr lang="en-US" smtClean="0"/>
               <a:t>Fourth level</a:t>
             </a:r>
           </a:p>
           <a:p>
             <a:pPr lvl="4"/>
             <a:r>
-              <a:rPr lang="en-US"/>
+              <a:rPr lang="en-US" smtClean="0"/>
               <a:t>Fifth level</a:t>
             </a:r>
+            <a:endParaRPr lang="en-US"/>
           </a:p>
         </p:txBody>
       </p:sp>
@@ -2544,7 +2565,7 @@
           <a:p>
             <a:fld id="{28BE630F-C39C-4DB9-8258-0B48CA067079}" type="datetimeFigureOut">
               <a:rPr lang="en-US" smtClean="0"/>
-              <a:t>11/27/2021</a:t>
+              <a:t>11/25/2021</a:t>
             </a:fld>
             <a:endParaRPr lang="en-US"/>
           </a:p>
@@ -2983,8 +3004,12 @@
           </a:lstStyle>
           <a:p>
             <a:r>
+              <a:rPr lang="en-US" dirty="0" smtClean="0"/>
+              <a:t>ER DIAGRAMM </a:t>
+            </a:r>
+            <a:r>
               <a:rPr lang="en-US" dirty="0"/>
-              <a:t>ER DIAGRAMM TEMPLATE</a:t>
+              <a:t>TEMPLATE</a:t>
             </a:r>
           </a:p>
         </p:txBody>
@@ -3204,623 +3229,436 @@
           <a:chExt cx="0" cy="0"/>
         </a:xfrm>
       </p:grpSpPr>
-      <p:graphicFrame>
-        <p:nvGraphicFramePr>
-          <p:cNvPr id="114" name="Table 5">
-            <a:extLst>
-              <a:ext uri="{FF2B5EF4-FFF2-40B4-BE49-F238E27FC236}">
-                <a16:creationId xmlns:a16="http://schemas.microsoft.com/office/drawing/2014/main" id="{19B83EBB-F479-46DE-BA55-5DFCFA3E9D5B}"/>
-              </a:ext>
-            </a:extLst>
-          </p:cNvPr>
-          <p:cNvGraphicFramePr>
-            <a:graphicFrameLocks noGrp="1"/>
-          </p:cNvGraphicFramePr>
-          <p:nvPr>
-            <p:extLst>
-              <p:ext uri="{D42A27DB-BD31-4B8C-83A1-F6EECF244321}">
-                <p14:modId xmlns:p14="http://schemas.microsoft.com/office/powerpoint/2010/main" val="629115299"/>
-              </p:ext>
-            </p:extLst>
-          </p:nvPr>
-        </p:nvGraphicFramePr>
-        <p:xfrm>
-          <a:off x="4542456" y="4636245"/>
-          <a:ext cx="2871304" cy="2221755"/>
-        </p:xfrm>
-        <a:graphic>
-          <a:graphicData uri="http://schemas.openxmlformats.org/drawingml/2006/table">
-            <a:tbl>
-              <a:tblPr firstRow="1" bandRow="1">
-                <a:tableStyleId>{5C22544A-7EE6-4342-B048-85BDC9FD1C3A}</a:tableStyleId>
-              </a:tblPr>
-              <a:tblGrid>
-                <a:gridCol w="485913">
-                  <a:extLst>
-                    <a:ext uri="{9D8B030D-6E8A-4147-A177-3AD203B41FA5}">
-                      <a16:colId xmlns:a16="http://schemas.microsoft.com/office/drawing/2014/main" val="885829964"/>
-                    </a:ext>
-                  </a:extLst>
-                </a:gridCol>
-                <a:gridCol w="2385391">
-                  <a:extLst>
-                    <a:ext uri="{9D8B030D-6E8A-4147-A177-3AD203B41FA5}">
-                      <a16:colId xmlns:a16="http://schemas.microsoft.com/office/drawing/2014/main" val="3479576876"/>
-                    </a:ext>
-                  </a:extLst>
-                </a:gridCol>
-              </a:tblGrid>
-              <a:tr h="484395">
-                <a:tc gridSpan="2">
-                  <a:txBody>
-                    <a:bodyPr/>
-                    <a:lstStyle/>
-                    <a:p>
-                      <a:pPr algn="ctr"/>
-                      <a:r>
-                        <a:rPr lang="en-US" dirty="0"/>
-                        <a:t>User</a:t>
-                      </a:r>
-                    </a:p>
-                  </a:txBody>
-                  <a:tcPr/>
-                </a:tc>
-                <a:tc hMerge="1">
-                  <a:txBody>
-                    <a:bodyPr/>
-                    <a:lstStyle/>
-                    <a:p>
-                      <a:endParaRPr lang="en-US" dirty="0"/>
-                    </a:p>
-                  </a:txBody>
-                  <a:tcPr/>
-                </a:tc>
-                <a:extLst>
-                  <a:ext uri="{0D108BD9-81ED-4DB2-BD59-A6C34878D82A}">
-                    <a16:rowId xmlns:a16="http://schemas.microsoft.com/office/drawing/2014/main" val="290390624"/>
-                  </a:ext>
-                </a:extLst>
-              </a:tr>
-              <a:tr h="1614751">
-                <a:tc>
-                  <a:txBody>
-                    <a:bodyPr/>
-                    <a:lstStyle/>
-                    <a:p>
-                      <a:r>
-                        <a:rPr lang="en-US" sz="1600" dirty="0"/>
-                        <a:t>PK</a:t>
-                      </a:r>
-                    </a:p>
-                  </a:txBody>
-                  <a:tcPr/>
-                </a:tc>
-                <a:tc>
-                  <a:txBody>
-                    <a:bodyPr/>
-                    <a:lstStyle/>
-                    <a:p>
-                      <a:r>
-                        <a:rPr lang="en-US" dirty="0" err="1"/>
-                        <a:t>userId</a:t>
-                      </a:r>
-                      <a:r>
-                        <a:rPr lang="en-US" dirty="0"/>
-                        <a:t>: int()</a:t>
-                      </a:r>
-                    </a:p>
-                    <a:p>
-                      <a:r>
-                        <a:rPr lang="en-US" dirty="0" err="1"/>
-                        <a:t>userName</a:t>
-                      </a:r>
-                      <a:r>
-                        <a:rPr lang="en-US" dirty="0"/>
-                        <a:t>: varchar(40)</a:t>
-                      </a:r>
-                    </a:p>
-                    <a:p>
-                      <a:r>
-                        <a:rPr lang="en-US" dirty="0"/>
-                        <a:t>Email: varchar(100)</a:t>
-                      </a:r>
-                    </a:p>
-                    <a:p>
-                      <a:r>
-                        <a:rPr lang="en-US" dirty="0"/>
-                        <a:t>Password: varchar(50)</a:t>
-                      </a:r>
-                    </a:p>
-                    <a:p>
-                      <a:r>
-                        <a:rPr lang="en-US" dirty="0"/>
-                        <a:t>Role: varchar(40)</a:t>
-                      </a:r>
-                    </a:p>
-                    <a:p>
-                      <a:r>
-                        <a:rPr lang="en-US" dirty="0"/>
-                        <a:t>Profile: varchar(200)</a:t>
-                      </a:r>
-                    </a:p>
-                  </a:txBody>
-                  <a:tcPr/>
-                </a:tc>
-                <a:extLst>
-                  <a:ext uri="{0D108BD9-81ED-4DB2-BD59-A6C34878D82A}">
-                    <a16:rowId xmlns:a16="http://schemas.microsoft.com/office/drawing/2014/main" val="553212164"/>
-                  </a:ext>
-                </a:extLst>
-              </a:tr>
-            </a:tbl>
-          </a:graphicData>
-        </a:graphic>
-      </p:graphicFrame>
-      <p:graphicFrame>
-        <p:nvGraphicFramePr>
-          <p:cNvPr id="115" name="Table 114">
-            <a:extLst>
-              <a:ext uri="{FF2B5EF4-FFF2-40B4-BE49-F238E27FC236}">
-                <a16:creationId xmlns:a16="http://schemas.microsoft.com/office/drawing/2014/main" id="{21EC6D8D-3F74-46BA-8551-FBC8C09D19DA}"/>
-              </a:ext>
-            </a:extLst>
-          </p:cNvPr>
-          <p:cNvGraphicFramePr>
-            <a:graphicFrameLocks noGrp="1"/>
-          </p:cNvGraphicFramePr>
-          <p:nvPr>
-            <p:extLst>
-              <p:ext uri="{D42A27DB-BD31-4B8C-83A1-F6EECF244321}">
-                <p14:modId xmlns:p14="http://schemas.microsoft.com/office/powerpoint/2010/main" val="1749973673"/>
-              </p:ext>
-            </p:extLst>
-          </p:nvPr>
-        </p:nvGraphicFramePr>
-        <p:xfrm>
-          <a:off x="4531139" y="111979"/>
-          <a:ext cx="3129722" cy="2455629"/>
-        </p:xfrm>
-        <a:graphic>
-          <a:graphicData uri="http://schemas.openxmlformats.org/drawingml/2006/table">
-            <a:tbl>
-              <a:tblPr firstRow="1" bandRow="1">
-                <a:tableStyleId>{5C22544A-7EE6-4342-B048-85BDC9FD1C3A}</a:tableStyleId>
-              </a:tblPr>
-              <a:tblGrid>
-                <a:gridCol w="529645">
-                  <a:extLst>
-                    <a:ext uri="{9D8B030D-6E8A-4147-A177-3AD203B41FA5}">
-                      <a16:colId xmlns:a16="http://schemas.microsoft.com/office/drawing/2014/main" val="885829964"/>
-                    </a:ext>
-                  </a:extLst>
-                </a:gridCol>
-                <a:gridCol w="2600077">
-                  <a:extLst>
-                    <a:ext uri="{9D8B030D-6E8A-4147-A177-3AD203B41FA5}">
-                      <a16:colId xmlns:a16="http://schemas.microsoft.com/office/drawing/2014/main" val="3479576876"/>
-                    </a:ext>
-                  </a:extLst>
-                </a:gridCol>
-              </a:tblGrid>
-              <a:tr h="443949">
-                <a:tc gridSpan="2">
-                  <a:txBody>
-                    <a:bodyPr/>
-                    <a:lstStyle/>
-                    <a:p>
-                      <a:pPr algn="ctr"/>
-                      <a:r>
-                        <a:rPr lang="en-US" dirty="0"/>
-                        <a:t>Event</a:t>
-                      </a:r>
-                    </a:p>
-                  </a:txBody>
-                  <a:tcPr/>
-                </a:tc>
-                <a:tc hMerge="1">
-                  <a:txBody>
-                    <a:bodyPr/>
-                    <a:lstStyle/>
-                    <a:p>
-                      <a:endParaRPr lang="en-US" dirty="0"/>
-                    </a:p>
-                  </a:txBody>
-                  <a:tcPr/>
-                </a:tc>
-                <a:extLst>
-                  <a:ext uri="{0D108BD9-81ED-4DB2-BD59-A6C34878D82A}">
-                    <a16:rowId xmlns:a16="http://schemas.microsoft.com/office/drawing/2014/main" val="290390624"/>
-                  </a:ext>
-                </a:extLst>
-              </a:tr>
-              <a:tr h="1614751">
-                <a:tc>
-                  <a:txBody>
-                    <a:bodyPr/>
-                    <a:lstStyle/>
-                    <a:p>
-                      <a:r>
-                        <a:rPr lang="en-US" sz="1600" dirty="0"/>
-                        <a:t>PK</a:t>
-                      </a:r>
-                    </a:p>
-                    <a:p>
-                      <a:endParaRPr lang="en-US" dirty="0"/>
-                    </a:p>
-                    <a:p>
-                      <a:endParaRPr lang="en-US" dirty="0"/>
-                    </a:p>
-                    <a:p>
-                      <a:endParaRPr lang="en-US" dirty="0"/>
-                    </a:p>
-                    <a:p>
-                      <a:endParaRPr lang="en-US" dirty="0"/>
-                    </a:p>
-                    <a:p>
-                      <a:endParaRPr lang="en-US" dirty="0"/>
-                    </a:p>
-                    <a:p>
-                      <a:r>
-                        <a:rPr lang="en-US" sz="1600" dirty="0"/>
-                        <a:t>FK</a:t>
-                      </a:r>
-                    </a:p>
-                  </a:txBody>
-                  <a:tcPr/>
-                </a:tc>
-                <a:tc>
-                  <a:txBody>
-                    <a:bodyPr/>
-                    <a:lstStyle/>
-                    <a:p>
-                      <a:r>
-                        <a:rPr lang="en-US" dirty="0" err="1"/>
-                        <a:t>eventId</a:t>
-                      </a:r>
-                      <a:r>
-                        <a:rPr lang="en-US" dirty="0"/>
-                        <a:t>: int()</a:t>
-                      </a:r>
-                    </a:p>
-                    <a:p>
-                      <a:r>
-                        <a:rPr lang="en-US" dirty="0"/>
-                        <a:t>title: varchar(60)</a:t>
-                      </a:r>
-                    </a:p>
-                    <a:p>
-                      <a:r>
-                        <a:rPr lang="en-US" dirty="0"/>
-                        <a:t>date: date</a:t>
-                      </a:r>
-                    </a:p>
-                    <a:p>
-                      <a:r>
-                        <a:rPr lang="en-US" dirty="0"/>
-                        <a:t>description: varchar(100)</a:t>
-                      </a:r>
-                    </a:p>
-                    <a:p>
-                      <a:r>
-                        <a:rPr lang="en-US" dirty="0"/>
-                        <a:t>image: text()</a:t>
-                      </a:r>
-                    </a:p>
-                    <a:p>
-                      <a:r>
-                        <a:rPr lang="en-US" dirty="0"/>
-                        <a:t>interest: number()</a:t>
-                      </a:r>
-                    </a:p>
-                    <a:p>
-                      <a:r>
-                        <a:rPr lang="en-US" dirty="0" err="1"/>
-                        <a:t>categoryId</a:t>
-                      </a:r>
-                      <a:r>
-                        <a:rPr lang="en-US" dirty="0"/>
-                        <a:t>: int()</a:t>
-                      </a:r>
-                    </a:p>
-                  </a:txBody>
-                  <a:tcPr/>
-                </a:tc>
-                <a:extLst>
-                  <a:ext uri="{0D108BD9-81ED-4DB2-BD59-A6C34878D82A}">
-                    <a16:rowId xmlns:a16="http://schemas.microsoft.com/office/drawing/2014/main" val="553212164"/>
-                  </a:ext>
-                </a:extLst>
-              </a:tr>
-            </a:tbl>
-          </a:graphicData>
-        </a:graphic>
-      </p:graphicFrame>
-      <p:graphicFrame>
-        <p:nvGraphicFramePr>
-          <p:cNvPr id="116" name="Table 115">
-            <a:extLst>
-              <a:ext uri="{FF2B5EF4-FFF2-40B4-BE49-F238E27FC236}">
-                <a16:creationId xmlns:a16="http://schemas.microsoft.com/office/drawing/2014/main" id="{7955E64D-C7AF-45CF-B7DB-52BA88BEED16}"/>
-              </a:ext>
-            </a:extLst>
-          </p:cNvPr>
-          <p:cNvGraphicFramePr>
-            <a:graphicFrameLocks noGrp="1"/>
-          </p:cNvGraphicFramePr>
-          <p:nvPr>
-            <p:extLst>
-              <p:ext uri="{D42A27DB-BD31-4B8C-83A1-F6EECF244321}">
-                <p14:modId xmlns:p14="http://schemas.microsoft.com/office/powerpoint/2010/main" val="3598712122"/>
-              </p:ext>
-            </p:extLst>
-          </p:nvPr>
-        </p:nvGraphicFramePr>
-        <p:xfrm>
-          <a:off x="8379785" y="3429000"/>
-          <a:ext cx="3282120" cy="1005840"/>
-        </p:xfrm>
-        <a:graphic>
-          <a:graphicData uri="http://schemas.openxmlformats.org/drawingml/2006/table">
-            <a:tbl>
-              <a:tblPr firstRow="1" bandRow="1">
-                <a:tableStyleId>{5C22544A-7EE6-4342-B048-85BDC9FD1C3A}</a:tableStyleId>
-              </a:tblPr>
-              <a:tblGrid>
-                <a:gridCol w="555435">
-                  <a:extLst>
-                    <a:ext uri="{9D8B030D-6E8A-4147-A177-3AD203B41FA5}">
-                      <a16:colId xmlns:a16="http://schemas.microsoft.com/office/drawing/2014/main" val="885829964"/>
-                    </a:ext>
-                  </a:extLst>
-                </a:gridCol>
-                <a:gridCol w="2726685">
-                  <a:extLst>
-                    <a:ext uri="{9D8B030D-6E8A-4147-A177-3AD203B41FA5}">
-                      <a16:colId xmlns:a16="http://schemas.microsoft.com/office/drawing/2014/main" val="3479576876"/>
-                    </a:ext>
-                  </a:extLst>
-                </a:gridCol>
-              </a:tblGrid>
-              <a:tr h="173397">
-                <a:tc gridSpan="2">
-                  <a:txBody>
-                    <a:bodyPr/>
-                    <a:lstStyle/>
-                    <a:p>
-                      <a:pPr algn="ctr"/>
-                      <a:r>
-                        <a:rPr lang="en-US" dirty="0"/>
-                        <a:t>Category</a:t>
-                      </a:r>
-                    </a:p>
-                  </a:txBody>
-                  <a:tcPr/>
-                </a:tc>
-                <a:tc hMerge="1">
-                  <a:txBody>
-                    <a:bodyPr/>
-                    <a:lstStyle/>
-                    <a:p>
-                      <a:endParaRPr lang="en-US" dirty="0"/>
-                    </a:p>
-                  </a:txBody>
-                  <a:tcPr/>
-                </a:tc>
-                <a:extLst>
-                  <a:ext uri="{0D108BD9-81ED-4DB2-BD59-A6C34878D82A}">
-                    <a16:rowId xmlns:a16="http://schemas.microsoft.com/office/drawing/2014/main" val="290390624"/>
-                  </a:ext>
-                </a:extLst>
-              </a:tr>
-              <a:tr h="320247">
-                <a:tc>
-                  <a:txBody>
-                    <a:bodyPr/>
-                    <a:lstStyle/>
-                    <a:p>
-                      <a:r>
-                        <a:rPr lang="en-US" sz="1600" dirty="0"/>
-                        <a:t>PK</a:t>
-                      </a:r>
-                    </a:p>
-                  </a:txBody>
-                  <a:tcPr/>
-                </a:tc>
-                <a:tc>
-                  <a:txBody>
-                    <a:bodyPr/>
-                    <a:lstStyle/>
-                    <a:p>
-                      <a:r>
-                        <a:rPr lang="en-US" dirty="0" err="1"/>
-                        <a:t>categoryId</a:t>
-                      </a:r>
-                      <a:r>
-                        <a:rPr lang="en-US" dirty="0"/>
-                        <a:t>: int()</a:t>
-                      </a:r>
-                    </a:p>
-                    <a:p>
-                      <a:r>
-                        <a:rPr lang="en-US" dirty="0" err="1"/>
-                        <a:t>categoryName</a:t>
-                      </a:r>
-                      <a:r>
-                        <a:rPr lang="en-US" dirty="0"/>
-                        <a:t>: varchar(50)</a:t>
-                      </a:r>
-                    </a:p>
-                  </a:txBody>
-                  <a:tcPr/>
-                </a:tc>
-                <a:extLst>
-                  <a:ext uri="{0D108BD9-81ED-4DB2-BD59-A6C34878D82A}">
-                    <a16:rowId xmlns:a16="http://schemas.microsoft.com/office/drawing/2014/main" val="553212164"/>
-                  </a:ext>
-                </a:extLst>
-              </a:tr>
-            </a:tbl>
-          </a:graphicData>
-        </a:graphic>
-      </p:graphicFrame>
-      <p:graphicFrame>
-        <p:nvGraphicFramePr>
-          <p:cNvPr id="117" name="Table 116">
-            <a:extLst>
-              <a:ext uri="{FF2B5EF4-FFF2-40B4-BE49-F238E27FC236}">
-                <a16:creationId xmlns:a16="http://schemas.microsoft.com/office/drawing/2014/main" id="{4E45729C-D021-4D29-8D2F-5AABA6C32ADC}"/>
-              </a:ext>
-            </a:extLst>
-          </p:cNvPr>
-          <p:cNvGraphicFramePr>
-            <a:graphicFrameLocks noGrp="1"/>
-          </p:cNvGraphicFramePr>
-          <p:nvPr>
-            <p:extLst>
-              <p:ext uri="{D42A27DB-BD31-4B8C-83A1-F6EECF244321}">
-                <p14:modId xmlns:p14="http://schemas.microsoft.com/office/powerpoint/2010/main" val="3426239289"/>
-              </p:ext>
-            </p:extLst>
-          </p:nvPr>
-        </p:nvGraphicFramePr>
-        <p:xfrm>
-          <a:off x="437329" y="2693506"/>
-          <a:ext cx="2502448" cy="1005840"/>
-        </p:xfrm>
-        <a:graphic>
-          <a:graphicData uri="http://schemas.openxmlformats.org/drawingml/2006/table">
-            <a:tbl>
-              <a:tblPr firstRow="1" bandRow="1">
-                <a:tableStyleId>{5C22544A-7EE6-4342-B048-85BDC9FD1C3A}</a:tableStyleId>
-              </a:tblPr>
-              <a:tblGrid>
-                <a:gridCol w="423491">
-                  <a:extLst>
-                    <a:ext uri="{9D8B030D-6E8A-4147-A177-3AD203B41FA5}">
-                      <a16:colId xmlns:a16="http://schemas.microsoft.com/office/drawing/2014/main" val="885829964"/>
-                    </a:ext>
-                  </a:extLst>
-                </a:gridCol>
-                <a:gridCol w="2078957">
-                  <a:extLst>
-                    <a:ext uri="{9D8B030D-6E8A-4147-A177-3AD203B41FA5}">
-                      <a16:colId xmlns:a16="http://schemas.microsoft.com/office/drawing/2014/main" val="3479576876"/>
-                    </a:ext>
-                  </a:extLst>
-                </a:gridCol>
-              </a:tblGrid>
-              <a:tr h="210502">
-                <a:tc gridSpan="2">
-                  <a:txBody>
-                    <a:bodyPr/>
-                    <a:lstStyle/>
-                    <a:p>
-                      <a:pPr algn="ctr"/>
-                      <a:r>
-                        <a:rPr lang="en-US" dirty="0" err="1"/>
-                        <a:t>User_event</a:t>
-                      </a:r>
-                      <a:endParaRPr lang="en-US" dirty="0"/>
-                    </a:p>
-                  </a:txBody>
-                  <a:tcPr/>
-                </a:tc>
-                <a:tc hMerge="1">
-                  <a:txBody>
-                    <a:bodyPr/>
-                    <a:lstStyle/>
-                    <a:p>
-                      <a:endParaRPr lang="en-US" dirty="0"/>
-                    </a:p>
-                  </a:txBody>
-                  <a:tcPr/>
-                </a:tc>
-                <a:extLst>
-                  <a:ext uri="{0D108BD9-81ED-4DB2-BD59-A6C34878D82A}">
-                    <a16:rowId xmlns:a16="http://schemas.microsoft.com/office/drawing/2014/main" val="290390624"/>
-                  </a:ext>
-                </a:extLst>
-              </a:tr>
-              <a:tr h="320247">
-                <a:tc>
-                  <a:txBody>
-                    <a:bodyPr/>
-                    <a:lstStyle/>
-                    <a:p>
-                      <a:r>
-                        <a:rPr lang="en-US" sz="1600" dirty="0"/>
-                        <a:t>FK</a:t>
-                      </a:r>
-                    </a:p>
-                    <a:p>
-                      <a:r>
-                        <a:rPr lang="en-US" sz="1600" dirty="0"/>
-                        <a:t>FK</a:t>
-                      </a:r>
-                    </a:p>
-                  </a:txBody>
-                  <a:tcPr/>
-                </a:tc>
-                <a:tc>
-                  <a:txBody>
-                    <a:bodyPr/>
-                    <a:lstStyle/>
-                    <a:p>
-                      <a:r>
-                        <a:rPr lang="en-US" dirty="0" err="1"/>
-                        <a:t>userId</a:t>
-                      </a:r>
-                      <a:r>
-                        <a:rPr lang="en-US" dirty="0"/>
-                        <a:t>: int()</a:t>
-                      </a:r>
-                    </a:p>
-                    <a:p>
-                      <a:r>
-                        <a:rPr lang="en-US" dirty="0" err="1"/>
-                        <a:t>eventide:int</a:t>
-                      </a:r>
-                      <a:r>
-                        <a:rPr lang="en-US" dirty="0"/>
-                        <a:t>()</a:t>
-                      </a:r>
-                    </a:p>
-                  </a:txBody>
-                  <a:tcPr/>
-                </a:tc>
-                <a:extLst>
-                  <a:ext uri="{0D108BD9-81ED-4DB2-BD59-A6C34878D82A}">
-                    <a16:rowId xmlns:a16="http://schemas.microsoft.com/office/drawing/2014/main" val="553212164"/>
-                  </a:ext>
-                </a:extLst>
-              </a:tr>
-            </a:tbl>
-          </a:graphicData>
-        </a:graphic>
-      </p:graphicFrame>
+      <p:sp>
+        <p:nvSpPr>
+          <p:cNvPr id="51" name="Rectangle 50"/>
+          <p:cNvSpPr/>
+          <p:nvPr/>
+        </p:nvSpPr>
+        <p:spPr>
+          <a:xfrm>
+            <a:off x="635970" y="224804"/>
+            <a:ext cx="1803043" cy="2428643"/>
+          </a:xfrm>
+          <a:prstGeom prst="rect">
+            <a:avLst/>
+          </a:prstGeom>
+        </p:spPr>
+        <p:style>
+          <a:lnRef idx="2">
+            <a:schemeClr val="dk1"/>
+          </a:lnRef>
+          <a:fillRef idx="1">
+            <a:schemeClr val="lt1"/>
+          </a:fillRef>
+          <a:effectRef idx="0">
+            <a:schemeClr val="dk1"/>
+          </a:effectRef>
+          <a:fontRef idx="minor">
+            <a:schemeClr val="dk1"/>
+          </a:fontRef>
+        </p:style>
+        <p:txBody>
+          <a:bodyPr rtlCol="0" anchor="ctr"/>
+          <a:lstStyle/>
+          <a:p>
+            <a:pPr algn="ctr"/>
+            <a:endParaRPr lang="en-US"/>
+          </a:p>
+        </p:txBody>
+      </p:sp>
+      <p:sp>
+        <p:nvSpPr>
+          <p:cNvPr id="52" name="TextBox 51"/>
+          <p:cNvSpPr txBox="1"/>
+          <p:nvPr/>
+        </p:nvSpPr>
+        <p:spPr>
+          <a:xfrm>
+            <a:off x="1117343" y="314958"/>
+            <a:ext cx="633507" cy="369332"/>
+          </a:xfrm>
+          <a:prstGeom prst="rect">
+            <a:avLst/>
+          </a:prstGeom>
+          <a:noFill/>
+        </p:spPr>
+        <p:txBody>
+          <a:bodyPr wrap="none" rtlCol="0">
+            <a:spAutoFit/>
+          </a:bodyPr>
+          <a:lstStyle/>
+          <a:p>
+            <a:r>
+              <a:rPr lang="en-US" b="1" dirty="0" smtClean="0"/>
+              <a:t>class</a:t>
+            </a:r>
+            <a:endParaRPr lang="en-US" b="1" dirty="0"/>
+          </a:p>
+        </p:txBody>
+      </p:sp>
+      <p:sp>
+        <p:nvSpPr>
+          <p:cNvPr id="53" name="Rectangle 52"/>
+          <p:cNvSpPr/>
+          <p:nvPr/>
+        </p:nvSpPr>
+        <p:spPr>
+          <a:xfrm>
+            <a:off x="3301896" y="224804"/>
+            <a:ext cx="1803043" cy="2428643"/>
+          </a:xfrm>
+          <a:prstGeom prst="rect">
+            <a:avLst/>
+          </a:prstGeom>
+        </p:spPr>
+        <p:style>
+          <a:lnRef idx="2">
+            <a:schemeClr val="dk1"/>
+          </a:lnRef>
+          <a:fillRef idx="1">
+            <a:schemeClr val="lt1"/>
+          </a:fillRef>
+          <a:effectRef idx="0">
+            <a:schemeClr val="dk1"/>
+          </a:effectRef>
+          <a:fontRef idx="minor">
+            <a:schemeClr val="dk1"/>
+          </a:fontRef>
+        </p:style>
+        <p:txBody>
+          <a:bodyPr rtlCol="0" anchor="ctr"/>
+          <a:lstStyle/>
+          <a:p>
+            <a:pPr algn="ctr"/>
+            <a:endParaRPr lang="en-US"/>
+          </a:p>
+        </p:txBody>
+      </p:sp>
+      <p:sp>
+        <p:nvSpPr>
+          <p:cNvPr id="54" name="TextBox 53"/>
+          <p:cNvSpPr txBox="1"/>
+          <p:nvPr/>
+        </p:nvSpPr>
+        <p:spPr>
+          <a:xfrm>
+            <a:off x="3783269" y="314958"/>
+            <a:ext cx="917367" cy="369332"/>
+          </a:xfrm>
+          <a:prstGeom prst="rect">
+            <a:avLst/>
+          </a:prstGeom>
+          <a:noFill/>
+        </p:spPr>
+        <p:txBody>
+          <a:bodyPr wrap="none" rtlCol="0">
+            <a:spAutoFit/>
+          </a:bodyPr>
+          <a:lstStyle/>
+          <a:p>
+            <a:r>
+              <a:rPr lang="en-US" b="1" dirty="0" smtClean="0"/>
+              <a:t>student</a:t>
+            </a:r>
+            <a:endParaRPr lang="en-US" b="1" dirty="0"/>
+          </a:p>
+        </p:txBody>
+      </p:sp>
+      <p:sp>
+        <p:nvSpPr>
+          <p:cNvPr id="55" name="Rectangle 54"/>
+          <p:cNvSpPr/>
+          <p:nvPr/>
+        </p:nvSpPr>
+        <p:spPr>
+          <a:xfrm>
+            <a:off x="5967822" y="224804"/>
+            <a:ext cx="1803043" cy="2428643"/>
+          </a:xfrm>
+          <a:prstGeom prst="rect">
+            <a:avLst/>
+          </a:prstGeom>
+        </p:spPr>
+        <p:style>
+          <a:lnRef idx="2">
+            <a:schemeClr val="dk1"/>
+          </a:lnRef>
+          <a:fillRef idx="1">
+            <a:schemeClr val="lt1"/>
+          </a:fillRef>
+          <a:effectRef idx="0">
+            <a:schemeClr val="dk1"/>
+          </a:effectRef>
+          <a:fontRef idx="minor">
+            <a:schemeClr val="dk1"/>
+          </a:fontRef>
+        </p:style>
+        <p:txBody>
+          <a:bodyPr rtlCol="0" anchor="ctr"/>
+          <a:lstStyle/>
+          <a:p>
+            <a:pPr algn="ctr"/>
+            <a:endParaRPr lang="en-US"/>
+          </a:p>
+        </p:txBody>
+      </p:sp>
+      <p:sp>
+        <p:nvSpPr>
+          <p:cNvPr id="56" name="TextBox 55"/>
+          <p:cNvSpPr txBox="1"/>
+          <p:nvPr/>
+        </p:nvSpPr>
+        <p:spPr>
+          <a:xfrm>
+            <a:off x="6209194" y="314959"/>
+            <a:ext cx="1320298" cy="369332"/>
+          </a:xfrm>
+          <a:prstGeom prst="rect">
+            <a:avLst/>
+          </a:prstGeom>
+          <a:noFill/>
+        </p:spPr>
+        <p:txBody>
+          <a:bodyPr wrap="none" rtlCol="0">
+            <a:spAutoFit/>
+          </a:bodyPr>
+          <a:lstStyle/>
+          <a:p>
+            <a:r>
+              <a:rPr lang="en-US" b="1" dirty="0" smtClean="0"/>
+              <a:t>exam_score</a:t>
+            </a:r>
+            <a:endParaRPr lang="en-US" b="1" dirty="0"/>
+          </a:p>
+        </p:txBody>
+      </p:sp>
+      <p:sp>
+        <p:nvSpPr>
+          <p:cNvPr id="57" name="Rectangle 56"/>
+          <p:cNvSpPr/>
+          <p:nvPr/>
+        </p:nvSpPr>
+        <p:spPr>
+          <a:xfrm>
+            <a:off x="9251935" y="224803"/>
+            <a:ext cx="1803043" cy="2428643"/>
+          </a:xfrm>
+          <a:prstGeom prst="rect">
+            <a:avLst/>
+          </a:prstGeom>
+        </p:spPr>
+        <p:style>
+          <a:lnRef idx="2">
+            <a:schemeClr val="dk1"/>
+          </a:lnRef>
+          <a:fillRef idx="1">
+            <a:schemeClr val="lt1"/>
+          </a:fillRef>
+          <a:effectRef idx="0">
+            <a:schemeClr val="dk1"/>
+          </a:effectRef>
+          <a:fontRef idx="minor">
+            <a:schemeClr val="dk1"/>
+          </a:fontRef>
+        </p:style>
+        <p:txBody>
+          <a:bodyPr rtlCol="0" anchor="ctr"/>
+          <a:lstStyle/>
+          <a:p>
+            <a:pPr algn="ctr"/>
+            <a:endParaRPr lang="en-US"/>
+          </a:p>
+        </p:txBody>
+      </p:sp>
+      <p:sp>
+        <p:nvSpPr>
+          <p:cNvPr id="58" name="TextBox 57"/>
+          <p:cNvSpPr txBox="1"/>
+          <p:nvPr/>
+        </p:nvSpPr>
+        <p:spPr>
+          <a:xfrm>
+            <a:off x="9493307" y="314958"/>
+            <a:ext cx="1243482" cy="369332"/>
+          </a:xfrm>
+          <a:prstGeom prst="rect">
+            <a:avLst/>
+          </a:prstGeom>
+          <a:noFill/>
+        </p:spPr>
+        <p:txBody>
+          <a:bodyPr wrap="none" rtlCol="0">
+            <a:spAutoFit/>
+          </a:bodyPr>
+          <a:lstStyle/>
+          <a:p>
+            <a:r>
+              <a:rPr lang="en-US" b="1" dirty="0" smtClean="0"/>
+              <a:t>exam_type</a:t>
+            </a:r>
+            <a:endParaRPr lang="en-US" b="1" dirty="0"/>
+          </a:p>
+        </p:txBody>
+      </p:sp>
+      <p:sp>
+        <p:nvSpPr>
+          <p:cNvPr id="59" name="Rectangle 58"/>
+          <p:cNvSpPr/>
+          <p:nvPr/>
+        </p:nvSpPr>
+        <p:spPr>
+          <a:xfrm>
+            <a:off x="5980354" y="4186801"/>
+            <a:ext cx="1803043" cy="2009105"/>
+          </a:xfrm>
+          <a:prstGeom prst="rect">
+            <a:avLst/>
+          </a:prstGeom>
+        </p:spPr>
+        <p:style>
+          <a:lnRef idx="2">
+            <a:schemeClr val="dk1"/>
+          </a:lnRef>
+          <a:fillRef idx="1">
+            <a:schemeClr val="lt1"/>
+          </a:fillRef>
+          <a:effectRef idx="0">
+            <a:schemeClr val="dk1"/>
+          </a:effectRef>
+          <a:fontRef idx="minor">
+            <a:schemeClr val="dk1"/>
+          </a:fontRef>
+        </p:style>
+        <p:txBody>
+          <a:bodyPr rtlCol="0" anchor="ctr"/>
+          <a:lstStyle/>
+          <a:p>
+            <a:pPr algn="ctr"/>
+            <a:endParaRPr lang="en-US"/>
+          </a:p>
+        </p:txBody>
+      </p:sp>
+      <p:sp>
+        <p:nvSpPr>
+          <p:cNvPr id="60" name="TextBox 59"/>
+          <p:cNvSpPr txBox="1"/>
+          <p:nvPr/>
+        </p:nvSpPr>
+        <p:spPr>
+          <a:xfrm>
+            <a:off x="6506612" y="4223154"/>
+            <a:ext cx="661720" cy="369332"/>
+          </a:xfrm>
+          <a:prstGeom prst="rect">
+            <a:avLst/>
+          </a:prstGeom>
+          <a:noFill/>
+        </p:spPr>
+        <p:txBody>
+          <a:bodyPr wrap="none" rtlCol="0">
+            <a:spAutoFit/>
+          </a:bodyPr>
+          <a:lstStyle/>
+          <a:p>
+            <a:r>
+              <a:rPr lang="en-US" b="1" dirty="0" smtClean="0"/>
+              <a:t>topic</a:t>
+            </a:r>
+            <a:endParaRPr lang="en-US" b="1" dirty="0"/>
+          </a:p>
+        </p:txBody>
+      </p:sp>
+      <p:sp>
+        <p:nvSpPr>
+          <p:cNvPr id="61" name="Rectangle 60"/>
+          <p:cNvSpPr/>
+          <p:nvPr/>
+        </p:nvSpPr>
+        <p:spPr>
+          <a:xfrm>
+            <a:off x="630766" y="4186801"/>
+            <a:ext cx="1803043" cy="2009105"/>
+          </a:xfrm>
+          <a:prstGeom prst="rect">
+            <a:avLst/>
+          </a:prstGeom>
+        </p:spPr>
+        <p:style>
+          <a:lnRef idx="2">
+            <a:schemeClr val="dk1"/>
+          </a:lnRef>
+          <a:fillRef idx="1">
+            <a:schemeClr val="lt1"/>
+          </a:fillRef>
+          <a:effectRef idx="0">
+            <a:schemeClr val="dk1"/>
+          </a:effectRef>
+          <a:fontRef idx="minor">
+            <a:schemeClr val="dk1"/>
+          </a:fontRef>
+        </p:style>
+        <p:txBody>
+          <a:bodyPr rtlCol="0" anchor="ctr"/>
+          <a:lstStyle/>
+          <a:p>
+            <a:pPr algn="ctr"/>
+            <a:endParaRPr lang="en-US"/>
+          </a:p>
+        </p:txBody>
+      </p:sp>
+      <p:sp>
+        <p:nvSpPr>
+          <p:cNvPr id="62" name="TextBox 61"/>
+          <p:cNvSpPr txBox="1"/>
+          <p:nvPr/>
+        </p:nvSpPr>
+        <p:spPr>
+          <a:xfrm>
+            <a:off x="1174014" y="4289834"/>
+            <a:ext cx="716543" cy="369332"/>
+          </a:xfrm>
+          <a:prstGeom prst="rect">
+            <a:avLst/>
+          </a:prstGeom>
+          <a:noFill/>
+        </p:spPr>
+        <p:txBody>
+          <a:bodyPr wrap="none" rtlCol="0">
+            <a:spAutoFit/>
+          </a:bodyPr>
+          <a:lstStyle/>
+          <a:p>
+            <a:r>
+              <a:rPr lang="en-US" b="1" dirty="0" smtClean="0"/>
+              <a:t>batch</a:t>
+            </a:r>
+            <a:endParaRPr lang="en-US" b="1" dirty="0"/>
+          </a:p>
+        </p:txBody>
+      </p:sp>
       <p:cxnSp>
         <p:nvCxnSpPr>
-          <p:cNvPr id="118" name="Straight Connector 117">
-            <a:extLst>
-              <a:ext uri="{FF2B5EF4-FFF2-40B4-BE49-F238E27FC236}">
-                <a16:creationId xmlns:a16="http://schemas.microsoft.com/office/drawing/2014/main" id="{B9D007B6-B6E6-44D2-B11A-306B06E3DD3B}"/>
-              </a:ext>
-            </a:extLst>
-          </p:cNvPr>
+          <p:cNvPr id="63" name="Straight Connector 62"/>
           <p:cNvCxnSpPr>
-            <a:cxnSpLocks/>
-            <a:stCxn id="117" idx="0"/>
+            <a:stCxn id="55" idx="3"/>
+            <a:endCxn id="57" idx="1"/>
           </p:cNvCxnSpPr>
           <p:nvPr/>
         </p:nvCxnSpPr>
         <p:spPr>
           <a:xfrm flipV="1">
-            <a:off x="1688553" y="520481"/>
-            <a:ext cx="22635" cy="2173025"/>
+            <a:off x="7770865" y="1439125"/>
+            <a:ext cx="1481070" cy="1"/>
           </a:xfrm>
           <a:prstGeom prst="line">
             <a:avLst/>
           </a:prstGeom>
+          <a:ln>
+            <a:solidFill>
+              <a:schemeClr val="tx1"/>
+            </a:solidFill>
+          </a:ln>
         </p:spPr>
         <p:style>
           <a:lnRef idx="1">
@@ -3839,27 +3677,26 @@
       </p:cxnSp>
       <p:cxnSp>
         <p:nvCxnSpPr>
-          <p:cNvPr id="119" name="Straight Connector 118">
-            <a:extLst>
-              <a:ext uri="{FF2B5EF4-FFF2-40B4-BE49-F238E27FC236}">
-                <a16:creationId xmlns:a16="http://schemas.microsoft.com/office/drawing/2014/main" id="{305B7598-4EAE-49A4-BEA2-AF9FA64D61B9}"/>
-              </a:ext>
-            </a:extLst>
-          </p:cNvPr>
+          <p:cNvPr id="64" name="Straight Connector 63"/>
           <p:cNvCxnSpPr>
-            <a:cxnSpLocks/>
-            <a:stCxn id="117" idx="2"/>
+            <a:stCxn id="53" idx="3"/>
+            <a:endCxn id="55" idx="1"/>
           </p:cNvCxnSpPr>
           <p:nvPr/>
         </p:nvCxnSpPr>
         <p:spPr>
           <a:xfrm>
-            <a:off x="1688553" y="3699346"/>
-            <a:ext cx="11317" cy="1429245"/>
+            <a:off x="5104939" y="1439126"/>
+            <a:ext cx="862883" cy="0"/>
           </a:xfrm>
           <a:prstGeom prst="line">
             <a:avLst/>
           </a:prstGeom>
+          <a:ln>
+            <a:solidFill>
+              <a:schemeClr val="tx1"/>
+            </a:solidFill>
+          </a:ln>
         </p:spPr>
         <p:style>
           <a:lnRef idx="1">
@@ -3878,26 +3715,23 @@
       </p:cxnSp>
       <p:cxnSp>
         <p:nvCxnSpPr>
-          <p:cNvPr id="120" name="Straight Connector 119">
-            <a:extLst>
-              <a:ext uri="{FF2B5EF4-FFF2-40B4-BE49-F238E27FC236}">
-                <a16:creationId xmlns:a16="http://schemas.microsoft.com/office/drawing/2014/main" id="{8804C5C8-DD6E-4D6F-AE9A-AF402AF3B144}"/>
-              </a:ext>
-            </a:extLst>
-          </p:cNvPr>
-          <p:cNvCxnSpPr>
-            <a:cxnSpLocks/>
-          </p:cNvCxnSpPr>
+          <p:cNvPr id="65" name="Straight Connector 64"/>
+          <p:cNvCxnSpPr/>
           <p:nvPr/>
         </p:nvCxnSpPr>
         <p:spPr>
           <a:xfrm>
-            <a:off x="7660861" y="520481"/>
-            <a:ext cx="2265017" cy="0"/>
+            <a:off x="2421277" y="1229355"/>
+            <a:ext cx="862883" cy="0"/>
           </a:xfrm>
           <a:prstGeom prst="line">
             <a:avLst/>
           </a:prstGeom>
+          <a:ln>
+            <a:solidFill>
+              <a:schemeClr val="tx1"/>
+            </a:solidFill>
+          </a:ln>
         </p:spPr>
         <p:style>
           <a:lnRef idx="1">
@@ -3916,26 +3750,25 @@
       </p:cxnSp>
       <p:cxnSp>
         <p:nvCxnSpPr>
-          <p:cNvPr id="121" name="Straight Connector 120">
-            <a:extLst>
-              <a:ext uri="{FF2B5EF4-FFF2-40B4-BE49-F238E27FC236}">
-                <a16:creationId xmlns:a16="http://schemas.microsoft.com/office/drawing/2014/main" id="{776E0595-BDF6-441C-9930-88B21B8BA027}"/>
-              </a:ext>
-            </a:extLst>
-          </p:cNvPr>
+          <p:cNvPr id="66" name="Straight Connector 65"/>
           <p:cNvCxnSpPr>
-            <a:cxnSpLocks/>
+            <a:endCxn id="61" idx="0"/>
           </p:cNvCxnSpPr>
           <p:nvPr/>
         </p:nvCxnSpPr>
         <p:spPr>
           <a:xfrm>
-            <a:off x="9925878" y="520481"/>
-            <a:ext cx="0" cy="2908519"/>
+            <a:off x="1532288" y="2656354"/>
+            <a:ext cx="0" cy="1530447"/>
           </a:xfrm>
           <a:prstGeom prst="line">
             <a:avLst/>
           </a:prstGeom>
+          <a:ln>
+            <a:solidFill>
+              <a:schemeClr val="tx1"/>
+            </a:solidFill>
+          </a:ln>
         </p:spPr>
         <p:style>
           <a:lnRef idx="1">
@@ -3954,26 +3787,23 @@
       </p:cxnSp>
       <p:cxnSp>
         <p:nvCxnSpPr>
-          <p:cNvPr id="122" name="Straight Connector 121">
-            <a:extLst>
-              <a:ext uri="{FF2B5EF4-FFF2-40B4-BE49-F238E27FC236}">
-                <a16:creationId xmlns:a16="http://schemas.microsoft.com/office/drawing/2014/main" id="{F8957F2E-AFF2-4F8E-8427-91F9E44995DC}"/>
-              </a:ext>
-            </a:extLst>
-          </p:cNvPr>
-          <p:cNvCxnSpPr>
-            <a:cxnSpLocks/>
-          </p:cNvCxnSpPr>
+          <p:cNvPr id="67" name="Straight Connector 66"/>
+          <p:cNvCxnSpPr/>
           <p:nvPr/>
         </p:nvCxnSpPr>
         <p:spPr>
-          <a:xfrm flipV="1">
-            <a:off x="1711188" y="520481"/>
-            <a:ext cx="2819951" cy="1"/>
+          <a:xfrm>
+            <a:off x="6884740" y="2674531"/>
+            <a:ext cx="42822" cy="1491186"/>
           </a:xfrm>
           <a:prstGeom prst="line">
             <a:avLst/>
           </a:prstGeom>
+          <a:ln>
+            <a:solidFill>
+              <a:schemeClr val="tx1"/>
+            </a:solidFill>
+          </a:ln>
         </p:spPr>
         <p:style>
           <a:lnRef idx="1">
@@ -3992,26 +3822,23 @@
       </p:cxnSp>
       <p:cxnSp>
         <p:nvCxnSpPr>
-          <p:cNvPr id="123" name="Straight Connector 122">
-            <a:extLst>
-              <a:ext uri="{FF2B5EF4-FFF2-40B4-BE49-F238E27FC236}">
-                <a16:creationId xmlns:a16="http://schemas.microsoft.com/office/drawing/2014/main" id="{2CC7EBA0-6A55-4EF5-8103-D3C7A810D312}"/>
-              </a:ext>
-            </a:extLst>
-          </p:cNvPr>
-          <p:cNvCxnSpPr>
-            <a:cxnSpLocks/>
-          </p:cNvCxnSpPr>
+          <p:cNvPr id="68" name="Straight Connector 67"/>
+          <p:cNvCxnSpPr/>
           <p:nvPr/>
         </p:nvCxnSpPr>
         <p:spPr>
           <a:xfrm>
-            <a:off x="1699870" y="5128591"/>
-            <a:ext cx="2831269" cy="0"/>
+            <a:off x="656870" y="705893"/>
+            <a:ext cx="1764407" cy="0"/>
           </a:xfrm>
           <a:prstGeom prst="line">
             <a:avLst/>
           </a:prstGeom>
+          <a:ln>
+            <a:solidFill>
+              <a:schemeClr val="tx1"/>
+            </a:solidFill>
+          </a:ln>
         </p:spPr>
         <p:style>
           <a:lnRef idx="1">
@@ -4028,22 +3855,191 @@
           </a:fontRef>
         </p:style>
       </p:cxnSp>
-      <p:sp>
-        <p:nvSpPr>
-          <p:cNvPr id="124" name="TextBox 123">
-            <a:extLst>
-              <a:ext uri="{FF2B5EF4-FFF2-40B4-BE49-F238E27FC236}">
-                <a16:creationId xmlns:a16="http://schemas.microsoft.com/office/drawing/2014/main" id="{E6E2434F-53AF-4FBB-B5C6-9D55DCCAE662}"/>
-              </a:ext>
-            </a:extLst>
-          </p:cNvPr>
+      <p:cxnSp>
+        <p:nvCxnSpPr>
+          <p:cNvPr id="69" name="Straight Connector 68"/>
+          <p:cNvCxnSpPr/>
+          <p:nvPr/>
+        </p:nvCxnSpPr>
+        <p:spPr>
+          <a:xfrm>
+            <a:off x="3340532" y="684290"/>
+            <a:ext cx="1764407" cy="0"/>
+          </a:xfrm>
+          <a:prstGeom prst="line">
+            <a:avLst/>
+          </a:prstGeom>
+          <a:ln>
+            <a:solidFill>
+              <a:schemeClr val="tx1"/>
+            </a:solidFill>
+          </a:ln>
+        </p:spPr>
+        <p:style>
+          <a:lnRef idx="1">
+            <a:schemeClr val="accent1"/>
+          </a:lnRef>
+          <a:fillRef idx="0">
+            <a:schemeClr val="accent1"/>
+          </a:fillRef>
+          <a:effectRef idx="0">
+            <a:schemeClr val="accent1"/>
+          </a:effectRef>
+          <a:fontRef idx="minor">
+            <a:schemeClr val="tx1"/>
+          </a:fontRef>
+        </p:style>
+      </p:cxnSp>
+      <p:cxnSp>
+        <p:nvCxnSpPr>
+          <p:cNvPr id="70" name="Straight Connector 69"/>
+          <p:cNvCxnSpPr/>
+          <p:nvPr/>
+        </p:nvCxnSpPr>
+        <p:spPr>
+          <a:xfrm>
+            <a:off x="5967822" y="705893"/>
+            <a:ext cx="1764407" cy="0"/>
+          </a:xfrm>
+          <a:prstGeom prst="line">
+            <a:avLst/>
+          </a:prstGeom>
+          <a:ln>
+            <a:solidFill>
+              <a:schemeClr val="tx1"/>
+            </a:solidFill>
+          </a:ln>
+        </p:spPr>
+        <p:style>
+          <a:lnRef idx="1">
+            <a:schemeClr val="accent1"/>
+          </a:lnRef>
+          <a:fillRef idx="0">
+            <a:schemeClr val="accent1"/>
+          </a:fillRef>
+          <a:effectRef idx="0">
+            <a:schemeClr val="accent1"/>
+          </a:effectRef>
+          <a:fontRef idx="minor">
+            <a:schemeClr val="tx1"/>
+          </a:fontRef>
+        </p:style>
+      </p:cxnSp>
+      <p:cxnSp>
+        <p:nvCxnSpPr>
+          <p:cNvPr id="71" name="Straight Connector 70"/>
+          <p:cNvCxnSpPr/>
+          <p:nvPr/>
+        </p:nvCxnSpPr>
+        <p:spPr>
+          <a:xfrm>
+            <a:off x="9232844" y="705893"/>
+            <a:ext cx="1764407" cy="0"/>
+          </a:xfrm>
+          <a:prstGeom prst="line">
+            <a:avLst/>
+          </a:prstGeom>
+          <a:ln>
+            <a:solidFill>
+              <a:schemeClr val="tx1"/>
+            </a:solidFill>
+          </a:ln>
+        </p:spPr>
+        <p:style>
+          <a:lnRef idx="1">
+            <a:schemeClr val="accent1"/>
+          </a:lnRef>
+          <a:fillRef idx="0">
+            <a:schemeClr val="accent1"/>
+          </a:fillRef>
+          <a:effectRef idx="0">
+            <a:schemeClr val="accent1"/>
+          </a:effectRef>
+          <a:fontRef idx="minor">
+            <a:schemeClr val="tx1"/>
+          </a:fontRef>
+        </p:style>
+      </p:cxnSp>
+      <p:cxnSp>
+        <p:nvCxnSpPr>
+          <p:cNvPr id="72" name="Straight Connector 71"/>
+          <p:cNvCxnSpPr/>
+          <p:nvPr/>
+        </p:nvCxnSpPr>
+        <p:spPr>
+          <a:xfrm>
+            <a:off x="650081" y="4659166"/>
+            <a:ext cx="1764407" cy="0"/>
+          </a:xfrm>
+          <a:prstGeom prst="line">
+            <a:avLst/>
+          </a:prstGeom>
+          <a:ln>
+            <a:solidFill>
+              <a:schemeClr val="tx1"/>
+            </a:solidFill>
+          </a:ln>
+        </p:spPr>
+        <p:style>
+          <a:lnRef idx="1">
+            <a:schemeClr val="accent1"/>
+          </a:lnRef>
+          <a:fillRef idx="0">
+            <a:schemeClr val="accent1"/>
+          </a:fillRef>
+          <a:effectRef idx="0">
+            <a:schemeClr val="accent1"/>
+          </a:effectRef>
+          <a:fontRef idx="minor">
+            <a:schemeClr val="tx1"/>
+          </a:fontRef>
+        </p:style>
+      </p:cxnSp>
+      <p:cxnSp>
+        <p:nvCxnSpPr>
+          <p:cNvPr id="73" name="Straight Connector 72"/>
+          <p:cNvCxnSpPr/>
+          <p:nvPr/>
+        </p:nvCxnSpPr>
+        <p:spPr>
+          <a:xfrm>
+            <a:off x="5955268" y="4592486"/>
+            <a:ext cx="1764407" cy="0"/>
+          </a:xfrm>
+          <a:prstGeom prst="line">
+            <a:avLst/>
+          </a:prstGeom>
+          <a:ln>
+            <a:solidFill>
+              <a:schemeClr val="tx1"/>
+            </a:solidFill>
+          </a:ln>
+        </p:spPr>
+        <p:style>
+          <a:lnRef idx="1">
+            <a:schemeClr val="accent1"/>
+          </a:lnRef>
+          <a:fillRef idx="0">
+            <a:schemeClr val="accent1"/>
+          </a:fillRef>
+          <a:effectRef idx="0">
+            <a:schemeClr val="accent1"/>
+          </a:effectRef>
+          <a:fontRef idx="minor">
+            <a:schemeClr val="tx1"/>
+          </a:fontRef>
+        </p:style>
+      </p:cxnSp>
+      <p:sp>
+        <p:nvSpPr>
+          <p:cNvPr id="74" name="TextBox 73"/>
           <p:cNvSpPr txBox="1"/>
           <p:nvPr/>
         </p:nvSpPr>
         <p:spPr>
           <a:xfrm>
-            <a:off x="1269450" y="3616163"/>
-            <a:ext cx="457200" cy="584775"/>
+            <a:off x="3567083" y="1093040"/>
+            <a:ext cx="1231299" cy="369332"/>
           </a:xfrm>
           <a:prstGeom prst="rect">
             <a:avLst/>
@@ -4051,34 +4047,29 @@
           <a:noFill/>
         </p:spPr>
         <p:txBody>
-          <a:bodyPr wrap="square" rtlCol="0">
+          <a:bodyPr wrap="none" rtlCol="0">
             <a:spAutoFit/>
           </a:bodyPr>
           <a:lstStyle/>
           <a:p>
             <a:r>
-              <a:rPr lang="en-US" sz="3200" dirty="0"/>
-              <a:t>*</a:t>
-            </a:r>
-          </a:p>
-        </p:txBody>
-      </p:sp>
-      <p:sp>
-        <p:nvSpPr>
-          <p:cNvPr id="125" name="TextBox 124">
-            <a:extLst>
-              <a:ext uri="{FF2B5EF4-FFF2-40B4-BE49-F238E27FC236}">
-                <a16:creationId xmlns:a16="http://schemas.microsoft.com/office/drawing/2014/main" id="{85DD2EE0-A86A-43FC-9677-DD4A43E0A561}"/>
-              </a:ext>
-            </a:extLst>
-          </p:cNvPr>
+              <a:rPr lang="en-US" dirty="0" smtClean="0"/>
+              <a:t>first_name</a:t>
+            </a:r>
+            <a:endParaRPr lang="en-US" dirty="0"/>
+          </a:p>
+        </p:txBody>
+      </p:sp>
+      <p:sp>
+        <p:nvSpPr>
+          <p:cNvPr id="75" name="TextBox 74"/>
           <p:cNvSpPr txBox="1"/>
           <p:nvPr/>
         </p:nvSpPr>
         <p:spPr>
           <a:xfrm>
-            <a:off x="1253988" y="2319263"/>
-            <a:ext cx="457200" cy="584775"/>
+            <a:off x="3554818" y="1350878"/>
+            <a:ext cx="1159933" cy="369332"/>
           </a:xfrm>
           <a:prstGeom prst="rect">
             <a:avLst/>
@@ -4086,34 +4077,29 @@
           <a:noFill/>
         </p:spPr>
         <p:txBody>
-          <a:bodyPr wrap="square" rtlCol="0">
+          <a:bodyPr wrap="none" rtlCol="0">
             <a:spAutoFit/>
           </a:bodyPr>
           <a:lstStyle/>
           <a:p>
             <a:r>
-              <a:rPr lang="en-US" sz="3200" dirty="0"/>
-              <a:t>*</a:t>
-            </a:r>
-          </a:p>
-        </p:txBody>
-      </p:sp>
-      <p:sp>
-        <p:nvSpPr>
-          <p:cNvPr id="126" name="TextBox 125">
-            <a:extLst>
-              <a:ext uri="{FF2B5EF4-FFF2-40B4-BE49-F238E27FC236}">
-                <a16:creationId xmlns:a16="http://schemas.microsoft.com/office/drawing/2014/main" id="{BEF06A6E-5AB4-4ACB-8796-15AA4120A777}"/>
-              </a:ext>
-            </a:extLst>
-          </p:cNvPr>
+              <a:rPr lang="en-US" dirty="0" smtClean="0"/>
+              <a:t>last_name</a:t>
+            </a:r>
+            <a:endParaRPr lang="en-US" dirty="0"/>
+          </a:p>
+        </p:txBody>
+      </p:sp>
+      <p:sp>
+        <p:nvSpPr>
+          <p:cNvPr id="76" name="TextBox 75"/>
           <p:cNvSpPr txBox="1"/>
           <p:nvPr/>
         </p:nvSpPr>
         <p:spPr>
           <a:xfrm>
-            <a:off x="4313856" y="5117020"/>
-            <a:ext cx="457200" cy="338554"/>
+            <a:off x="6243812" y="1053320"/>
+            <a:ext cx="684675" cy="369332"/>
           </a:xfrm>
           <a:prstGeom prst="rect">
             <a:avLst/>
@@ -4121,34 +4107,29 @@
           <a:noFill/>
         </p:spPr>
         <p:txBody>
-          <a:bodyPr wrap="square" rtlCol="0">
+          <a:bodyPr wrap="none" rtlCol="0">
             <a:spAutoFit/>
           </a:bodyPr>
           <a:lstStyle/>
           <a:p>
             <a:r>
-              <a:rPr lang="en-US" sz="1600" dirty="0"/>
-              <a:t>1</a:t>
-            </a:r>
-          </a:p>
-        </p:txBody>
-      </p:sp>
-      <p:sp>
-        <p:nvSpPr>
-          <p:cNvPr id="127" name="TextBox 126">
-            <a:extLst>
-              <a:ext uri="{FF2B5EF4-FFF2-40B4-BE49-F238E27FC236}">
-                <a16:creationId xmlns:a16="http://schemas.microsoft.com/office/drawing/2014/main" id="{6AD8AC64-3A12-438A-B5F4-C720B44D7C41}"/>
-              </a:ext>
-            </a:extLst>
-          </p:cNvPr>
+              <a:rPr lang="en-US" dirty="0" smtClean="0"/>
+              <a:t>score</a:t>
+            </a:r>
+            <a:endParaRPr lang="en-US" dirty="0"/>
+          </a:p>
+        </p:txBody>
+      </p:sp>
+      <p:sp>
+        <p:nvSpPr>
+          <p:cNvPr id="77" name="TextBox 76"/>
           <p:cNvSpPr txBox="1"/>
           <p:nvPr/>
         </p:nvSpPr>
         <p:spPr>
           <a:xfrm>
-            <a:off x="4302539" y="193499"/>
-            <a:ext cx="457200" cy="338554"/>
+            <a:off x="9512669" y="1051656"/>
+            <a:ext cx="559769" cy="369332"/>
           </a:xfrm>
           <a:prstGeom prst="rect">
             <a:avLst/>
@@ -4156,34 +4137,29 @@
           <a:noFill/>
         </p:spPr>
         <p:txBody>
-          <a:bodyPr wrap="square" rtlCol="0">
+          <a:bodyPr wrap="none" rtlCol="0">
             <a:spAutoFit/>
           </a:bodyPr>
           <a:lstStyle/>
           <a:p>
             <a:r>
-              <a:rPr lang="en-US" sz="1600" dirty="0"/>
-              <a:t>1</a:t>
-            </a:r>
-          </a:p>
-        </p:txBody>
-      </p:sp>
-      <p:sp>
-        <p:nvSpPr>
-          <p:cNvPr id="128" name="TextBox 127">
-            <a:extLst>
-              <a:ext uri="{FF2B5EF4-FFF2-40B4-BE49-F238E27FC236}">
-                <a16:creationId xmlns:a16="http://schemas.microsoft.com/office/drawing/2014/main" id="{FD4857CB-6862-4950-B007-039AADF47F46}"/>
-              </a:ext>
-            </a:extLst>
-          </p:cNvPr>
+              <a:rPr lang="en-US" dirty="0" smtClean="0"/>
+              <a:t>title</a:t>
+            </a:r>
+            <a:endParaRPr lang="en-US" dirty="0"/>
+          </a:p>
+        </p:txBody>
+      </p:sp>
+      <p:sp>
+        <p:nvSpPr>
+          <p:cNvPr id="78" name="TextBox 77"/>
           <p:cNvSpPr txBox="1"/>
           <p:nvPr/>
         </p:nvSpPr>
         <p:spPr>
           <a:xfrm>
-            <a:off x="9925878" y="3172611"/>
-            <a:ext cx="457200" cy="338554"/>
+            <a:off x="9543336" y="755280"/>
+            <a:ext cx="364202" cy="369332"/>
           </a:xfrm>
           <a:prstGeom prst="rect">
             <a:avLst/>
@@ -4191,34 +4167,29 @@
           <a:noFill/>
         </p:spPr>
         <p:txBody>
-          <a:bodyPr wrap="square" rtlCol="0">
+          <a:bodyPr wrap="none" rtlCol="0">
             <a:spAutoFit/>
           </a:bodyPr>
           <a:lstStyle/>
           <a:p>
             <a:r>
-              <a:rPr lang="en-US" sz="1600" dirty="0"/>
-              <a:t>1</a:t>
-            </a:r>
-          </a:p>
-        </p:txBody>
-      </p:sp>
-      <p:sp>
-        <p:nvSpPr>
-          <p:cNvPr id="129" name="TextBox 128">
-            <a:extLst>
-              <a:ext uri="{FF2B5EF4-FFF2-40B4-BE49-F238E27FC236}">
-                <a16:creationId xmlns:a16="http://schemas.microsoft.com/office/drawing/2014/main" id="{2FA755E5-07A2-45EE-B47B-3258EAD2F5AC}"/>
-              </a:ext>
-            </a:extLst>
-          </p:cNvPr>
+              <a:rPr lang="en-US" b="1" dirty="0" smtClean="0"/>
+              <a:t>id</a:t>
+            </a:r>
+            <a:endParaRPr lang="en-US" b="1" dirty="0"/>
+          </a:p>
+        </p:txBody>
+      </p:sp>
+      <p:sp>
+        <p:nvSpPr>
+          <p:cNvPr id="79" name="TextBox 78"/>
           <p:cNvSpPr txBox="1"/>
           <p:nvPr/>
         </p:nvSpPr>
         <p:spPr>
           <a:xfrm>
-            <a:off x="7579690" y="153460"/>
-            <a:ext cx="457200" cy="584775"/>
+            <a:off x="6287064" y="787274"/>
+            <a:ext cx="364202" cy="369332"/>
           </a:xfrm>
           <a:prstGeom prst="rect">
             <a:avLst/>
@@ -4226,15 +4197,1204 @@
           <a:noFill/>
         </p:spPr>
         <p:txBody>
-          <a:bodyPr wrap="square" rtlCol="0">
+          <a:bodyPr wrap="none" rtlCol="0">
             <a:spAutoFit/>
           </a:bodyPr>
           <a:lstStyle/>
           <a:p>
             <a:r>
-              <a:rPr lang="en-US" sz="3200" dirty="0"/>
+              <a:rPr lang="en-US" b="1" dirty="0" smtClean="0"/>
+              <a:t>id</a:t>
+            </a:r>
+            <a:endParaRPr lang="en-US" b="1" dirty="0"/>
+          </a:p>
+        </p:txBody>
+      </p:sp>
+      <p:sp>
+        <p:nvSpPr>
+          <p:cNvPr id="80" name="TextBox 79"/>
+          <p:cNvSpPr txBox="1"/>
+          <p:nvPr/>
+        </p:nvSpPr>
+        <p:spPr>
+          <a:xfrm>
+            <a:off x="3598367" y="787274"/>
+            <a:ext cx="364202" cy="369332"/>
+          </a:xfrm>
+          <a:prstGeom prst="rect">
+            <a:avLst/>
+          </a:prstGeom>
+          <a:noFill/>
+        </p:spPr>
+        <p:txBody>
+          <a:bodyPr wrap="none" rtlCol="0">
+            <a:spAutoFit/>
+          </a:bodyPr>
+          <a:lstStyle/>
+          <a:p>
+            <a:r>
+              <a:rPr lang="en-US" b="1" dirty="0" smtClean="0"/>
+              <a:t>id</a:t>
+            </a:r>
+            <a:endParaRPr lang="en-US" b="1" dirty="0"/>
+          </a:p>
+        </p:txBody>
+      </p:sp>
+      <p:sp>
+        <p:nvSpPr>
+          <p:cNvPr id="81" name="TextBox 80"/>
+          <p:cNvSpPr txBox="1"/>
+          <p:nvPr/>
+        </p:nvSpPr>
+        <p:spPr>
+          <a:xfrm>
+            <a:off x="978566" y="800151"/>
+            <a:ext cx="364202" cy="369332"/>
+          </a:xfrm>
+          <a:prstGeom prst="rect">
+            <a:avLst/>
+          </a:prstGeom>
+          <a:noFill/>
+        </p:spPr>
+        <p:txBody>
+          <a:bodyPr wrap="none" rtlCol="0">
+            <a:spAutoFit/>
+          </a:bodyPr>
+          <a:lstStyle/>
+          <a:p>
+            <a:r>
+              <a:rPr lang="en-US" b="1" dirty="0" smtClean="0"/>
+              <a:t>id</a:t>
+            </a:r>
+            <a:endParaRPr lang="en-US" b="1" dirty="0"/>
+          </a:p>
+        </p:txBody>
+      </p:sp>
+      <p:sp>
+        <p:nvSpPr>
+          <p:cNvPr id="82" name="TextBox 81"/>
+          <p:cNvSpPr txBox="1"/>
+          <p:nvPr/>
+        </p:nvSpPr>
+        <p:spPr>
+          <a:xfrm>
+            <a:off x="923618" y="1111784"/>
+            <a:ext cx="716863" cy="369332"/>
+          </a:xfrm>
+          <a:prstGeom prst="rect">
+            <a:avLst/>
+          </a:prstGeom>
+          <a:noFill/>
+        </p:spPr>
+        <p:txBody>
+          <a:bodyPr wrap="none" rtlCol="0">
+            <a:spAutoFit/>
+          </a:bodyPr>
+          <a:lstStyle/>
+          <a:p>
+            <a:r>
+              <a:rPr lang="en-US" dirty="0" smtClean="0"/>
+              <a:t>name</a:t>
+            </a:r>
+            <a:endParaRPr lang="en-US" dirty="0"/>
+          </a:p>
+        </p:txBody>
+      </p:sp>
+      <p:sp>
+        <p:nvSpPr>
+          <p:cNvPr id="83" name="TextBox 82"/>
+          <p:cNvSpPr txBox="1"/>
+          <p:nvPr/>
+        </p:nvSpPr>
+        <p:spPr>
+          <a:xfrm>
+            <a:off x="6333794" y="5032084"/>
+            <a:ext cx="559769" cy="369332"/>
+          </a:xfrm>
+          <a:prstGeom prst="rect">
+            <a:avLst/>
+          </a:prstGeom>
+          <a:noFill/>
+        </p:spPr>
+        <p:txBody>
+          <a:bodyPr wrap="none" rtlCol="0">
+            <a:spAutoFit/>
+          </a:bodyPr>
+          <a:lstStyle/>
+          <a:p>
+            <a:r>
+              <a:rPr lang="en-US" dirty="0" smtClean="0"/>
+              <a:t>title</a:t>
+            </a:r>
+            <a:endParaRPr lang="en-US" dirty="0"/>
+          </a:p>
+        </p:txBody>
+      </p:sp>
+      <p:sp>
+        <p:nvSpPr>
+          <p:cNvPr id="84" name="TextBox 83"/>
+          <p:cNvSpPr txBox="1"/>
+          <p:nvPr/>
+        </p:nvSpPr>
+        <p:spPr>
+          <a:xfrm>
+            <a:off x="6386433" y="4673967"/>
+            <a:ext cx="364202" cy="369332"/>
+          </a:xfrm>
+          <a:prstGeom prst="rect">
+            <a:avLst/>
+          </a:prstGeom>
+          <a:noFill/>
+        </p:spPr>
+        <p:txBody>
+          <a:bodyPr wrap="none" rtlCol="0">
+            <a:spAutoFit/>
+          </a:bodyPr>
+          <a:lstStyle/>
+          <a:p>
+            <a:r>
+              <a:rPr lang="en-US" b="1" dirty="0" smtClean="0"/>
+              <a:t>id</a:t>
+            </a:r>
+            <a:endParaRPr lang="en-US" b="1" dirty="0"/>
+          </a:p>
+        </p:txBody>
+      </p:sp>
+      <p:sp>
+        <p:nvSpPr>
+          <p:cNvPr id="85" name="TextBox 84"/>
+          <p:cNvSpPr txBox="1"/>
+          <p:nvPr/>
+        </p:nvSpPr>
+        <p:spPr>
+          <a:xfrm>
+            <a:off x="3567083" y="1608716"/>
+            <a:ext cx="485774" cy="369332"/>
+          </a:xfrm>
+          <a:prstGeom prst="rect">
+            <a:avLst/>
+          </a:prstGeom>
+          <a:noFill/>
+        </p:spPr>
+        <p:txBody>
+          <a:bodyPr wrap="none" rtlCol="0">
+            <a:spAutoFit/>
+          </a:bodyPr>
+          <a:lstStyle/>
+          <a:p>
+            <a:r>
+              <a:rPr lang="en-US" dirty="0" smtClean="0"/>
+              <a:t>sex</a:t>
+            </a:r>
+            <a:endParaRPr lang="en-US" dirty="0"/>
+          </a:p>
+        </p:txBody>
+      </p:sp>
+      <p:sp>
+        <p:nvSpPr>
+          <p:cNvPr id="86" name="TextBox 85"/>
+          <p:cNvSpPr txBox="1"/>
+          <p:nvPr/>
+        </p:nvSpPr>
+        <p:spPr>
+          <a:xfrm>
+            <a:off x="998712" y="4769421"/>
+            <a:ext cx="364202" cy="369332"/>
+          </a:xfrm>
+          <a:prstGeom prst="rect">
+            <a:avLst/>
+          </a:prstGeom>
+          <a:noFill/>
+        </p:spPr>
+        <p:txBody>
+          <a:bodyPr wrap="none" rtlCol="0">
+            <a:spAutoFit/>
+          </a:bodyPr>
+          <a:lstStyle/>
+          <a:p>
+            <a:r>
+              <a:rPr lang="en-US" b="1" dirty="0" smtClean="0"/>
+              <a:t>id</a:t>
+            </a:r>
+            <a:endParaRPr lang="en-US" b="1" dirty="0"/>
+          </a:p>
+        </p:txBody>
+      </p:sp>
+      <p:sp>
+        <p:nvSpPr>
+          <p:cNvPr id="87" name="TextBox 86"/>
+          <p:cNvSpPr txBox="1"/>
+          <p:nvPr/>
+        </p:nvSpPr>
+        <p:spPr>
+          <a:xfrm>
+            <a:off x="1006003" y="5090145"/>
+            <a:ext cx="716863" cy="369332"/>
+          </a:xfrm>
+          <a:prstGeom prst="rect">
+            <a:avLst/>
+          </a:prstGeom>
+          <a:noFill/>
+        </p:spPr>
+        <p:txBody>
+          <a:bodyPr wrap="none" rtlCol="0">
+            <a:spAutoFit/>
+          </a:bodyPr>
+          <a:lstStyle/>
+          <a:p>
+            <a:r>
+              <a:rPr lang="en-US" smtClean="0"/>
+              <a:t>name</a:t>
+            </a:r>
+            <a:endParaRPr lang="en-US" dirty="0"/>
+          </a:p>
+        </p:txBody>
+      </p:sp>
+      <p:sp>
+        <p:nvSpPr>
+          <p:cNvPr id="88" name="TextBox 87"/>
+          <p:cNvSpPr txBox="1"/>
+          <p:nvPr/>
+        </p:nvSpPr>
+        <p:spPr>
+          <a:xfrm>
+            <a:off x="2456749" y="895546"/>
+            <a:ext cx="301686" cy="369332"/>
+          </a:xfrm>
+          <a:prstGeom prst="rect">
+            <a:avLst/>
+          </a:prstGeom>
+          <a:noFill/>
+        </p:spPr>
+        <p:txBody>
+          <a:bodyPr wrap="none" rtlCol="0">
+            <a:spAutoFit/>
+          </a:bodyPr>
+          <a:lstStyle/>
+          <a:p>
+            <a:r>
+              <a:rPr lang="en-US" dirty="0" smtClean="0">
+                <a:solidFill>
+                  <a:schemeClr val="accent1"/>
+                </a:solidFill>
+              </a:rPr>
+              <a:t>1</a:t>
+            </a:r>
+            <a:endParaRPr lang="en-US" dirty="0">
+              <a:solidFill>
+                <a:schemeClr val="accent1"/>
+              </a:solidFill>
+            </a:endParaRPr>
+          </a:p>
+        </p:txBody>
+      </p:sp>
+      <p:sp>
+        <p:nvSpPr>
+          <p:cNvPr id="89" name="TextBox 88"/>
+          <p:cNvSpPr txBox="1"/>
+          <p:nvPr/>
+        </p:nvSpPr>
+        <p:spPr>
+          <a:xfrm>
+            <a:off x="2948059" y="933147"/>
+            <a:ext cx="301686" cy="369332"/>
+          </a:xfrm>
+          <a:prstGeom prst="rect">
+            <a:avLst/>
+          </a:prstGeom>
+          <a:noFill/>
+        </p:spPr>
+        <p:txBody>
+          <a:bodyPr wrap="none" rtlCol="0">
+            <a:spAutoFit/>
+          </a:bodyPr>
+          <a:lstStyle/>
+          <a:p>
+            <a:r>
+              <a:rPr lang="en-US" dirty="0" smtClean="0">
+                <a:solidFill>
+                  <a:schemeClr val="accent1"/>
+                </a:solidFill>
+              </a:rPr>
               <a:t>*</a:t>
             </a:r>
+            <a:endParaRPr lang="en-US" dirty="0">
+              <a:solidFill>
+                <a:schemeClr val="accent1"/>
+              </a:solidFill>
+            </a:endParaRPr>
+          </a:p>
+        </p:txBody>
+      </p:sp>
+      <p:sp>
+        <p:nvSpPr>
+          <p:cNvPr id="90" name="TextBox 89"/>
+          <p:cNvSpPr txBox="1"/>
+          <p:nvPr/>
+        </p:nvSpPr>
+        <p:spPr>
+          <a:xfrm>
+            <a:off x="5149269" y="878302"/>
+            <a:ext cx="301686" cy="369332"/>
+          </a:xfrm>
+          <a:prstGeom prst="rect">
+            <a:avLst/>
+          </a:prstGeom>
+          <a:noFill/>
+        </p:spPr>
+        <p:txBody>
+          <a:bodyPr wrap="none" rtlCol="0">
+            <a:spAutoFit/>
+          </a:bodyPr>
+          <a:lstStyle/>
+          <a:p>
+            <a:r>
+              <a:rPr lang="en-US" dirty="0" smtClean="0">
+                <a:solidFill>
+                  <a:schemeClr val="accent1"/>
+                </a:solidFill>
+              </a:rPr>
+              <a:t>1</a:t>
+            </a:r>
+            <a:endParaRPr lang="en-US" dirty="0">
+              <a:solidFill>
+                <a:schemeClr val="accent1"/>
+              </a:solidFill>
+            </a:endParaRPr>
+          </a:p>
+        </p:txBody>
+      </p:sp>
+      <p:sp>
+        <p:nvSpPr>
+          <p:cNvPr id="91" name="TextBox 90"/>
+          <p:cNvSpPr txBox="1"/>
+          <p:nvPr/>
+        </p:nvSpPr>
+        <p:spPr>
+          <a:xfrm>
+            <a:off x="5640579" y="915903"/>
+            <a:ext cx="301686" cy="369332"/>
+          </a:xfrm>
+          <a:prstGeom prst="rect">
+            <a:avLst/>
+          </a:prstGeom>
+          <a:noFill/>
+        </p:spPr>
+        <p:txBody>
+          <a:bodyPr wrap="none" rtlCol="0">
+            <a:spAutoFit/>
+          </a:bodyPr>
+          <a:lstStyle/>
+          <a:p>
+            <a:r>
+              <a:rPr lang="en-US" dirty="0" smtClean="0">
+                <a:solidFill>
+                  <a:schemeClr val="accent1"/>
+                </a:solidFill>
+              </a:rPr>
+              <a:t>*</a:t>
+            </a:r>
+            <a:endParaRPr lang="en-US" dirty="0">
+              <a:solidFill>
+                <a:schemeClr val="accent1"/>
+              </a:solidFill>
+            </a:endParaRPr>
+          </a:p>
+        </p:txBody>
+      </p:sp>
+      <p:sp>
+        <p:nvSpPr>
+          <p:cNvPr id="92" name="TextBox 91"/>
+          <p:cNvSpPr txBox="1"/>
+          <p:nvPr/>
+        </p:nvSpPr>
+        <p:spPr>
+          <a:xfrm>
+            <a:off x="8899781" y="888691"/>
+            <a:ext cx="301686" cy="369332"/>
+          </a:xfrm>
+          <a:prstGeom prst="rect">
+            <a:avLst/>
+          </a:prstGeom>
+          <a:noFill/>
+        </p:spPr>
+        <p:txBody>
+          <a:bodyPr wrap="none" rtlCol="0">
+            <a:spAutoFit/>
+          </a:bodyPr>
+          <a:lstStyle/>
+          <a:p>
+            <a:r>
+              <a:rPr lang="en-US" dirty="0" smtClean="0">
+                <a:solidFill>
+                  <a:schemeClr val="accent1"/>
+                </a:solidFill>
+              </a:rPr>
+              <a:t>1</a:t>
+            </a:r>
+            <a:endParaRPr lang="en-US" dirty="0">
+              <a:solidFill>
+                <a:schemeClr val="accent1"/>
+              </a:solidFill>
+            </a:endParaRPr>
+          </a:p>
+        </p:txBody>
+      </p:sp>
+      <p:sp>
+        <p:nvSpPr>
+          <p:cNvPr id="93" name="TextBox 92"/>
+          <p:cNvSpPr txBox="1"/>
+          <p:nvPr/>
+        </p:nvSpPr>
+        <p:spPr>
+          <a:xfrm>
+            <a:off x="7897559" y="927118"/>
+            <a:ext cx="301686" cy="369332"/>
+          </a:xfrm>
+          <a:prstGeom prst="rect">
+            <a:avLst/>
+          </a:prstGeom>
+          <a:noFill/>
+        </p:spPr>
+        <p:txBody>
+          <a:bodyPr wrap="none" rtlCol="0">
+            <a:spAutoFit/>
+          </a:bodyPr>
+          <a:lstStyle/>
+          <a:p>
+            <a:r>
+              <a:rPr lang="en-US" dirty="0" smtClean="0">
+                <a:solidFill>
+                  <a:schemeClr val="accent1"/>
+                </a:solidFill>
+              </a:rPr>
+              <a:t>*</a:t>
+            </a:r>
+            <a:endParaRPr lang="en-US" dirty="0">
+              <a:solidFill>
+                <a:schemeClr val="accent1"/>
+              </a:solidFill>
+            </a:endParaRPr>
+          </a:p>
+        </p:txBody>
+      </p:sp>
+      <p:sp>
+        <p:nvSpPr>
+          <p:cNvPr id="94" name="TextBox 93"/>
+          <p:cNvSpPr txBox="1"/>
+          <p:nvPr/>
+        </p:nvSpPr>
+        <p:spPr>
+          <a:xfrm>
+            <a:off x="6927562" y="3844734"/>
+            <a:ext cx="301686" cy="369332"/>
+          </a:xfrm>
+          <a:prstGeom prst="rect">
+            <a:avLst/>
+          </a:prstGeom>
+          <a:noFill/>
+        </p:spPr>
+        <p:txBody>
+          <a:bodyPr wrap="none" rtlCol="0">
+            <a:spAutoFit/>
+          </a:bodyPr>
+          <a:lstStyle/>
+          <a:p>
+            <a:r>
+              <a:rPr lang="en-US" dirty="0" smtClean="0">
+                <a:solidFill>
+                  <a:schemeClr val="accent1"/>
+                </a:solidFill>
+              </a:rPr>
+              <a:t>1</a:t>
+            </a:r>
+            <a:endParaRPr lang="en-US" dirty="0">
+              <a:solidFill>
+                <a:schemeClr val="accent1"/>
+              </a:solidFill>
+            </a:endParaRPr>
+          </a:p>
+        </p:txBody>
+      </p:sp>
+      <p:sp>
+        <p:nvSpPr>
+          <p:cNvPr id="95" name="TextBox 94"/>
+          <p:cNvSpPr txBox="1"/>
+          <p:nvPr/>
+        </p:nvSpPr>
+        <p:spPr>
+          <a:xfrm>
+            <a:off x="6909826" y="2690473"/>
+            <a:ext cx="301686" cy="369332"/>
+          </a:xfrm>
+          <a:prstGeom prst="rect">
+            <a:avLst/>
+          </a:prstGeom>
+          <a:noFill/>
+        </p:spPr>
+        <p:txBody>
+          <a:bodyPr wrap="none" rtlCol="0">
+            <a:spAutoFit/>
+          </a:bodyPr>
+          <a:lstStyle/>
+          <a:p>
+            <a:r>
+              <a:rPr lang="en-US" dirty="0" smtClean="0">
+                <a:solidFill>
+                  <a:schemeClr val="accent1"/>
+                </a:solidFill>
+              </a:rPr>
+              <a:t>*</a:t>
+            </a:r>
+            <a:endParaRPr lang="en-US" dirty="0">
+              <a:solidFill>
+                <a:schemeClr val="accent1"/>
+              </a:solidFill>
+            </a:endParaRPr>
+          </a:p>
+        </p:txBody>
+      </p:sp>
+      <p:sp>
+        <p:nvSpPr>
+          <p:cNvPr id="96" name="TextBox 95"/>
+          <p:cNvSpPr txBox="1"/>
+          <p:nvPr/>
+        </p:nvSpPr>
+        <p:spPr>
+          <a:xfrm>
+            <a:off x="1650748" y="2668822"/>
+            <a:ext cx="301686" cy="369332"/>
+          </a:xfrm>
+          <a:prstGeom prst="rect">
+            <a:avLst/>
+          </a:prstGeom>
+          <a:noFill/>
+        </p:spPr>
+        <p:txBody>
+          <a:bodyPr wrap="none" rtlCol="0">
+            <a:spAutoFit/>
+          </a:bodyPr>
+          <a:lstStyle/>
+          <a:p>
+            <a:r>
+              <a:rPr lang="en-US" dirty="0" smtClean="0">
+                <a:solidFill>
+                  <a:schemeClr val="accent1"/>
+                </a:solidFill>
+              </a:rPr>
+              <a:t>*</a:t>
+            </a:r>
+            <a:endParaRPr lang="en-US" dirty="0">
+              <a:solidFill>
+                <a:schemeClr val="accent1"/>
+              </a:solidFill>
+            </a:endParaRPr>
+          </a:p>
+        </p:txBody>
+      </p:sp>
+      <p:sp>
+        <p:nvSpPr>
+          <p:cNvPr id="97" name="TextBox 96"/>
+          <p:cNvSpPr txBox="1"/>
+          <p:nvPr/>
+        </p:nvSpPr>
+        <p:spPr>
+          <a:xfrm>
+            <a:off x="1667685" y="3821834"/>
+            <a:ext cx="301686" cy="369332"/>
+          </a:xfrm>
+          <a:prstGeom prst="rect">
+            <a:avLst/>
+          </a:prstGeom>
+          <a:noFill/>
+        </p:spPr>
+        <p:txBody>
+          <a:bodyPr wrap="none" rtlCol="0">
+            <a:spAutoFit/>
+          </a:bodyPr>
+          <a:lstStyle/>
+          <a:p>
+            <a:r>
+              <a:rPr lang="en-US" dirty="0" smtClean="0">
+                <a:solidFill>
+                  <a:schemeClr val="accent1"/>
+                </a:solidFill>
+              </a:rPr>
+              <a:t>1</a:t>
+            </a:r>
+            <a:endParaRPr lang="en-US" dirty="0">
+              <a:solidFill>
+                <a:schemeClr val="accent1"/>
+              </a:solidFill>
+            </a:endParaRPr>
+          </a:p>
+        </p:txBody>
+      </p:sp>
+      <p:sp>
+        <p:nvSpPr>
+          <p:cNvPr id="98" name="TextBox 97"/>
+          <p:cNvSpPr txBox="1"/>
+          <p:nvPr/>
+        </p:nvSpPr>
+        <p:spPr>
+          <a:xfrm>
+            <a:off x="577750" y="830929"/>
+            <a:ext cx="405880" cy="338554"/>
+          </a:xfrm>
+          <a:prstGeom prst="rect">
+            <a:avLst/>
+          </a:prstGeom>
+          <a:noFill/>
+        </p:spPr>
+        <p:txBody>
+          <a:bodyPr wrap="none" rtlCol="0">
+            <a:spAutoFit/>
+          </a:bodyPr>
+          <a:lstStyle/>
+          <a:p>
+            <a:r>
+              <a:rPr lang="en-US" sz="1600" b="1" dirty="0" smtClean="0">
+                <a:solidFill>
+                  <a:schemeClr val="accent2"/>
+                </a:solidFill>
+              </a:rPr>
+              <a:t>PK</a:t>
+            </a:r>
+            <a:endParaRPr lang="en-US" sz="1600" b="1" dirty="0">
+              <a:solidFill>
+                <a:schemeClr val="accent2"/>
+              </a:solidFill>
+            </a:endParaRPr>
+          </a:p>
+        </p:txBody>
+      </p:sp>
+      <p:sp>
+        <p:nvSpPr>
+          <p:cNvPr id="99" name="TextBox 98"/>
+          <p:cNvSpPr txBox="1"/>
+          <p:nvPr/>
+        </p:nvSpPr>
+        <p:spPr>
+          <a:xfrm>
+            <a:off x="587580" y="4800199"/>
+            <a:ext cx="405880" cy="338554"/>
+          </a:xfrm>
+          <a:prstGeom prst="rect">
+            <a:avLst/>
+          </a:prstGeom>
+          <a:noFill/>
+        </p:spPr>
+        <p:txBody>
+          <a:bodyPr wrap="none" rtlCol="0">
+            <a:spAutoFit/>
+          </a:bodyPr>
+          <a:lstStyle/>
+          <a:p>
+            <a:r>
+              <a:rPr lang="en-US" sz="1600" b="1" dirty="0" smtClean="0">
+                <a:solidFill>
+                  <a:schemeClr val="accent2"/>
+                </a:solidFill>
+              </a:rPr>
+              <a:t>PK</a:t>
+            </a:r>
+            <a:endParaRPr lang="en-US" sz="1600" b="1" dirty="0">
+              <a:solidFill>
+                <a:schemeClr val="accent2"/>
+              </a:solidFill>
+            </a:endParaRPr>
+          </a:p>
+        </p:txBody>
+      </p:sp>
+      <p:sp>
+        <p:nvSpPr>
+          <p:cNvPr id="100" name="TextBox 99"/>
+          <p:cNvSpPr txBox="1"/>
+          <p:nvPr/>
+        </p:nvSpPr>
+        <p:spPr>
+          <a:xfrm>
+            <a:off x="3273405" y="811222"/>
+            <a:ext cx="405880" cy="338554"/>
+          </a:xfrm>
+          <a:prstGeom prst="rect">
+            <a:avLst/>
+          </a:prstGeom>
+          <a:noFill/>
+        </p:spPr>
+        <p:txBody>
+          <a:bodyPr wrap="none" rtlCol="0">
+            <a:spAutoFit/>
+          </a:bodyPr>
+          <a:lstStyle/>
+          <a:p>
+            <a:r>
+              <a:rPr lang="en-US" sz="1600" b="1" dirty="0" smtClean="0">
+                <a:solidFill>
+                  <a:schemeClr val="accent2"/>
+                </a:solidFill>
+              </a:rPr>
+              <a:t>PK</a:t>
+            </a:r>
+            <a:endParaRPr lang="en-US" sz="1600" b="1" dirty="0">
+              <a:solidFill>
+                <a:schemeClr val="accent2"/>
+              </a:solidFill>
+            </a:endParaRPr>
+          </a:p>
+        </p:txBody>
+      </p:sp>
+      <p:sp>
+        <p:nvSpPr>
+          <p:cNvPr id="101" name="TextBox 100"/>
+          <p:cNvSpPr txBox="1"/>
+          <p:nvPr/>
+        </p:nvSpPr>
+        <p:spPr>
+          <a:xfrm>
+            <a:off x="5924503" y="821611"/>
+            <a:ext cx="405880" cy="338554"/>
+          </a:xfrm>
+          <a:prstGeom prst="rect">
+            <a:avLst/>
+          </a:prstGeom>
+          <a:noFill/>
+        </p:spPr>
+        <p:txBody>
+          <a:bodyPr wrap="none" rtlCol="0">
+            <a:spAutoFit/>
+          </a:bodyPr>
+          <a:lstStyle/>
+          <a:p>
+            <a:r>
+              <a:rPr lang="en-US" sz="1600" b="1" dirty="0" smtClean="0">
+                <a:solidFill>
+                  <a:schemeClr val="accent2"/>
+                </a:solidFill>
+              </a:rPr>
+              <a:t>PK</a:t>
+            </a:r>
+            <a:endParaRPr lang="en-US" sz="1600" b="1" dirty="0">
+              <a:solidFill>
+                <a:schemeClr val="accent2"/>
+              </a:solidFill>
+            </a:endParaRPr>
+          </a:p>
+        </p:txBody>
+      </p:sp>
+      <p:sp>
+        <p:nvSpPr>
+          <p:cNvPr id="102" name="TextBox 101"/>
+          <p:cNvSpPr txBox="1"/>
+          <p:nvPr/>
+        </p:nvSpPr>
+        <p:spPr>
+          <a:xfrm>
+            <a:off x="9188123" y="783421"/>
+            <a:ext cx="405880" cy="338554"/>
+          </a:xfrm>
+          <a:prstGeom prst="rect">
+            <a:avLst/>
+          </a:prstGeom>
+          <a:noFill/>
+        </p:spPr>
+        <p:txBody>
+          <a:bodyPr wrap="none" rtlCol="0">
+            <a:spAutoFit/>
+          </a:bodyPr>
+          <a:lstStyle/>
+          <a:p>
+            <a:r>
+              <a:rPr lang="en-US" sz="1600" b="1" dirty="0" smtClean="0">
+                <a:solidFill>
+                  <a:schemeClr val="accent2"/>
+                </a:solidFill>
+              </a:rPr>
+              <a:t>PK</a:t>
+            </a:r>
+            <a:endParaRPr lang="en-US" sz="1600" b="1" dirty="0">
+              <a:solidFill>
+                <a:schemeClr val="accent2"/>
+              </a:solidFill>
+            </a:endParaRPr>
+          </a:p>
+        </p:txBody>
+      </p:sp>
+      <p:sp>
+        <p:nvSpPr>
+          <p:cNvPr id="103" name="TextBox 102"/>
+          <p:cNvSpPr txBox="1"/>
+          <p:nvPr/>
+        </p:nvSpPr>
+        <p:spPr>
+          <a:xfrm>
+            <a:off x="6001050" y="4693530"/>
+            <a:ext cx="405880" cy="338554"/>
+          </a:xfrm>
+          <a:prstGeom prst="rect">
+            <a:avLst/>
+          </a:prstGeom>
+          <a:noFill/>
+        </p:spPr>
+        <p:txBody>
+          <a:bodyPr wrap="none" rtlCol="0">
+            <a:spAutoFit/>
+          </a:bodyPr>
+          <a:lstStyle/>
+          <a:p>
+            <a:r>
+              <a:rPr lang="en-US" sz="1600" b="1" dirty="0" smtClean="0">
+                <a:solidFill>
+                  <a:schemeClr val="accent2"/>
+                </a:solidFill>
+              </a:rPr>
+              <a:t>PK</a:t>
+            </a:r>
+            <a:endParaRPr lang="en-US" sz="1600" b="1" dirty="0">
+              <a:solidFill>
+                <a:schemeClr val="accent2"/>
+              </a:solidFill>
+            </a:endParaRPr>
+          </a:p>
+        </p:txBody>
+      </p:sp>
+      <p:sp>
+        <p:nvSpPr>
+          <p:cNvPr id="104" name="TextBox 103"/>
+          <p:cNvSpPr txBox="1"/>
+          <p:nvPr/>
+        </p:nvSpPr>
+        <p:spPr>
+          <a:xfrm>
+            <a:off x="936060" y="1617174"/>
+            <a:ext cx="1002069" cy="369332"/>
+          </a:xfrm>
+          <a:prstGeom prst="rect">
+            <a:avLst/>
+          </a:prstGeom>
+          <a:noFill/>
+        </p:spPr>
+        <p:txBody>
+          <a:bodyPr wrap="none" rtlCol="0">
+            <a:spAutoFit/>
+          </a:bodyPr>
+          <a:lstStyle/>
+          <a:p>
+            <a:r>
+              <a:rPr lang="en-US" dirty="0" smtClean="0"/>
+              <a:t>batch_id</a:t>
+            </a:r>
+            <a:endParaRPr lang="en-US" dirty="0"/>
+          </a:p>
+        </p:txBody>
+      </p:sp>
+      <p:sp>
+        <p:nvSpPr>
+          <p:cNvPr id="105" name="TextBox 104"/>
+          <p:cNvSpPr txBox="1"/>
+          <p:nvPr/>
+        </p:nvSpPr>
+        <p:spPr>
+          <a:xfrm>
+            <a:off x="619753" y="1623472"/>
+            <a:ext cx="391454" cy="338554"/>
+          </a:xfrm>
+          <a:prstGeom prst="rect">
+            <a:avLst/>
+          </a:prstGeom>
+          <a:noFill/>
+        </p:spPr>
+        <p:txBody>
+          <a:bodyPr wrap="none" rtlCol="0">
+            <a:spAutoFit/>
+          </a:bodyPr>
+          <a:lstStyle/>
+          <a:p>
+            <a:r>
+              <a:rPr lang="en-US" sz="1600" b="1" dirty="0" smtClean="0">
+                <a:solidFill>
+                  <a:srgbClr val="7030A0"/>
+                </a:solidFill>
+              </a:rPr>
+              <a:t>FK</a:t>
+            </a:r>
+            <a:endParaRPr lang="en-US" sz="1600" b="1" dirty="0">
+              <a:solidFill>
+                <a:srgbClr val="7030A0"/>
+              </a:solidFill>
+            </a:endParaRPr>
+          </a:p>
+        </p:txBody>
+      </p:sp>
+      <p:sp>
+        <p:nvSpPr>
+          <p:cNvPr id="106" name="TextBox 105"/>
+          <p:cNvSpPr txBox="1"/>
+          <p:nvPr/>
+        </p:nvSpPr>
+        <p:spPr>
+          <a:xfrm>
+            <a:off x="3674846" y="2113379"/>
+            <a:ext cx="915635" cy="369332"/>
+          </a:xfrm>
+          <a:prstGeom prst="rect">
+            <a:avLst/>
+          </a:prstGeom>
+          <a:noFill/>
+        </p:spPr>
+        <p:txBody>
+          <a:bodyPr wrap="none" rtlCol="0">
+            <a:spAutoFit/>
+          </a:bodyPr>
+          <a:lstStyle/>
+          <a:p>
+            <a:r>
+              <a:rPr lang="en-US" dirty="0" smtClean="0"/>
+              <a:t>class_id</a:t>
+            </a:r>
+            <a:endParaRPr lang="en-US" dirty="0"/>
+          </a:p>
+        </p:txBody>
+      </p:sp>
+      <p:sp>
+        <p:nvSpPr>
+          <p:cNvPr id="107" name="TextBox 106"/>
+          <p:cNvSpPr txBox="1"/>
+          <p:nvPr/>
+        </p:nvSpPr>
+        <p:spPr>
+          <a:xfrm>
+            <a:off x="3358539" y="2119677"/>
+            <a:ext cx="391454" cy="338554"/>
+          </a:xfrm>
+          <a:prstGeom prst="rect">
+            <a:avLst/>
+          </a:prstGeom>
+          <a:noFill/>
+        </p:spPr>
+        <p:txBody>
+          <a:bodyPr wrap="none" rtlCol="0">
+            <a:spAutoFit/>
+          </a:bodyPr>
+          <a:lstStyle/>
+          <a:p>
+            <a:r>
+              <a:rPr lang="en-US" sz="1600" b="1" dirty="0" smtClean="0">
+                <a:solidFill>
+                  <a:srgbClr val="7030A0"/>
+                </a:solidFill>
+              </a:rPr>
+              <a:t>FK</a:t>
+            </a:r>
+            <a:endParaRPr lang="en-US" sz="1600" b="1" dirty="0">
+              <a:solidFill>
+                <a:srgbClr val="7030A0"/>
+              </a:solidFill>
+            </a:endParaRPr>
+          </a:p>
+        </p:txBody>
+      </p:sp>
+      <p:sp>
+        <p:nvSpPr>
+          <p:cNvPr id="108" name="TextBox 107"/>
+          <p:cNvSpPr txBox="1"/>
+          <p:nvPr/>
+        </p:nvSpPr>
+        <p:spPr>
+          <a:xfrm>
+            <a:off x="6257853" y="1483685"/>
+            <a:ext cx="1194686" cy="369332"/>
+          </a:xfrm>
+          <a:prstGeom prst="rect">
+            <a:avLst/>
+          </a:prstGeom>
+          <a:noFill/>
+        </p:spPr>
+        <p:txBody>
+          <a:bodyPr wrap="none" rtlCol="0">
+            <a:spAutoFit/>
+          </a:bodyPr>
+          <a:lstStyle/>
+          <a:p>
+            <a:r>
+              <a:rPr lang="en-US" dirty="0" err="1" smtClean="0"/>
+              <a:t>student_id</a:t>
+            </a:r>
+            <a:endParaRPr lang="en-US" dirty="0"/>
+          </a:p>
+        </p:txBody>
+      </p:sp>
+      <p:sp>
+        <p:nvSpPr>
+          <p:cNvPr id="109" name="TextBox 108"/>
+          <p:cNvSpPr txBox="1"/>
+          <p:nvPr/>
+        </p:nvSpPr>
+        <p:spPr>
+          <a:xfrm>
+            <a:off x="5977770" y="1489361"/>
+            <a:ext cx="391454" cy="338554"/>
+          </a:xfrm>
+          <a:prstGeom prst="rect">
+            <a:avLst/>
+          </a:prstGeom>
+          <a:noFill/>
+        </p:spPr>
+        <p:txBody>
+          <a:bodyPr wrap="none" rtlCol="0">
+            <a:spAutoFit/>
+          </a:bodyPr>
+          <a:lstStyle/>
+          <a:p>
+            <a:r>
+              <a:rPr lang="en-US" sz="1600" b="1" dirty="0" smtClean="0">
+                <a:solidFill>
+                  <a:srgbClr val="7030A0"/>
+                </a:solidFill>
+              </a:rPr>
+              <a:t>FK</a:t>
+            </a:r>
+            <a:endParaRPr lang="en-US" sz="1600" b="1" dirty="0">
+              <a:solidFill>
+                <a:srgbClr val="7030A0"/>
+              </a:solidFill>
+            </a:endParaRPr>
+          </a:p>
+        </p:txBody>
+      </p:sp>
+      <p:sp>
+        <p:nvSpPr>
+          <p:cNvPr id="110" name="TextBox 109"/>
+          <p:cNvSpPr txBox="1"/>
+          <p:nvPr/>
+        </p:nvSpPr>
+        <p:spPr>
+          <a:xfrm>
+            <a:off x="6253182" y="1790609"/>
+            <a:ext cx="943848" cy="369332"/>
+          </a:xfrm>
+          <a:prstGeom prst="rect">
+            <a:avLst/>
+          </a:prstGeom>
+          <a:noFill/>
+        </p:spPr>
+        <p:txBody>
+          <a:bodyPr wrap="none" rtlCol="0">
+            <a:spAutoFit/>
+          </a:bodyPr>
+          <a:lstStyle/>
+          <a:p>
+            <a:r>
+              <a:rPr lang="en-US" dirty="0" err="1" smtClean="0"/>
+              <a:t>topic_id</a:t>
+            </a:r>
+            <a:endParaRPr lang="en-US" dirty="0"/>
+          </a:p>
+        </p:txBody>
+      </p:sp>
+      <p:sp>
+        <p:nvSpPr>
+          <p:cNvPr id="111" name="TextBox 110"/>
+          <p:cNvSpPr txBox="1"/>
+          <p:nvPr/>
+        </p:nvSpPr>
+        <p:spPr>
+          <a:xfrm>
+            <a:off x="5961902" y="1814011"/>
+            <a:ext cx="391454" cy="338554"/>
+          </a:xfrm>
+          <a:prstGeom prst="rect">
+            <a:avLst/>
+          </a:prstGeom>
+          <a:noFill/>
+        </p:spPr>
+        <p:txBody>
+          <a:bodyPr wrap="none" rtlCol="0">
+            <a:spAutoFit/>
+          </a:bodyPr>
+          <a:lstStyle/>
+          <a:p>
+            <a:r>
+              <a:rPr lang="en-US" sz="1600" b="1" dirty="0" smtClean="0">
+                <a:solidFill>
+                  <a:srgbClr val="7030A0"/>
+                </a:solidFill>
+              </a:rPr>
+              <a:t>FK</a:t>
+            </a:r>
+            <a:endParaRPr lang="en-US" sz="1600" b="1" dirty="0">
+              <a:solidFill>
+                <a:srgbClr val="7030A0"/>
+              </a:solidFill>
+            </a:endParaRPr>
+          </a:p>
+        </p:txBody>
+      </p:sp>
+      <p:sp>
+        <p:nvSpPr>
+          <p:cNvPr id="112" name="TextBox 111"/>
+          <p:cNvSpPr txBox="1"/>
+          <p:nvPr/>
+        </p:nvSpPr>
+        <p:spPr>
+          <a:xfrm>
+            <a:off x="6257853" y="2137900"/>
+            <a:ext cx="1510991" cy="369332"/>
+          </a:xfrm>
+          <a:prstGeom prst="rect">
+            <a:avLst/>
+          </a:prstGeom>
+          <a:noFill/>
+        </p:spPr>
+        <p:txBody>
+          <a:bodyPr wrap="none" rtlCol="0">
+            <a:spAutoFit/>
+          </a:bodyPr>
+          <a:lstStyle/>
+          <a:p>
+            <a:r>
+              <a:rPr lang="en-US" dirty="0" err="1" smtClean="0"/>
+              <a:t>exam_type_id</a:t>
+            </a:r>
+            <a:endParaRPr lang="en-US" dirty="0"/>
+          </a:p>
+        </p:txBody>
+      </p:sp>
+      <p:sp>
+        <p:nvSpPr>
+          <p:cNvPr id="113" name="TextBox 112"/>
+          <p:cNvSpPr txBox="1"/>
+          <p:nvPr/>
+        </p:nvSpPr>
+        <p:spPr>
+          <a:xfrm>
+            <a:off x="5953321" y="2167847"/>
+            <a:ext cx="391454" cy="338554"/>
+          </a:xfrm>
+          <a:prstGeom prst="rect">
+            <a:avLst/>
+          </a:prstGeom>
+          <a:noFill/>
+        </p:spPr>
+        <p:txBody>
+          <a:bodyPr wrap="none" rtlCol="0">
+            <a:spAutoFit/>
+          </a:bodyPr>
+          <a:lstStyle/>
+          <a:p>
+            <a:r>
+              <a:rPr lang="en-US" sz="1600" b="1" dirty="0" smtClean="0">
+                <a:solidFill>
+                  <a:srgbClr val="7030A0"/>
+                </a:solidFill>
+              </a:rPr>
+              <a:t>FK</a:t>
+            </a:r>
+            <a:endParaRPr lang="en-US" sz="1600" b="1" dirty="0">
+              <a:solidFill>
+                <a:srgbClr val="7030A0"/>
+              </a:solidFill>
+            </a:endParaRPr>
           </a:p>
         </p:txBody>
       </p:sp>

</xml_diff>